<commit_message>
4. Dios.pptx - part 1
</commit_message>
<xml_diff>
--- a/slideshow/Teologia Sistematica y Biblica - Myer Pearlman/Clases/4. Dios.pptx
+++ b/slideshow/Teologia Sistematica y Biblica - Myer Pearlman/Clases/4. Dios.pptx
@@ -15,6 +15,12 @@
     <p:sldId id="263" r:id="rId9"/>
     <p:sldId id="266" r:id="rId10"/>
     <p:sldId id="267" r:id="rId11"/>
+    <p:sldId id="268" r:id="rId12"/>
+    <p:sldId id="269" r:id="rId13"/>
+    <p:sldId id="270" r:id="rId14"/>
+    <p:sldId id="271" r:id="rId15"/>
+    <p:sldId id="272" r:id="rId16"/>
+    <p:sldId id="273" r:id="rId17"/>
   </p:sldIdLst>
   <p:sldSz cx="9144000" cy="5715000" type="screen16x10"/>
   <p:notesSz cx="6858000" cy="9144000"/>
@@ -252,7 +258,7 @@
           <a:p>
             <a:fld id="{50DEE611-8BEF-4990-B4F5-91A0FAC492E5}" type="datetimeFigureOut">
               <a:rPr lang="es-VE" smtClean="0"/>
-              <a:t>3/3/2021</a:t>
+              <a:t>5/3/2021</a:t>
             </a:fld>
             <a:endParaRPr lang="es-VE" dirty="0"/>
           </a:p>
@@ -422,7 +428,7 @@
           <a:p>
             <a:fld id="{50DEE611-8BEF-4990-B4F5-91A0FAC492E5}" type="datetimeFigureOut">
               <a:rPr lang="es-VE" smtClean="0"/>
-              <a:t>3/3/2021</a:t>
+              <a:t>5/3/2021</a:t>
             </a:fld>
             <a:endParaRPr lang="es-VE" dirty="0"/>
           </a:p>
@@ -602,7 +608,7 @@
           <a:p>
             <a:fld id="{50DEE611-8BEF-4990-B4F5-91A0FAC492E5}" type="datetimeFigureOut">
               <a:rPr lang="es-VE" smtClean="0"/>
-              <a:t>3/3/2021</a:t>
+              <a:t>5/3/2021</a:t>
             </a:fld>
             <a:endParaRPr lang="es-VE" dirty="0"/>
           </a:p>
@@ -772,7 +778,7 @@
           <a:p>
             <a:fld id="{50DEE611-8BEF-4990-B4F5-91A0FAC492E5}" type="datetimeFigureOut">
               <a:rPr lang="es-VE" smtClean="0"/>
-              <a:t>3/3/2021</a:t>
+              <a:t>5/3/2021</a:t>
             </a:fld>
             <a:endParaRPr lang="es-VE" dirty="0"/>
           </a:p>
@@ -1018,7 +1024,7 @@
           <a:p>
             <a:fld id="{50DEE611-8BEF-4990-B4F5-91A0FAC492E5}" type="datetimeFigureOut">
               <a:rPr lang="es-VE" smtClean="0"/>
-              <a:t>3/3/2021</a:t>
+              <a:t>5/3/2021</a:t>
             </a:fld>
             <a:endParaRPr lang="es-VE" dirty="0"/>
           </a:p>
@@ -1250,7 +1256,7 @@
           <a:p>
             <a:fld id="{50DEE611-8BEF-4990-B4F5-91A0FAC492E5}" type="datetimeFigureOut">
               <a:rPr lang="es-VE" smtClean="0"/>
-              <a:t>3/3/2021</a:t>
+              <a:t>5/3/2021</a:t>
             </a:fld>
             <a:endParaRPr lang="es-VE" dirty="0"/>
           </a:p>
@@ -1617,7 +1623,7 @@
           <a:p>
             <a:fld id="{50DEE611-8BEF-4990-B4F5-91A0FAC492E5}" type="datetimeFigureOut">
               <a:rPr lang="es-VE" smtClean="0"/>
-              <a:t>3/3/2021</a:t>
+              <a:t>5/3/2021</a:t>
             </a:fld>
             <a:endParaRPr lang="es-VE" dirty="0"/>
           </a:p>
@@ -1735,7 +1741,7 @@
           <a:p>
             <a:fld id="{50DEE611-8BEF-4990-B4F5-91A0FAC492E5}" type="datetimeFigureOut">
               <a:rPr lang="es-VE" smtClean="0"/>
-              <a:t>3/3/2021</a:t>
+              <a:t>5/3/2021</a:t>
             </a:fld>
             <a:endParaRPr lang="es-VE" dirty="0"/>
           </a:p>
@@ -1830,7 +1836,7 @@
           <a:p>
             <a:fld id="{50DEE611-8BEF-4990-B4F5-91A0FAC492E5}" type="datetimeFigureOut">
               <a:rPr lang="es-VE" smtClean="0"/>
-              <a:t>3/3/2021</a:t>
+              <a:t>5/3/2021</a:t>
             </a:fld>
             <a:endParaRPr lang="es-VE" dirty="0"/>
           </a:p>
@@ -2107,7 +2113,7 @@
           <a:p>
             <a:fld id="{50DEE611-8BEF-4990-B4F5-91A0FAC492E5}" type="datetimeFigureOut">
               <a:rPr lang="es-VE" smtClean="0"/>
-              <a:t>3/3/2021</a:t>
+              <a:t>5/3/2021</a:t>
             </a:fld>
             <a:endParaRPr lang="es-VE" dirty="0"/>
           </a:p>
@@ -2364,7 +2370,7 @@
           <a:p>
             <a:fld id="{50DEE611-8BEF-4990-B4F5-91A0FAC492E5}" type="datetimeFigureOut">
               <a:rPr lang="es-VE" smtClean="0"/>
-              <a:t>3/3/2021</a:t>
+              <a:t>5/3/2021</a:t>
             </a:fld>
             <a:endParaRPr lang="es-VE" dirty="0"/>
           </a:p>
@@ -2580,7 +2586,7 @@
           <a:p>
             <a:fld id="{50DEE611-8BEF-4990-B4F5-91A0FAC492E5}" type="datetimeFigureOut">
               <a:rPr lang="es-VE" smtClean="0"/>
-              <a:t>3/3/2021</a:t>
+              <a:t>5/3/2021</a:t>
             </a:fld>
             <a:endParaRPr lang="es-VE" dirty="0"/>
           </a:p>
@@ -3115,22 +3121,22 @@
         <a:gradFill flip="none" rotWithShape="1">
           <a:gsLst>
             <a:gs pos="0">
-              <a:schemeClr val="accent5">
+              <a:schemeClr val="accent6">
                 <a:lumMod val="89000"/>
               </a:schemeClr>
             </a:gs>
             <a:gs pos="23000">
-              <a:schemeClr val="accent5">
+              <a:schemeClr val="accent6">
                 <a:lumMod val="89000"/>
               </a:schemeClr>
             </a:gs>
             <a:gs pos="69000">
-              <a:schemeClr val="accent5">
+              <a:schemeClr val="accent6">
                 <a:lumMod val="75000"/>
               </a:schemeClr>
             </a:gs>
             <a:gs pos="97000">
-              <a:schemeClr val="accent5">
+              <a:schemeClr val="accent6">
                 <a:lumMod val="70000"/>
               </a:schemeClr>
             </a:gs>
@@ -3198,6 +3204,2115 @@
     <p:extLst>
       <p:ext uri="{BB962C8B-B14F-4D97-AF65-F5344CB8AC3E}">
         <p14:creationId xmlns:p14="http://schemas.microsoft.com/office/powerpoint/2010/main" val="2043484831"/>
+      </p:ext>
+    </p:extLst>
+  </p:cSld>
+  <p:clrMapOvr>
+    <a:masterClrMapping/>
+  </p:clrMapOvr>
+</p:sld>
+</file>
+
+<file path=ppt/slides/slide11.xml><?xml version="1.0" encoding="utf-8"?>
+<p:sld xmlns:a="http://schemas.openxmlformats.org/drawingml/2006/main" xmlns:r="http://schemas.openxmlformats.org/officeDocument/2006/relationships" xmlns:p="http://schemas.openxmlformats.org/presentationml/2006/main">
+  <p:cSld>
+    <p:bg>
+      <p:bgPr>
+        <a:gradFill flip="none" rotWithShape="1">
+          <a:gsLst>
+            <a:gs pos="0">
+              <a:schemeClr val="accent6">
+                <a:lumMod val="89000"/>
+              </a:schemeClr>
+            </a:gs>
+            <a:gs pos="23000">
+              <a:schemeClr val="accent6">
+                <a:lumMod val="89000"/>
+              </a:schemeClr>
+            </a:gs>
+            <a:gs pos="69000">
+              <a:schemeClr val="accent6">
+                <a:lumMod val="75000"/>
+              </a:schemeClr>
+            </a:gs>
+            <a:gs pos="97000">
+              <a:schemeClr val="accent6">
+                <a:lumMod val="70000"/>
+              </a:schemeClr>
+            </a:gs>
+          </a:gsLst>
+          <a:path path="circle">
+            <a:fillToRect l="50000" t="50000" r="50000" b="50000"/>
+          </a:path>
+          <a:tileRect/>
+        </a:gradFill>
+        <a:effectLst/>
+      </p:bgPr>
+    </p:bg>
+    <p:spTree>
+      <p:nvGrpSpPr>
+        <p:cNvPr id="1" name=""/>
+        <p:cNvGrpSpPr/>
+        <p:nvPr/>
+      </p:nvGrpSpPr>
+      <p:grpSpPr>
+        <a:xfrm>
+          <a:off x="0" y="0"/>
+          <a:ext cx="0" cy="0"/>
+          <a:chOff x="0" y="0"/>
+          <a:chExt cx="0" cy="0"/>
+        </a:xfrm>
+      </p:grpSpPr>
+      <p:sp>
+        <p:nvSpPr>
+          <p:cNvPr id="2" name="Título 1">
+            <a:extLst>
+              <a:ext uri="{FF2B5EF4-FFF2-40B4-BE49-F238E27FC236}">
+                <a16:creationId xmlns:a16="http://schemas.microsoft.com/office/drawing/2014/main" id="{C65A0631-47E2-4854-94DA-DD27A379FEF1}"/>
+              </a:ext>
+            </a:extLst>
+          </p:cNvPr>
+          <p:cNvSpPr>
+            <a:spLocks noGrp="1"/>
+          </p:cNvSpPr>
+          <p:nvPr>
+            <p:ph type="title"/>
+          </p:nvPr>
+        </p:nvSpPr>
+        <p:spPr>
+          <a:xfrm>
+            <a:off x="391887" y="309281"/>
+            <a:ext cx="8360228" cy="1160931"/>
+          </a:xfrm>
+        </p:spPr>
+        <p:txBody>
+          <a:bodyPr anchor="ctr">
+            <a:normAutofit fontScale="90000"/>
+          </a:bodyPr>
+          <a:lstStyle/>
+          <a:p>
+            <a:r>
+              <a:rPr lang="es-VE" sz="6000" b="1" dirty="0"/>
+              <a:t>3. CREENCIAS ERRÓNEAS</a:t>
+            </a:r>
+            <a:br>
+              <a:rPr lang="es-VE" sz="6600" b="1" dirty="0"/>
+            </a:br>
+            <a:r>
+              <a:rPr lang="es-VE" b="1" i="1" dirty="0"/>
+              <a:t>¿Qué son estas creencias?</a:t>
+            </a:r>
+            <a:endParaRPr lang="es-VE" sz="6600" b="1" dirty="0"/>
+          </a:p>
+        </p:txBody>
+      </p:sp>
+      <p:sp>
+        <p:nvSpPr>
+          <p:cNvPr id="3" name="Marcador de contenido 2">
+            <a:extLst>
+              <a:ext uri="{FF2B5EF4-FFF2-40B4-BE49-F238E27FC236}">
+                <a16:creationId xmlns:a16="http://schemas.microsoft.com/office/drawing/2014/main" id="{AA130F57-7D31-4139-81B2-4D70486C00F2}"/>
+              </a:ext>
+            </a:extLst>
+          </p:cNvPr>
+          <p:cNvSpPr>
+            <a:spLocks noGrp="1"/>
+          </p:cNvSpPr>
+          <p:nvPr>
+            <p:ph idx="1"/>
+          </p:nvPr>
+        </p:nvSpPr>
+        <p:spPr>
+          <a:xfrm>
+            <a:off x="391887" y="1604685"/>
+            <a:ext cx="8360228" cy="3935505"/>
+          </a:xfrm>
+        </p:spPr>
+        <p:txBody>
+          <a:bodyPr anchor="ctr">
+            <a:normAutofit/>
+          </a:bodyPr>
+          <a:lstStyle/>
+          <a:p>
+            <a:pPr marL="0" indent="0">
+              <a:buNone/>
+            </a:pPr>
+            <a:r>
+              <a:rPr lang="es-VE" sz="2000" dirty="0">
+                <a:solidFill>
+                  <a:srgbClr val="F2F2F2"/>
+                </a:solidFill>
+                <a:latin typeface="Verdana" panose="020B0604030504040204" pitchFamily="34" charset="0"/>
+              </a:rPr>
+              <a:t>Hay </a:t>
+            </a:r>
+            <a:r>
+              <a:rPr lang="es-VE" sz="2000" b="1" dirty="0">
+                <a:solidFill>
+                  <a:srgbClr val="F2F2F2"/>
+                </a:solidFill>
+                <a:latin typeface="Verdana" panose="020B0604030504040204" pitchFamily="34" charset="0"/>
+              </a:rPr>
+              <a:t>otros puntos de vista</a:t>
+            </a:r>
+            <a:r>
+              <a:rPr lang="es-VE" sz="2000" dirty="0">
+                <a:solidFill>
+                  <a:srgbClr val="F2F2F2"/>
+                </a:solidFill>
+                <a:latin typeface="Verdana" panose="020B0604030504040204" pitchFamily="34" charset="0"/>
+              </a:rPr>
+              <a:t> relativos a Dios </a:t>
+            </a:r>
+            <a:r>
+              <a:rPr lang="es-VE" sz="2000" b="1" dirty="0">
+                <a:solidFill>
+                  <a:srgbClr val="F2F2F2"/>
+                </a:solidFill>
+                <a:latin typeface="Verdana" panose="020B0604030504040204" pitchFamily="34" charset="0"/>
+              </a:rPr>
+              <a:t>aparte de las Escrituras</a:t>
+            </a:r>
+            <a:r>
+              <a:rPr lang="es-VE" sz="2000" dirty="0">
+                <a:solidFill>
+                  <a:srgbClr val="F2F2F2"/>
+                </a:solidFill>
+                <a:latin typeface="Verdana" panose="020B0604030504040204" pitchFamily="34" charset="0"/>
+              </a:rPr>
+              <a:t>. De ellos, algunos son:</a:t>
+            </a:r>
+          </a:p>
+          <a:p>
+            <a:pPr marL="0" indent="0">
+              <a:buNone/>
+            </a:pPr>
+            <a:endParaRPr lang="es-VE" sz="2000" dirty="0">
+              <a:solidFill>
+                <a:srgbClr val="F2F2F2"/>
+              </a:solidFill>
+              <a:latin typeface="Verdana" panose="020B0604030504040204" pitchFamily="34" charset="0"/>
+            </a:endParaRPr>
+          </a:p>
+          <a:p>
+            <a:pPr marL="457200" indent="-457200">
+              <a:buFont typeface="+mj-lt"/>
+              <a:buAutoNum type="arabicPeriod"/>
+            </a:pPr>
+            <a:r>
+              <a:rPr lang="es-VE" sz="2000" dirty="0">
+                <a:solidFill>
+                  <a:srgbClr val="F2F2F2"/>
+                </a:solidFill>
+                <a:latin typeface="Verdana" panose="020B0604030504040204" pitchFamily="34" charset="0"/>
+              </a:rPr>
+              <a:t>Verdades recalcadas con exceso.</a:t>
+            </a:r>
+          </a:p>
+          <a:p>
+            <a:pPr marL="457200" indent="-457200">
+              <a:buFont typeface="+mj-lt"/>
+              <a:buAutoNum type="arabicPeriod"/>
+            </a:pPr>
+            <a:r>
+              <a:rPr lang="es-VE" sz="2000" dirty="0">
+                <a:solidFill>
+                  <a:srgbClr val="F2F2F2"/>
+                </a:solidFill>
+                <a:latin typeface="Verdana" panose="020B0604030504040204" pitchFamily="34" charset="0"/>
+              </a:rPr>
+              <a:t>Verdades que no se han acentuado como es debido.</a:t>
+            </a:r>
+          </a:p>
+          <a:p>
+            <a:pPr marL="457200" indent="-457200">
+              <a:buFont typeface="+mj-lt"/>
+              <a:buAutoNum type="arabicPeriod"/>
+            </a:pPr>
+            <a:r>
+              <a:rPr lang="es-VE" sz="2000" dirty="0">
+                <a:solidFill>
+                  <a:srgbClr val="F2F2F2"/>
+                </a:solidFill>
+                <a:latin typeface="Verdana" panose="020B0604030504040204" pitchFamily="34" charset="0"/>
+              </a:rPr>
+              <a:t>Verdades falseadas, tergiversadas.</a:t>
+            </a:r>
+          </a:p>
+          <a:p>
+            <a:pPr marL="0" indent="0">
+              <a:buNone/>
+            </a:pPr>
+            <a:endParaRPr lang="es-VE" sz="2000" dirty="0">
+              <a:solidFill>
+                <a:srgbClr val="F2F2F2"/>
+              </a:solidFill>
+              <a:latin typeface="Verdana" panose="020B0604030504040204" pitchFamily="34" charset="0"/>
+            </a:endParaRPr>
+          </a:p>
+          <a:p>
+            <a:pPr marL="0" indent="0">
+              <a:buNone/>
+            </a:pPr>
+            <a:r>
+              <a:rPr lang="es-VE" sz="2000" dirty="0">
+                <a:solidFill>
+                  <a:srgbClr val="F2F2F2"/>
+                </a:solidFill>
+                <a:latin typeface="Verdana" panose="020B0604030504040204" pitchFamily="34" charset="0"/>
+              </a:rPr>
+              <a:t>¿Por qué vamos a considerarlos? Porque es muy difícil describir a la perfección el ser de Dios, y al ver </a:t>
+            </a:r>
+            <a:r>
+              <a:rPr lang="es-VE" sz="2000" b="1" dirty="0">
+                <a:solidFill>
+                  <a:srgbClr val="F2F2F2"/>
+                </a:solidFill>
+                <a:latin typeface="Verdana" panose="020B0604030504040204" pitchFamily="34" charset="0"/>
+              </a:rPr>
+              <a:t>lo que no es</a:t>
+            </a:r>
+            <a:r>
+              <a:rPr lang="es-VE" sz="2000" dirty="0">
+                <a:solidFill>
+                  <a:srgbClr val="F2F2F2"/>
+                </a:solidFill>
+                <a:latin typeface="Verdana" panose="020B0604030504040204" pitchFamily="34" charset="0"/>
+              </a:rPr>
+              <a:t>, recibiremos ayuda para entender mejor </a:t>
+            </a:r>
+            <a:r>
+              <a:rPr lang="es-VE" sz="2000" b="1" dirty="0">
+                <a:solidFill>
+                  <a:srgbClr val="F2F2F2"/>
+                </a:solidFill>
+                <a:latin typeface="Verdana" panose="020B0604030504040204" pitchFamily="34" charset="0"/>
+              </a:rPr>
+              <a:t>lo que es</a:t>
+            </a:r>
+            <a:r>
+              <a:rPr lang="es-VE" sz="2000" dirty="0">
+                <a:solidFill>
+                  <a:srgbClr val="F2F2F2"/>
+                </a:solidFill>
+                <a:latin typeface="Verdana" panose="020B0604030504040204" pitchFamily="34" charset="0"/>
+              </a:rPr>
+              <a:t>.</a:t>
+            </a:r>
+          </a:p>
+        </p:txBody>
+      </p:sp>
+    </p:spTree>
+    <p:extLst>
+      <p:ext uri="{BB962C8B-B14F-4D97-AF65-F5344CB8AC3E}">
+        <p14:creationId xmlns:p14="http://schemas.microsoft.com/office/powerpoint/2010/main" val="2011543436"/>
+      </p:ext>
+    </p:extLst>
+  </p:cSld>
+  <p:clrMapOvr>
+    <a:masterClrMapping/>
+  </p:clrMapOvr>
+</p:sld>
+</file>
+
+<file path=ppt/slides/slide12.xml><?xml version="1.0" encoding="utf-8"?>
+<p:sld xmlns:a="http://schemas.openxmlformats.org/drawingml/2006/main" xmlns:r="http://schemas.openxmlformats.org/officeDocument/2006/relationships" xmlns:p="http://schemas.openxmlformats.org/presentationml/2006/main">
+  <p:cSld>
+    <p:bg>
+      <p:bgPr>
+        <a:gradFill flip="none" rotWithShape="1">
+          <a:gsLst>
+            <a:gs pos="0">
+              <a:schemeClr val="accent6">
+                <a:lumMod val="89000"/>
+              </a:schemeClr>
+            </a:gs>
+            <a:gs pos="23000">
+              <a:schemeClr val="accent6">
+                <a:lumMod val="89000"/>
+              </a:schemeClr>
+            </a:gs>
+            <a:gs pos="69000">
+              <a:schemeClr val="accent6">
+                <a:lumMod val="75000"/>
+              </a:schemeClr>
+            </a:gs>
+            <a:gs pos="97000">
+              <a:schemeClr val="accent6">
+                <a:lumMod val="70000"/>
+              </a:schemeClr>
+            </a:gs>
+          </a:gsLst>
+          <a:path path="circle">
+            <a:fillToRect l="50000" t="50000" r="50000" b="50000"/>
+          </a:path>
+          <a:tileRect/>
+        </a:gradFill>
+        <a:effectLst/>
+      </p:bgPr>
+    </p:bg>
+    <p:spTree>
+      <p:nvGrpSpPr>
+        <p:cNvPr id="1" name=""/>
+        <p:cNvGrpSpPr/>
+        <p:nvPr/>
+      </p:nvGrpSpPr>
+      <p:grpSpPr>
+        <a:xfrm>
+          <a:off x="0" y="0"/>
+          <a:ext cx="0" cy="0"/>
+          <a:chOff x="0" y="0"/>
+          <a:chExt cx="0" cy="0"/>
+        </a:xfrm>
+      </p:grpSpPr>
+      <p:sp>
+        <p:nvSpPr>
+          <p:cNvPr id="2" name="Título 1">
+            <a:extLst>
+              <a:ext uri="{FF2B5EF4-FFF2-40B4-BE49-F238E27FC236}">
+                <a16:creationId xmlns:a16="http://schemas.microsoft.com/office/drawing/2014/main" id="{C65A0631-47E2-4854-94DA-DD27A379FEF1}"/>
+              </a:ext>
+            </a:extLst>
+          </p:cNvPr>
+          <p:cNvSpPr>
+            <a:spLocks noGrp="1"/>
+          </p:cNvSpPr>
+          <p:nvPr>
+            <p:ph type="title"/>
+          </p:nvPr>
+        </p:nvSpPr>
+        <p:spPr>
+          <a:xfrm>
+            <a:off x="391887" y="309281"/>
+            <a:ext cx="8360228" cy="1160931"/>
+          </a:xfrm>
+        </p:spPr>
+        <p:txBody>
+          <a:bodyPr anchor="ctr">
+            <a:normAutofit fontScale="90000"/>
+          </a:bodyPr>
+          <a:lstStyle/>
+          <a:p>
+            <a:r>
+              <a:rPr lang="es-VE" sz="6000" b="1" dirty="0"/>
+              <a:t>3. CREENCIAS ERRÓNEAS</a:t>
+            </a:r>
+            <a:br>
+              <a:rPr lang="es-VE" sz="6600" b="1" dirty="0"/>
+            </a:br>
+            <a:r>
+              <a:rPr lang="es-VE" b="1" i="1" dirty="0"/>
+              <a:t>3.1. Agnosticismo</a:t>
+            </a:r>
+            <a:endParaRPr lang="es-VE" sz="6600" b="1" dirty="0"/>
+          </a:p>
+        </p:txBody>
+      </p:sp>
+      <p:sp>
+        <p:nvSpPr>
+          <p:cNvPr id="3" name="Marcador de contenido 2">
+            <a:extLst>
+              <a:ext uri="{FF2B5EF4-FFF2-40B4-BE49-F238E27FC236}">
+                <a16:creationId xmlns:a16="http://schemas.microsoft.com/office/drawing/2014/main" id="{AA130F57-7D31-4139-81B2-4D70486C00F2}"/>
+              </a:ext>
+            </a:extLst>
+          </p:cNvPr>
+          <p:cNvSpPr>
+            <a:spLocks noGrp="1"/>
+          </p:cNvSpPr>
+          <p:nvPr>
+            <p:ph idx="1"/>
+          </p:nvPr>
+        </p:nvSpPr>
+        <p:spPr>
+          <a:xfrm>
+            <a:off x="391887" y="1604685"/>
+            <a:ext cx="8360228" cy="3935505"/>
+          </a:xfrm>
+        </p:spPr>
+        <p:txBody>
+          <a:bodyPr anchor="ctr">
+            <a:normAutofit lnSpcReduction="10000"/>
+          </a:bodyPr>
+          <a:lstStyle/>
+          <a:p>
+            <a:pPr marL="0" indent="0">
+              <a:buNone/>
+            </a:pPr>
+            <a:r>
+              <a:rPr lang="es-VE" sz="2000" dirty="0">
+                <a:solidFill>
+                  <a:srgbClr val="F2F2F2"/>
+                </a:solidFill>
+                <a:latin typeface="Verdana" panose="020B0604030504040204" pitchFamily="34" charset="0"/>
+              </a:rPr>
+              <a:t>El agnosticismo, de un vocablo griego que significa “</a:t>
+            </a:r>
+            <a:r>
+              <a:rPr lang="es-VE" sz="2000" b="1" dirty="0">
+                <a:solidFill>
+                  <a:srgbClr val="F2F2F2"/>
+                </a:solidFill>
+                <a:latin typeface="Verdana" panose="020B0604030504040204" pitchFamily="34" charset="0"/>
+              </a:rPr>
+              <a:t>desconocido” </a:t>
+            </a:r>
+            <a:r>
+              <a:rPr lang="es-VE" sz="2000" dirty="0">
+                <a:solidFill>
+                  <a:srgbClr val="F2F2F2"/>
+                </a:solidFill>
+                <a:latin typeface="Verdana" panose="020B0604030504040204" pitchFamily="34" charset="0"/>
+              </a:rPr>
+              <a:t>o</a:t>
+            </a:r>
+            <a:r>
+              <a:rPr lang="es-VE" sz="2000" b="1" dirty="0">
+                <a:solidFill>
+                  <a:srgbClr val="F2F2F2"/>
+                </a:solidFill>
+                <a:latin typeface="Verdana" panose="020B0604030504040204" pitchFamily="34" charset="0"/>
+              </a:rPr>
+              <a:t> “imposible de conocer”</a:t>
+            </a:r>
+            <a:r>
+              <a:rPr lang="es-VE" sz="2000" dirty="0">
+                <a:solidFill>
+                  <a:srgbClr val="F2F2F2"/>
+                </a:solidFill>
+                <a:latin typeface="Verdana" panose="020B0604030504040204" pitchFamily="34" charset="0"/>
+              </a:rPr>
+              <a:t>, niega a la inteligencia humana capacidad para </a:t>
+            </a:r>
+            <a:r>
+              <a:rPr lang="es-VE" sz="2000" b="1" dirty="0">
+                <a:solidFill>
+                  <a:srgbClr val="F2F2F2"/>
+                </a:solidFill>
+                <a:latin typeface="Verdana" panose="020B0604030504040204" pitchFamily="34" charset="0"/>
+              </a:rPr>
+              <a:t>conocer a Dios</a:t>
+            </a:r>
+            <a:r>
+              <a:rPr lang="es-VE" sz="2000" dirty="0">
+                <a:solidFill>
+                  <a:srgbClr val="F2F2F2"/>
+                </a:solidFill>
+                <a:latin typeface="Verdana" panose="020B0604030504040204" pitchFamily="34" charset="0"/>
+              </a:rPr>
+              <a:t>. </a:t>
+            </a:r>
+          </a:p>
+          <a:p>
+            <a:pPr marL="0" indent="0">
+              <a:buNone/>
+            </a:pPr>
+            <a:endParaRPr lang="es-VE" sz="2000" dirty="0">
+              <a:solidFill>
+                <a:srgbClr val="F2F2F2"/>
+              </a:solidFill>
+              <a:latin typeface="Verdana" panose="020B0604030504040204" pitchFamily="34" charset="0"/>
+            </a:endParaRPr>
+          </a:p>
+          <a:p>
+            <a:pPr marL="0" indent="0">
+              <a:buNone/>
+            </a:pPr>
+            <a:r>
+              <a:rPr lang="es-VE" sz="2000" dirty="0">
+                <a:solidFill>
+                  <a:schemeClr val="bg1">
+                    <a:lumMod val="95000"/>
+                    <a:lumOff val="5000"/>
+                  </a:schemeClr>
+                </a:solidFill>
+                <a:highlight>
+                  <a:srgbClr val="FFFF00"/>
+                </a:highlight>
+                <a:latin typeface="Verdana" panose="020B0604030504040204" pitchFamily="34" charset="0"/>
+              </a:rPr>
+              <a:t>“La mente finita no puede comprender lo infinito”</a:t>
+            </a:r>
+            <a:r>
+              <a:rPr lang="es-VE" sz="2000" dirty="0">
+                <a:solidFill>
+                  <a:srgbClr val="F2F2F2"/>
+                </a:solidFill>
+                <a:latin typeface="Verdana" panose="020B0604030504040204" pitchFamily="34" charset="0"/>
+              </a:rPr>
+              <a:t>, </a:t>
+            </a:r>
+            <a:r>
+              <a:rPr lang="es-VE" sz="2000" b="1" dirty="0">
+                <a:solidFill>
+                  <a:srgbClr val="F2F2F2"/>
+                </a:solidFill>
+                <a:latin typeface="Verdana" panose="020B0604030504040204" pitchFamily="34" charset="0"/>
+              </a:rPr>
+              <a:t>declara el agnóstico</a:t>
+            </a:r>
+            <a:r>
+              <a:rPr lang="es-VE" sz="2000" dirty="0">
+                <a:solidFill>
+                  <a:srgbClr val="F2F2F2"/>
+                </a:solidFill>
+                <a:latin typeface="Verdana" panose="020B0604030504040204" pitchFamily="34" charset="0"/>
+              </a:rPr>
+              <a:t>.</a:t>
+            </a:r>
+          </a:p>
+          <a:p>
+            <a:pPr marL="0" indent="0">
+              <a:buNone/>
+            </a:pPr>
+            <a:endParaRPr lang="es-VE" sz="2000" dirty="0">
+              <a:solidFill>
+                <a:srgbClr val="F2F2F2"/>
+              </a:solidFill>
+              <a:latin typeface="Verdana" panose="020B0604030504040204" pitchFamily="34" charset="0"/>
+            </a:endParaRPr>
+          </a:p>
+          <a:p>
+            <a:pPr marL="0" indent="0">
+              <a:buNone/>
+            </a:pPr>
+            <a:r>
+              <a:rPr lang="es-VE" sz="2000" dirty="0">
+                <a:solidFill>
+                  <a:srgbClr val="F2F2F2"/>
+                </a:solidFill>
+                <a:latin typeface="Verdana" panose="020B0604030504040204" pitchFamily="34" charset="0"/>
+              </a:rPr>
+              <a:t>Las Sagradas Escrituras se basan en la premisa de que </a:t>
+            </a:r>
+            <a:r>
+              <a:rPr lang="es-VE" sz="2000" b="1" dirty="0">
+                <a:solidFill>
+                  <a:srgbClr val="F2F2F2"/>
+                </a:solidFill>
+                <a:latin typeface="Verdana" panose="020B0604030504040204" pitchFamily="34" charset="0"/>
+              </a:rPr>
+              <a:t>Dios es conocible</a:t>
+            </a:r>
+            <a:r>
+              <a:rPr lang="es-VE" sz="2000" dirty="0">
+                <a:solidFill>
+                  <a:srgbClr val="F2F2F2"/>
+                </a:solidFill>
+                <a:latin typeface="Verdana" panose="020B0604030504040204" pitchFamily="34" charset="0"/>
+              </a:rPr>
+              <a:t>; por otra parte se nos advierte que aun “</a:t>
+            </a:r>
+            <a:r>
+              <a:rPr lang="es-VE" sz="2000" b="1" dirty="0">
+                <a:solidFill>
+                  <a:srgbClr val="F2F2F2"/>
+                </a:solidFill>
+                <a:latin typeface="Verdana" panose="020B0604030504040204" pitchFamily="34" charset="0"/>
+              </a:rPr>
+              <a:t>conocemos en parte</a:t>
+            </a:r>
+            <a:r>
+              <a:rPr lang="es-VE" sz="2000" dirty="0">
+                <a:solidFill>
+                  <a:srgbClr val="F2F2F2"/>
+                </a:solidFill>
+                <a:latin typeface="Verdana" panose="020B0604030504040204" pitchFamily="34" charset="0"/>
+              </a:rPr>
+              <a:t>”.</a:t>
+            </a:r>
+          </a:p>
+          <a:p>
+            <a:pPr marL="0" indent="0">
+              <a:buNone/>
+            </a:pPr>
+            <a:endParaRPr lang="es-VE" sz="2000" dirty="0">
+              <a:solidFill>
+                <a:srgbClr val="F2F2F2"/>
+              </a:solidFill>
+              <a:latin typeface="Verdana" panose="020B0604030504040204" pitchFamily="34" charset="0"/>
+            </a:endParaRPr>
+          </a:p>
+          <a:p>
+            <a:pPr marL="0" indent="0">
+              <a:buNone/>
+            </a:pPr>
+            <a:r>
+              <a:rPr lang="es-VE" sz="2000" b="1" dirty="0">
+                <a:solidFill>
+                  <a:srgbClr val="F2F2F2"/>
+                </a:solidFill>
+                <a:latin typeface="Verdana" panose="020B0604030504040204" pitchFamily="34" charset="0"/>
+              </a:rPr>
+              <a:t>Referencia:</a:t>
+            </a:r>
+            <a:r>
+              <a:rPr lang="es-VE" sz="2000" dirty="0">
+                <a:solidFill>
+                  <a:srgbClr val="F2F2F2"/>
+                </a:solidFill>
+                <a:latin typeface="Verdana" panose="020B0604030504040204" pitchFamily="34" charset="0"/>
+              </a:rPr>
+              <a:t> </a:t>
+            </a:r>
+            <a:r>
+              <a:rPr lang="es-VE" sz="2000" b="1" dirty="0">
+                <a:solidFill>
+                  <a:srgbClr val="FFFF00"/>
+                </a:solidFill>
+                <a:latin typeface="Verdana" panose="020B0604030504040204" pitchFamily="34" charset="0"/>
+              </a:rPr>
+              <a:t>1 Co 13:9-12</a:t>
+            </a:r>
+            <a:r>
+              <a:rPr lang="es-VE" sz="2000" dirty="0">
+                <a:solidFill>
+                  <a:srgbClr val="F2F2F2"/>
+                </a:solidFill>
+                <a:latin typeface="Verdana" panose="020B0604030504040204" pitchFamily="34" charset="0"/>
+              </a:rPr>
+              <a:t>.</a:t>
+            </a:r>
+          </a:p>
+        </p:txBody>
+      </p:sp>
+    </p:spTree>
+    <p:extLst>
+      <p:ext uri="{BB962C8B-B14F-4D97-AF65-F5344CB8AC3E}">
+        <p14:creationId xmlns:p14="http://schemas.microsoft.com/office/powerpoint/2010/main" val="604124700"/>
+      </p:ext>
+    </p:extLst>
+  </p:cSld>
+  <p:clrMapOvr>
+    <a:masterClrMapping/>
+  </p:clrMapOvr>
+</p:sld>
+</file>
+
+<file path=ppt/slides/slide13.xml><?xml version="1.0" encoding="utf-8"?>
+<p:sld xmlns:a="http://schemas.openxmlformats.org/drawingml/2006/main" xmlns:r="http://schemas.openxmlformats.org/officeDocument/2006/relationships" xmlns:p="http://schemas.openxmlformats.org/presentationml/2006/main">
+  <p:cSld>
+    <p:bg>
+      <p:bgPr>
+        <a:gradFill flip="none" rotWithShape="1">
+          <a:gsLst>
+            <a:gs pos="0">
+              <a:schemeClr val="accent6">
+                <a:lumMod val="89000"/>
+              </a:schemeClr>
+            </a:gs>
+            <a:gs pos="23000">
+              <a:schemeClr val="accent6">
+                <a:lumMod val="89000"/>
+              </a:schemeClr>
+            </a:gs>
+            <a:gs pos="69000">
+              <a:schemeClr val="accent6">
+                <a:lumMod val="75000"/>
+              </a:schemeClr>
+            </a:gs>
+            <a:gs pos="97000">
+              <a:schemeClr val="accent6">
+                <a:lumMod val="70000"/>
+              </a:schemeClr>
+            </a:gs>
+          </a:gsLst>
+          <a:path path="circle">
+            <a:fillToRect l="50000" t="50000" r="50000" b="50000"/>
+          </a:path>
+          <a:tileRect/>
+        </a:gradFill>
+        <a:effectLst/>
+      </p:bgPr>
+    </p:bg>
+    <p:spTree>
+      <p:nvGrpSpPr>
+        <p:cNvPr id="1" name=""/>
+        <p:cNvGrpSpPr/>
+        <p:nvPr/>
+      </p:nvGrpSpPr>
+      <p:grpSpPr>
+        <a:xfrm>
+          <a:off x="0" y="0"/>
+          <a:ext cx="0" cy="0"/>
+          <a:chOff x="0" y="0"/>
+          <a:chExt cx="0" cy="0"/>
+        </a:xfrm>
+      </p:grpSpPr>
+      <p:sp>
+        <p:nvSpPr>
+          <p:cNvPr id="2" name="Título 1">
+            <a:extLst>
+              <a:ext uri="{FF2B5EF4-FFF2-40B4-BE49-F238E27FC236}">
+                <a16:creationId xmlns:a16="http://schemas.microsoft.com/office/drawing/2014/main" id="{C65A0631-47E2-4854-94DA-DD27A379FEF1}"/>
+              </a:ext>
+            </a:extLst>
+          </p:cNvPr>
+          <p:cNvSpPr>
+            <a:spLocks noGrp="1"/>
+          </p:cNvSpPr>
+          <p:nvPr>
+            <p:ph type="title"/>
+          </p:nvPr>
+        </p:nvSpPr>
+        <p:spPr>
+          <a:xfrm>
+            <a:off x="391887" y="309281"/>
+            <a:ext cx="8360228" cy="1160931"/>
+          </a:xfrm>
+        </p:spPr>
+        <p:txBody>
+          <a:bodyPr anchor="ctr">
+            <a:normAutofit fontScale="90000"/>
+          </a:bodyPr>
+          <a:lstStyle/>
+          <a:p>
+            <a:r>
+              <a:rPr lang="es-VE" sz="6000" b="1" dirty="0"/>
+              <a:t>3. CREENCIAS ERRÓNEAS</a:t>
+            </a:r>
+            <a:br>
+              <a:rPr lang="es-VE" sz="6600" b="1" dirty="0"/>
+            </a:br>
+            <a:r>
+              <a:rPr lang="es-VE" b="1" i="1" dirty="0"/>
+              <a:t>3.2. Politeísmo</a:t>
+            </a:r>
+            <a:endParaRPr lang="es-VE" sz="6600" b="1" dirty="0"/>
+          </a:p>
+        </p:txBody>
+      </p:sp>
+      <p:sp>
+        <p:nvSpPr>
+          <p:cNvPr id="3" name="Marcador de contenido 2">
+            <a:extLst>
+              <a:ext uri="{FF2B5EF4-FFF2-40B4-BE49-F238E27FC236}">
+                <a16:creationId xmlns:a16="http://schemas.microsoft.com/office/drawing/2014/main" id="{AA130F57-7D31-4139-81B2-4D70486C00F2}"/>
+              </a:ext>
+            </a:extLst>
+          </p:cNvPr>
+          <p:cNvSpPr>
+            <a:spLocks noGrp="1"/>
+          </p:cNvSpPr>
+          <p:nvPr>
+            <p:ph idx="1"/>
+          </p:nvPr>
+        </p:nvSpPr>
+        <p:spPr>
+          <a:xfrm>
+            <a:off x="391887" y="1604685"/>
+            <a:ext cx="8360228" cy="3935505"/>
+          </a:xfrm>
+        </p:spPr>
+        <p:txBody>
+          <a:bodyPr anchor="ctr">
+            <a:normAutofit/>
+          </a:bodyPr>
+          <a:lstStyle/>
+          <a:p>
+            <a:pPr marL="0" indent="0">
+              <a:buNone/>
+            </a:pPr>
+            <a:r>
+              <a:rPr lang="es-VE" sz="2000" dirty="0">
+                <a:solidFill>
+                  <a:srgbClr val="F2F2F2"/>
+                </a:solidFill>
+                <a:latin typeface="Verdana" panose="020B0604030504040204" pitchFamily="34" charset="0"/>
+              </a:rPr>
+              <a:t>Este vocablo significa </a:t>
+            </a:r>
+            <a:r>
+              <a:rPr lang="es-VE" sz="2000" b="1" dirty="0">
+                <a:solidFill>
+                  <a:srgbClr val="F2F2F2"/>
+                </a:solidFill>
+                <a:latin typeface="Verdana" panose="020B0604030504040204" pitchFamily="34" charset="0"/>
+              </a:rPr>
+              <a:t>”adoración de muchos dioses”</a:t>
+            </a:r>
+            <a:r>
+              <a:rPr lang="es-VE" sz="2000" dirty="0">
+                <a:solidFill>
+                  <a:srgbClr val="F2F2F2"/>
+                </a:solidFill>
+                <a:latin typeface="Verdana" panose="020B0604030504040204" pitchFamily="34" charset="0"/>
+              </a:rPr>
+              <a:t>. Fue característica de las religiones antiguas, y se practica todavía en muchos países.</a:t>
+            </a:r>
+          </a:p>
+          <a:p>
+            <a:pPr marL="0" indent="0">
+              <a:buNone/>
+            </a:pPr>
+            <a:endParaRPr lang="es-VE" sz="2000" dirty="0">
+              <a:solidFill>
+                <a:srgbClr val="F2F2F2"/>
+              </a:solidFill>
+              <a:latin typeface="Verdana" panose="020B0604030504040204" pitchFamily="34" charset="0"/>
+            </a:endParaRPr>
+          </a:p>
+          <a:p>
+            <a:pPr marL="0" indent="0">
+              <a:buNone/>
+            </a:pPr>
+            <a:r>
+              <a:rPr lang="es-VE" sz="2000" dirty="0">
+                <a:solidFill>
+                  <a:srgbClr val="F2F2F2"/>
+                </a:solidFill>
+                <a:latin typeface="Verdana" panose="020B0604030504040204" pitchFamily="34" charset="0"/>
+              </a:rPr>
+              <a:t>Se basa en la idea de que el universo es gobernado, no por una fuerza, </a:t>
+            </a:r>
+            <a:r>
+              <a:rPr lang="es-VE" sz="2000" b="1" dirty="0">
+                <a:solidFill>
+                  <a:srgbClr val="F2F2F2"/>
+                </a:solidFill>
+                <a:latin typeface="Verdana" panose="020B0604030504040204" pitchFamily="34" charset="0"/>
+              </a:rPr>
+              <a:t>sino por varias</a:t>
+            </a:r>
+            <a:r>
+              <a:rPr lang="es-VE" sz="2000" dirty="0">
+                <a:solidFill>
+                  <a:srgbClr val="F2F2F2"/>
+                </a:solidFill>
+                <a:latin typeface="Verdana" panose="020B0604030504040204" pitchFamily="34" charset="0"/>
+              </a:rPr>
+              <a:t>, de manera que hay un </a:t>
+            </a:r>
+            <a:r>
+              <a:rPr lang="es-VE" sz="2000" b="1" dirty="0">
+                <a:solidFill>
+                  <a:srgbClr val="F2F2F2"/>
+                </a:solidFill>
+                <a:latin typeface="Verdana" panose="020B0604030504040204" pitchFamily="34" charset="0"/>
+              </a:rPr>
+              <a:t>dios</a:t>
+            </a:r>
+            <a:r>
+              <a:rPr lang="es-VE" sz="2000" dirty="0">
+                <a:solidFill>
+                  <a:srgbClr val="F2F2F2"/>
+                </a:solidFill>
+                <a:latin typeface="Verdana" panose="020B0604030504040204" pitchFamily="34" charset="0"/>
+              </a:rPr>
+              <a:t> del agua, </a:t>
+            </a:r>
+            <a:r>
+              <a:rPr lang="es-VE" sz="2000" b="1" dirty="0">
+                <a:solidFill>
+                  <a:srgbClr val="F2F2F2"/>
+                </a:solidFill>
+                <a:latin typeface="Verdana" panose="020B0604030504040204" pitchFamily="34" charset="0"/>
+              </a:rPr>
+              <a:t>dios</a:t>
+            </a:r>
+            <a:r>
+              <a:rPr lang="es-VE" sz="2000" dirty="0">
+                <a:solidFill>
+                  <a:srgbClr val="F2F2F2"/>
+                </a:solidFill>
+                <a:latin typeface="Verdana" panose="020B0604030504040204" pitchFamily="34" charset="0"/>
+              </a:rPr>
+              <a:t> del fuego, </a:t>
+            </a:r>
+            <a:r>
+              <a:rPr lang="es-VE" sz="2000" b="1" dirty="0">
+                <a:solidFill>
+                  <a:srgbClr val="F2F2F2"/>
+                </a:solidFill>
+                <a:latin typeface="Verdana" panose="020B0604030504040204" pitchFamily="34" charset="0"/>
+              </a:rPr>
+              <a:t>dios</a:t>
+            </a:r>
+            <a:r>
+              <a:rPr lang="es-VE" sz="2000" dirty="0">
+                <a:solidFill>
+                  <a:srgbClr val="F2F2F2"/>
+                </a:solidFill>
+                <a:latin typeface="Verdana" panose="020B0604030504040204" pitchFamily="34" charset="0"/>
+              </a:rPr>
+              <a:t> de las montañas, </a:t>
+            </a:r>
+            <a:r>
+              <a:rPr lang="es-VE" sz="2000" b="1" dirty="0">
+                <a:solidFill>
+                  <a:srgbClr val="F2F2F2"/>
+                </a:solidFill>
+                <a:latin typeface="Verdana" panose="020B0604030504040204" pitchFamily="34" charset="0"/>
+              </a:rPr>
+              <a:t>dios</a:t>
+            </a:r>
+            <a:r>
+              <a:rPr lang="es-VE" sz="2000" dirty="0">
+                <a:solidFill>
+                  <a:srgbClr val="F2F2F2"/>
+                </a:solidFill>
+                <a:latin typeface="Verdana" panose="020B0604030504040204" pitchFamily="34" charset="0"/>
+              </a:rPr>
+              <a:t> de la guerra, y así sucesivamente.</a:t>
+            </a:r>
+          </a:p>
+          <a:p>
+            <a:pPr marL="0" indent="0">
+              <a:buNone/>
+            </a:pPr>
+            <a:endParaRPr lang="es-VE" sz="2000" dirty="0">
+              <a:solidFill>
+                <a:srgbClr val="F2F2F2"/>
+              </a:solidFill>
+              <a:latin typeface="Verdana" panose="020B0604030504040204" pitchFamily="34" charset="0"/>
+            </a:endParaRPr>
+          </a:p>
+          <a:p>
+            <a:pPr marL="0" indent="0">
+              <a:buNone/>
+            </a:pPr>
+            <a:r>
+              <a:rPr lang="es-VE" sz="2000" dirty="0">
+                <a:solidFill>
+                  <a:srgbClr val="F2F2F2"/>
+                </a:solidFill>
+                <a:latin typeface="Verdana" panose="020B0604030504040204" pitchFamily="34" charset="0"/>
+              </a:rPr>
+              <a:t>Esta creencia fue la consecuencia natural del paganismo, que hizo muchos dioses de objetos y fuerzas naturales, </a:t>
+            </a:r>
+            <a:r>
+              <a:rPr lang="es-VE" sz="2000" dirty="0">
+                <a:solidFill>
+                  <a:srgbClr val="FFFF00"/>
+                </a:solidFill>
+                <a:latin typeface="Verdana" panose="020B0604030504040204" pitchFamily="34" charset="0"/>
+              </a:rPr>
+              <a:t>“honrando y dando culto a las criaturas antes que al Creador”</a:t>
+            </a:r>
+            <a:r>
+              <a:rPr lang="es-VE" sz="2000" dirty="0">
+                <a:solidFill>
+                  <a:srgbClr val="F2F2F2"/>
+                </a:solidFill>
+                <a:latin typeface="Verdana" panose="020B0604030504040204" pitchFamily="34" charset="0"/>
+              </a:rPr>
+              <a:t> </a:t>
+            </a:r>
+            <a:r>
+              <a:rPr lang="es-VE" sz="2000" b="1" dirty="0">
+                <a:solidFill>
+                  <a:srgbClr val="FFFF00"/>
+                </a:solidFill>
+                <a:latin typeface="Verdana" panose="020B0604030504040204" pitchFamily="34" charset="0"/>
+              </a:rPr>
+              <a:t>[</a:t>
+            </a:r>
+            <a:r>
+              <a:rPr lang="es-VE" sz="2000" b="1" dirty="0" err="1">
+                <a:solidFill>
+                  <a:srgbClr val="FFFF00"/>
+                </a:solidFill>
+                <a:latin typeface="Verdana" panose="020B0604030504040204" pitchFamily="34" charset="0"/>
+              </a:rPr>
+              <a:t>Rm</a:t>
+            </a:r>
+            <a:r>
+              <a:rPr lang="es-VE" sz="2000" b="1" dirty="0">
+                <a:solidFill>
+                  <a:srgbClr val="FFFF00"/>
+                </a:solidFill>
+                <a:latin typeface="Verdana" panose="020B0604030504040204" pitchFamily="34" charset="0"/>
+              </a:rPr>
+              <a:t> 1:25]</a:t>
+            </a:r>
+            <a:r>
+              <a:rPr lang="es-VE" sz="2000" dirty="0">
+                <a:solidFill>
+                  <a:srgbClr val="F2F2F2"/>
+                </a:solidFill>
+                <a:latin typeface="Verdana" panose="020B0604030504040204" pitchFamily="34" charset="0"/>
+              </a:rPr>
+              <a:t>.</a:t>
+            </a:r>
+          </a:p>
+        </p:txBody>
+      </p:sp>
+    </p:spTree>
+    <p:extLst>
+      <p:ext uri="{BB962C8B-B14F-4D97-AF65-F5344CB8AC3E}">
+        <p14:creationId xmlns:p14="http://schemas.microsoft.com/office/powerpoint/2010/main" val="1462976873"/>
+      </p:ext>
+    </p:extLst>
+  </p:cSld>
+  <p:clrMapOvr>
+    <a:masterClrMapping/>
+  </p:clrMapOvr>
+</p:sld>
+</file>
+
+<file path=ppt/slides/slide14.xml><?xml version="1.0" encoding="utf-8"?>
+<p:sld xmlns:a="http://schemas.openxmlformats.org/drawingml/2006/main" xmlns:r="http://schemas.openxmlformats.org/officeDocument/2006/relationships" xmlns:p="http://schemas.openxmlformats.org/presentationml/2006/main">
+  <p:cSld>
+    <p:bg>
+      <p:bgPr>
+        <a:gradFill flip="none" rotWithShape="1">
+          <a:gsLst>
+            <a:gs pos="0">
+              <a:schemeClr val="accent6">
+                <a:lumMod val="89000"/>
+              </a:schemeClr>
+            </a:gs>
+            <a:gs pos="23000">
+              <a:schemeClr val="accent6">
+                <a:lumMod val="89000"/>
+              </a:schemeClr>
+            </a:gs>
+            <a:gs pos="69000">
+              <a:schemeClr val="accent6">
+                <a:lumMod val="75000"/>
+              </a:schemeClr>
+            </a:gs>
+            <a:gs pos="97000">
+              <a:schemeClr val="accent6">
+                <a:lumMod val="70000"/>
+              </a:schemeClr>
+            </a:gs>
+          </a:gsLst>
+          <a:path path="circle">
+            <a:fillToRect l="50000" t="50000" r="50000" b="50000"/>
+          </a:path>
+          <a:tileRect/>
+        </a:gradFill>
+        <a:effectLst/>
+      </p:bgPr>
+    </p:bg>
+    <p:spTree>
+      <p:nvGrpSpPr>
+        <p:cNvPr id="1" name=""/>
+        <p:cNvGrpSpPr/>
+        <p:nvPr/>
+      </p:nvGrpSpPr>
+      <p:grpSpPr>
+        <a:xfrm>
+          <a:off x="0" y="0"/>
+          <a:ext cx="0" cy="0"/>
+          <a:chOff x="0" y="0"/>
+          <a:chExt cx="0" cy="0"/>
+        </a:xfrm>
+      </p:grpSpPr>
+      <p:sp>
+        <p:nvSpPr>
+          <p:cNvPr id="2" name="Título 1">
+            <a:extLst>
+              <a:ext uri="{FF2B5EF4-FFF2-40B4-BE49-F238E27FC236}">
+                <a16:creationId xmlns:a16="http://schemas.microsoft.com/office/drawing/2014/main" id="{C65A0631-47E2-4854-94DA-DD27A379FEF1}"/>
+              </a:ext>
+            </a:extLst>
+          </p:cNvPr>
+          <p:cNvSpPr>
+            <a:spLocks noGrp="1"/>
+          </p:cNvSpPr>
+          <p:nvPr>
+            <p:ph type="title"/>
+          </p:nvPr>
+        </p:nvSpPr>
+        <p:spPr>
+          <a:xfrm>
+            <a:off x="391887" y="309281"/>
+            <a:ext cx="8360228" cy="1160931"/>
+          </a:xfrm>
+        </p:spPr>
+        <p:txBody>
+          <a:bodyPr anchor="ctr">
+            <a:normAutofit fontScale="90000"/>
+          </a:bodyPr>
+          <a:lstStyle/>
+          <a:p>
+            <a:r>
+              <a:rPr lang="es-VE" sz="6000" b="1" dirty="0"/>
+              <a:t>3. CREENCIAS ERRÓNEAS</a:t>
+            </a:r>
+            <a:br>
+              <a:rPr lang="es-VE" sz="6600" b="1" dirty="0"/>
+            </a:br>
+            <a:r>
+              <a:rPr lang="es-VE" b="1" i="1" dirty="0"/>
+              <a:t>3.3. Panteísmo</a:t>
+            </a:r>
+            <a:endParaRPr lang="es-VE" sz="6600" b="1" dirty="0"/>
+          </a:p>
+        </p:txBody>
+      </p:sp>
+      <p:sp>
+        <p:nvSpPr>
+          <p:cNvPr id="3" name="Marcador de contenido 2">
+            <a:extLst>
+              <a:ext uri="{FF2B5EF4-FFF2-40B4-BE49-F238E27FC236}">
+                <a16:creationId xmlns:a16="http://schemas.microsoft.com/office/drawing/2014/main" id="{AA130F57-7D31-4139-81B2-4D70486C00F2}"/>
+              </a:ext>
+            </a:extLst>
+          </p:cNvPr>
+          <p:cNvSpPr>
+            <a:spLocks noGrp="1"/>
+          </p:cNvSpPr>
+          <p:nvPr>
+            <p:ph idx="1"/>
+          </p:nvPr>
+        </p:nvSpPr>
+        <p:spPr>
+          <a:xfrm>
+            <a:off x="391885" y="1622611"/>
+            <a:ext cx="4180113" cy="1743636"/>
+          </a:xfrm>
+        </p:spPr>
+        <p:txBody>
+          <a:bodyPr anchor="ctr">
+            <a:normAutofit/>
+          </a:bodyPr>
+          <a:lstStyle/>
+          <a:p>
+            <a:pPr marL="0" indent="0">
+              <a:buNone/>
+            </a:pPr>
+            <a:r>
+              <a:rPr lang="es-VE" sz="2000" dirty="0">
+                <a:solidFill>
+                  <a:srgbClr val="F2F2F2"/>
+                </a:solidFill>
+                <a:latin typeface="Verdana" panose="020B0604030504040204" pitchFamily="34" charset="0"/>
+              </a:rPr>
+              <a:t>El </a:t>
+            </a:r>
+            <a:r>
+              <a:rPr lang="es-VE" sz="2000" b="1" dirty="0">
+                <a:solidFill>
+                  <a:srgbClr val="F2F2F2"/>
+                </a:solidFill>
+                <a:latin typeface="Verdana" panose="020B0604030504040204" pitchFamily="34" charset="0"/>
+              </a:rPr>
+              <a:t>“panteísmo”</a:t>
+            </a:r>
+            <a:r>
+              <a:rPr lang="es-VE" sz="2000" dirty="0">
+                <a:solidFill>
+                  <a:srgbClr val="F2F2F2"/>
+                </a:solidFill>
+                <a:latin typeface="Verdana" panose="020B0604030504040204" pitchFamily="34" charset="0"/>
+              </a:rPr>
+              <a:t> es una concepción del mundo y una doctrina filosófica según la cual el universo, la naturaleza y Dios son lo mismo.</a:t>
+            </a:r>
+          </a:p>
+        </p:txBody>
+      </p:sp>
+      <p:graphicFrame>
+        <p:nvGraphicFramePr>
+          <p:cNvPr id="8" name="Tabla 8">
+            <a:extLst>
+              <a:ext uri="{FF2B5EF4-FFF2-40B4-BE49-F238E27FC236}">
+                <a16:creationId xmlns:a16="http://schemas.microsoft.com/office/drawing/2014/main" id="{5F8025B8-B853-4299-9299-AC725AD6C9B8}"/>
+              </a:ext>
+            </a:extLst>
+          </p:cNvPr>
+          <p:cNvGraphicFramePr>
+            <a:graphicFrameLocks noGrp="1"/>
+          </p:cNvGraphicFramePr>
+          <p:nvPr>
+            <p:extLst>
+              <p:ext uri="{D42A27DB-BD31-4B8C-83A1-F6EECF244321}">
+                <p14:modId xmlns:p14="http://schemas.microsoft.com/office/powerpoint/2010/main" val="2105160068"/>
+              </p:ext>
+            </p:extLst>
+          </p:nvPr>
+        </p:nvGraphicFramePr>
+        <p:xfrm>
+          <a:off x="4571999" y="1618127"/>
+          <a:ext cx="4180113" cy="1748119"/>
+        </p:xfrm>
+        <a:graphic>
+          <a:graphicData uri="http://schemas.openxmlformats.org/drawingml/2006/table">
+            <a:tbl>
+              <a:tblPr firstRow="1" bandRow="1">
+                <a:tableStyleId>{638B1855-1B75-4FBE-930C-398BA8C253C6}</a:tableStyleId>
+              </a:tblPr>
+              <a:tblGrid>
+                <a:gridCol w="890586">
+                  <a:extLst>
+                    <a:ext uri="{9D8B030D-6E8A-4147-A177-3AD203B41FA5}">
+                      <a16:colId xmlns:a16="http://schemas.microsoft.com/office/drawing/2014/main" val="852551054"/>
+                    </a:ext>
+                  </a:extLst>
+                </a:gridCol>
+                <a:gridCol w="1837848">
+                  <a:extLst>
+                    <a:ext uri="{9D8B030D-6E8A-4147-A177-3AD203B41FA5}">
+                      <a16:colId xmlns:a16="http://schemas.microsoft.com/office/drawing/2014/main" val="4008511744"/>
+                    </a:ext>
+                  </a:extLst>
+                </a:gridCol>
+                <a:gridCol w="1451679">
+                  <a:extLst>
+                    <a:ext uri="{9D8B030D-6E8A-4147-A177-3AD203B41FA5}">
+                      <a16:colId xmlns:a16="http://schemas.microsoft.com/office/drawing/2014/main" val="183743980"/>
+                    </a:ext>
+                  </a:extLst>
+                </a:gridCol>
+              </a:tblGrid>
+              <a:tr h="514495">
+                <a:tc>
+                  <a:txBody>
+                    <a:bodyPr/>
+                    <a:lstStyle/>
+                    <a:p>
+                      <a:pPr algn="ctr"/>
+                      <a:r>
+                        <a:rPr lang="es-VE" sz="2000" dirty="0"/>
+                        <a:t>Griego</a:t>
+                      </a:r>
+                    </a:p>
+                  </a:txBody>
+                  <a:tcPr anchor="ctr"/>
+                </a:tc>
+                <a:tc>
+                  <a:txBody>
+                    <a:bodyPr/>
+                    <a:lstStyle/>
+                    <a:p>
+                      <a:pPr algn="ctr"/>
+                      <a:r>
+                        <a:rPr lang="es-VE" sz="2000" dirty="0"/>
+                        <a:t>Transliteración</a:t>
+                      </a:r>
+                    </a:p>
+                  </a:txBody>
+                  <a:tcPr anchor="ctr"/>
+                </a:tc>
+                <a:tc>
+                  <a:txBody>
+                    <a:bodyPr/>
+                    <a:lstStyle/>
+                    <a:p>
+                      <a:pPr algn="ctr"/>
+                      <a:r>
+                        <a:rPr lang="es-VE" sz="2000" dirty="0"/>
+                        <a:t>Traducción</a:t>
+                      </a:r>
+                    </a:p>
+                  </a:txBody>
+                  <a:tcPr anchor="ctr"/>
+                </a:tc>
+                <a:extLst>
+                  <a:ext uri="{0D108BD9-81ED-4DB2-BD59-A6C34878D82A}">
+                    <a16:rowId xmlns:a16="http://schemas.microsoft.com/office/drawing/2014/main" val="3396364068"/>
+                  </a:ext>
+                </a:extLst>
+              </a:tr>
+              <a:tr h="616812">
+                <a:tc>
+                  <a:txBody>
+                    <a:bodyPr/>
+                    <a:lstStyle/>
+                    <a:p>
+                      <a:pPr algn="ctr"/>
+                      <a:r>
+                        <a:rPr lang="es-VE" sz="2800" dirty="0"/>
+                        <a:t>π</a:t>
+                      </a:r>
+                      <a:r>
+                        <a:rPr lang="es-VE" sz="2800" dirty="0" err="1"/>
+                        <a:t>ᾶν</a:t>
+                      </a:r>
+                      <a:endParaRPr lang="es-VE" sz="2800" dirty="0"/>
+                    </a:p>
+                  </a:txBody>
+                  <a:tcPr anchor="ctr"/>
+                </a:tc>
+                <a:tc>
+                  <a:txBody>
+                    <a:bodyPr/>
+                    <a:lstStyle/>
+                    <a:p>
+                      <a:pPr algn="ctr"/>
+                      <a:r>
+                        <a:rPr lang="es-VE" sz="2800" dirty="0"/>
+                        <a:t>pan</a:t>
+                      </a:r>
+                    </a:p>
+                  </a:txBody>
+                  <a:tcPr anchor="ctr"/>
+                </a:tc>
+                <a:tc>
+                  <a:txBody>
+                    <a:bodyPr/>
+                    <a:lstStyle/>
+                    <a:p>
+                      <a:pPr algn="ctr"/>
+                      <a:r>
+                        <a:rPr lang="es-VE" sz="2800" dirty="0"/>
+                        <a:t>todo</a:t>
+                      </a:r>
+                    </a:p>
+                  </a:txBody>
+                  <a:tcPr anchor="ctr"/>
+                </a:tc>
+                <a:extLst>
+                  <a:ext uri="{0D108BD9-81ED-4DB2-BD59-A6C34878D82A}">
+                    <a16:rowId xmlns:a16="http://schemas.microsoft.com/office/drawing/2014/main" val="2156665573"/>
+                  </a:ext>
+                </a:extLst>
+              </a:tr>
+              <a:tr h="616812">
+                <a:tc>
+                  <a:txBody>
+                    <a:bodyPr/>
+                    <a:lstStyle/>
+                    <a:p>
+                      <a:pPr algn="ctr"/>
+                      <a:r>
+                        <a:rPr lang="es-VE" sz="2800" dirty="0" err="1"/>
+                        <a:t>θεός</a:t>
+                      </a:r>
+                      <a:endParaRPr lang="es-VE" sz="2800" dirty="0"/>
+                    </a:p>
+                  </a:txBody>
+                  <a:tcPr anchor="ctr"/>
+                </a:tc>
+                <a:tc>
+                  <a:txBody>
+                    <a:bodyPr/>
+                    <a:lstStyle/>
+                    <a:p>
+                      <a:pPr algn="ctr"/>
+                      <a:r>
+                        <a:rPr lang="es-VE" sz="2800" dirty="0" err="1"/>
+                        <a:t>theos</a:t>
+                      </a:r>
+                      <a:endParaRPr lang="es-VE" sz="2800" dirty="0"/>
+                    </a:p>
+                  </a:txBody>
+                  <a:tcPr anchor="ctr"/>
+                </a:tc>
+                <a:tc>
+                  <a:txBody>
+                    <a:bodyPr/>
+                    <a:lstStyle/>
+                    <a:p>
+                      <a:pPr algn="ctr"/>
+                      <a:r>
+                        <a:rPr lang="es-VE" sz="2800" dirty="0"/>
+                        <a:t>Dios</a:t>
+                      </a:r>
+                    </a:p>
+                  </a:txBody>
+                  <a:tcPr anchor="ctr"/>
+                </a:tc>
+                <a:extLst>
+                  <a:ext uri="{0D108BD9-81ED-4DB2-BD59-A6C34878D82A}">
+                    <a16:rowId xmlns:a16="http://schemas.microsoft.com/office/drawing/2014/main" val="3346772487"/>
+                  </a:ext>
+                </a:extLst>
+              </a:tr>
+            </a:tbl>
+          </a:graphicData>
+        </a:graphic>
+      </p:graphicFrame>
+      <p:sp>
+        <p:nvSpPr>
+          <p:cNvPr id="10" name="Marcador de contenido 2">
+            <a:extLst>
+              <a:ext uri="{FF2B5EF4-FFF2-40B4-BE49-F238E27FC236}">
+                <a16:creationId xmlns:a16="http://schemas.microsoft.com/office/drawing/2014/main" id="{83E36A6A-5715-449F-B213-32986F3CF615}"/>
+              </a:ext>
+            </a:extLst>
+          </p:cNvPr>
+          <p:cNvSpPr txBox="1">
+            <a:spLocks/>
+          </p:cNvSpPr>
+          <p:nvPr/>
+        </p:nvSpPr>
+        <p:spPr>
+          <a:xfrm>
+            <a:off x="391884" y="3370730"/>
+            <a:ext cx="8360228" cy="2115670"/>
+          </a:xfrm>
+          <a:prstGeom prst="rect">
+            <a:avLst/>
+          </a:prstGeom>
+        </p:spPr>
+        <p:txBody>
+          <a:bodyPr vert="horz" lIns="91440" tIns="45720" rIns="91440" bIns="45720" rtlCol="0" anchor="ctr">
+            <a:normAutofit/>
+          </a:bodyPr>
+          <a:lstStyle>
+            <a:lvl1pPr marL="171446" indent="-171446" algn="l" defTabSz="685783" rtl="0" eaLnBrk="1" latinLnBrk="0" hangingPunct="1">
+              <a:lnSpc>
+                <a:spcPct val="90000"/>
+              </a:lnSpc>
+              <a:spcBef>
+                <a:spcPts val="751"/>
+              </a:spcBef>
+              <a:buFont typeface="Arial" panose="020B0604020202020204" pitchFamily="34" charset="0"/>
+              <a:buChar char="•"/>
+              <a:defRPr sz="2100" kern="1200">
+                <a:solidFill>
+                  <a:schemeClr val="tx1"/>
+                </a:solidFill>
+                <a:latin typeface="+mn-lt"/>
+                <a:ea typeface="+mn-ea"/>
+                <a:cs typeface="+mn-cs"/>
+              </a:defRPr>
+            </a:lvl1pPr>
+            <a:lvl2pPr marL="514338" indent="-171446" algn="l" defTabSz="685783" rtl="0" eaLnBrk="1" latinLnBrk="0" hangingPunct="1">
+              <a:lnSpc>
+                <a:spcPct val="90000"/>
+              </a:lnSpc>
+              <a:spcBef>
+                <a:spcPts val="375"/>
+              </a:spcBef>
+              <a:buFont typeface="Arial" panose="020B0604020202020204" pitchFamily="34" charset="0"/>
+              <a:buChar char="•"/>
+              <a:defRPr sz="1800" kern="1200">
+                <a:solidFill>
+                  <a:schemeClr val="tx1"/>
+                </a:solidFill>
+                <a:latin typeface="+mn-lt"/>
+                <a:ea typeface="+mn-ea"/>
+                <a:cs typeface="+mn-cs"/>
+              </a:defRPr>
+            </a:lvl2pPr>
+            <a:lvl3pPr marL="857229" indent="-171446" algn="l" defTabSz="685783" rtl="0" eaLnBrk="1" latinLnBrk="0" hangingPunct="1">
+              <a:lnSpc>
+                <a:spcPct val="90000"/>
+              </a:lnSpc>
+              <a:spcBef>
+                <a:spcPts val="375"/>
+              </a:spcBef>
+              <a:buFont typeface="Arial" panose="020B0604020202020204" pitchFamily="34" charset="0"/>
+              <a:buChar char="•"/>
+              <a:defRPr sz="1500" kern="1200">
+                <a:solidFill>
+                  <a:schemeClr val="tx1"/>
+                </a:solidFill>
+                <a:latin typeface="+mn-lt"/>
+                <a:ea typeface="+mn-ea"/>
+                <a:cs typeface="+mn-cs"/>
+              </a:defRPr>
+            </a:lvl3pPr>
+            <a:lvl4pPr marL="1200121" indent="-171446" algn="l" defTabSz="685783" rtl="0" eaLnBrk="1" latinLnBrk="0" hangingPunct="1">
+              <a:lnSpc>
+                <a:spcPct val="90000"/>
+              </a:lnSpc>
+              <a:spcBef>
+                <a:spcPts val="375"/>
+              </a:spcBef>
+              <a:buFont typeface="Arial" panose="020B0604020202020204" pitchFamily="34" charset="0"/>
+              <a:buChar char="•"/>
+              <a:defRPr sz="1351" kern="1200">
+                <a:solidFill>
+                  <a:schemeClr val="tx1"/>
+                </a:solidFill>
+                <a:latin typeface="+mn-lt"/>
+                <a:ea typeface="+mn-ea"/>
+                <a:cs typeface="+mn-cs"/>
+              </a:defRPr>
+            </a:lvl4pPr>
+            <a:lvl5pPr marL="1543012" indent="-171446" algn="l" defTabSz="685783" rtl="0" eaLnBrk="1" latinLnBrk="0" hangingPunct="1">
+              <a:lnSpc>
+                <a:spcPct val="90000"/>
+              </a:lnSpc>
+              <a:spcBef>
+                <a:spcPts val="375"/>
+              </a:spcBef>
+              <a:buFont typeface="Arial" panose="020B0604020202020204" pitchFamily="34" charset="0"/>
+              <a:buChar char="•"/>
+              <a:defRPr sz="1351" kern="1200">
+                <a:solidFill>
+                  <a:schemeClr val="tx1"/>
+                </a:solidFill>
+                <a:latin typeface="+mn-lt"/>
+                <a:ea typeface="+mn-ea"/>
+                <a:cs typeface="+mn-cs"/>
+              </a:defRPr>
+            </a:lvl5pPr>
+            <a:lvl6pPr marL="1885904" indent="-171446" algn="l" defTabSz="685783" rtl="0" eaLnBrk="1" latinLnBrk="0" hangingPunct="1">
+              <a:lnSpc>
+                <a:spcPct val="90000"/>
+              </a:lnSpc>
+              <a:spcBef>
+                <a:spcPts val="375"/>
+              </a:spcBef>
+              <a:buFont typeface="Arial" panose="020B0604020202020204" pitchFamily="34" charset="0"/>
+              <a:buChar char="•"/>
+              <a:defRPr sz="1351" kern="1200">
+                <a:solidFill>
+                  <a:schemeClr val="tx1"/>
+                </a:solidFill>
+                <a:latin typeface="+mn-lt"/>
+                <a:ea typeface="+mn-ea"/>
+                <a:cs typeface="+mn-cs"/>
+              </a:defRPr>
+            </a:lvl6pPr>
+            <a:lvl7pPr marL="2228795" indent="-171446" algn="l" defTabSz="685783" rtl="0" eaLnBrk="1" latinLnBrk="0" hangingPunct="1">
+              <a:lnSpc>
+                <a:spcPct val="90000"/>
+              </a:lnSpc>
+              <a:spcBef>
+                <a:spcPts val="375"/>
+              </a:spcBef>
+              <a:buFont typeface="Arial" panose="020B0604020202020204" pitchFamily="34" charset="0"/>
+              <a:buChar char="•"/>
+              <a:defRPr sz="1351" kern="1200">
+                <a:solidFill>
+                  <a:schemeClr val="tx1"/>
+                </a:solidFill>
+                <a:latin typeface="+mn-lt"/>
+                <a:ea typeface="+mn-ea"/>
+                <a:cs typeface="+mn-cs"/>
+              </a:defRPr>
+            </a:lvl7pPr>
+            <a:lvl8pPr marL="2571686" indent="-171446" algn="l" defTabSz="685783" rtl="0" eaLnBrk="1" latinLnBrk="0" hangingPunct="1">
+              <a:lnSpc>
+                <a:spcPct val="90000"/>
+              </a:lnSpc>
+              <a:spcBef>
+                <a:spcPts val="375"/>
+              </a:spcBef>
+              <a:buFont typeface="Arial" panose="020B0604020202020204" pitchFamily="34" charset="0"/>
+              <a:buChar char="•"/>
+              <a:defRPr sz="1351" kern="1200">
+                <a:solidFill>
+                  <a:schemeClr val="tx1"/>
+                </a:solidFill>
+                <a:latin typeface="+mn-lt"/>
+                <a:ea typeface="+mn-ea"/>
+                <a:cs typeface="+mn-cs"/>
+              </a:defRPr>
+            </a:lvl8pPr>
+            <a:lvl9pPr marL="2914578" indent="-171446" algn="l" defTabSz="685783" rtl="0" eaLnBrk="1" latinLnBrk="0" hangingPunct="1">
+              <a:lnSpc>
+                <a:spcPct val="90000"/>
+              </a:lnSpc>
+              <a:spcBef>
+                <a:spcPts val="375"/>
+              </a:spcBef>
+              <a:buFont typeface="Arial" panose="020B0604020202020204" pitchFamily="34" charset="0"/>
+              <a:buChar char="•"/>
+              <a:defRPr sz="1351" kern="1200">
+                <a:solidFill>
+                  <a:schemeClr val="tx1"/>
+                </a:solidFill>
+                <a:latin typeface="+mn-lt"/>
+                <a:ea typeface="+mn-ea"/>
+                <a:cs typeface="+mn-cs"/>
+              </a:defRPr>
+            </a:lvl9pPr>
+          </a:lstStyle>
+          <a:p>
+            <a:pPr marL="0" indent="0">
+              <a:buNone/>
+            </a:pPr>
+            <a:r>
+              <a:rPr lang="es-VE" sz="2000" dirty="0">
+                <a:solidFill>
+                  <a:srgbClr val="F2F2F2"/>
+                </a:solidFill>
+                <a:latin typeface="Verdana" panose="020B0604030504040204" pitchFamily="34" charset="0"/>
+              </a:rPr>
+              <a:t>Las Sagradas Escrituras corrigen ese </a:t>
+            </a:r>
+            <a:r>
+              <a:rPr lang="es-VE" sz="2000" b="1" dirty="0">
+                <a:solidFill>
+                  <a:srgbClr val="F2F2F2"/>
+                </a:solidFill>
+                <a:latin typeface="Verdana" panose="020B0604030504040204" pitchFamily="34" charset="0"/>
+              </a:rPr>
+              <a:t>punto de vista falso, tergiversado</a:t>
+            </a:r>
+            <a:r>
+              <a:rPr lang="es-VE" sz="2000" dirty="0">
+                <a:solidFill>
+                  <a:srgbClr val="F2F2F2"/>
+                </a:solidFill>
+                <a:latin typeface="Verdana" panose="020B0604030504040204" pitchFamily="34" charset="0"/>
+              </a:rPr>
+              <a:t>, del panteísmo. Aunque el texto sagrado nos enseña que </a:t>
+            </a:r>
+            <a:r>
+              <a:rPr lang="es-VE" sz="2000" b="1" dirty="0">
+                <a:solidFill>
+                  <a:srgbClr val="F2F2F2"/>
+                </a:solidFill>
+                <a:latin typeface="Verdana" panose="020B0604030504040204" pitchFamily="34" charset="0"/>
+              </a:rPr>
+              <a:t>Dios se revela en la naturaleza</a:t>
+            </a:r>
+            <a:r>
+              <a:rPr lang="es-VE" sz="2000" dirty="0">
+                <a:solidFill>
+                  <a:srgbClr val="F2F2F2"/>
+                </a:solidFill>
+                <a:latin typeface="Verdana" panose="020B0604030504040204" pitchFamily="34" charset="0"/>
+              </a:rPr>
+              <a:t>, al mismo tiempo hace una distinción entre Dios y la naturaleza. El panteísmo dice que Dios es el universo; la Biblia expresa que </a:t>
+            </a:r>
+            <a:r>
+              <a:rPr lang="es-VE" sz="2000" b="1" dirty="0">
+                <a:solidFill>
+                  <a:srgbClr val="F2F2F2"/>
+                </a:solidFill>
+                <a:latin typeface="Verdana" panose="020B0604030504040204" pitchFamily="34" charset="0"/>
+              </a:rPr>
+              <a:t>Dios hizo el universo</a:t>
+            </a:r>
+            <a:r>
+              <a:rPr lang="es-VE" sz="2000" dirty="0">
+                <a:solidFill>
+                  <a:srgbClr val="F2F2F2"/>
+                </a:solidFill>
+                <a:latin typeface="Verdana" panose="020B0604030504040204" pitchFamily="34" charset="0"/>
+              </a:rPr>
+              <a:t>. </a:t>
+            </a:r>
+            <a:r>
+              <a:rPr lang="es-VE" sz="2000" b="1" dirty="0">
+                <a:solidFill>
+                  <a:srgbClr val="FFFF00"/>
+                </a:solidFill>
+                <a:latin typeface="Verdana" panose="020B0604030504040204" pitchFamily="34" charset="0"/>
+              </a:rPr>
+              <a:t>[Gn 1:1]</a:t>
+            </a:r>
+          </a:p>
+        </p:txBody>
+      </p:sp>
+    </p:spTree>
+    <p:extLst>
+      <p:ext uri="{BB962C8B-B14F-4D97-AF65-F5344CB8AC3E}">
+        <p14:creationId xmlns:p14="http://schemas.microsoft.com/office/powerpoint/2010/main" val="2934310288"/>
+      </p:ext>
+    </p:extLst>
+  </p:cSld>
+  <p:clrMapOvr>
+    <a:masterClrMapping/>
+  </p:clrMapOvr>
+</p:sld>
+</file>
+
+<file path=ppt/slides/slide15.xml><?xml version="1.0" encoding="utf-8"?>
+<p:sld xmlns:a="http://schemas.openxmlformats.org/drawingml/2006/main" xmlns:r="http://schemas.openxmlformats.org/officeDocument/2006/relationships" xmlns:p="http://schemas.openxmlformats.org/presentationml/2006/main">
+  <p:cSld>
+    <p:bg>
+      <p:bgPr>
+        <a:gradFill flip="none" rotWithShape="1">
+          <a:gsLst>
+            <a:gs pos="0">
+              <a:schemeClr val="accent6">
+                <a:lumMod val="89000"/>
+              </a:schemeClr>
+            </a:gs>
+            <a:gs pos="23000">
+              <a:schemeClr val="accent6">
+                <a:lumMod val="89000"/>
+              </a:schemeClr>
+            </a:gs>
+            <a:gs pos="69000">
+              <a:schemeClr val="accent6">
+                <a:lumMod val="75000"/>
+              </a:schemeClr>
+            </a:gs>
+            <a:gs pos="97000">
+              <a:schemeClr val="accent6">
+                <a:lumMod val="70000"/>
+              </a:schemeClr>
+            </a:gs>
+          </a:gsLst>
+          <a:path path="circle">
+            <a:fillToRect l="50000" t="50000" r="50000" b="50000"/>
+          </a:path>
+          <a:tileRect/>
+        </a:gradFill>
+        <a:effectLst/>
+      </p:bgPr>
+    </p:bg>
+    <p:spTree>
+      <p:nvGrpSpPr>
+        <p:cNvPr id="1" name=""/>
+        <p:cNvGrpSpPr/>
+        <p:nvPr/>
+      </p:nvGrpSpPr>
+      <p:grpSpPr>
+        <a:xfrm>
+          <a:off x="0" y="0"/>
+          <a:ext cx="0" cy="0"/>
+          <a:chOff x="0" y="0"/>
+          <a:chExt cx="0" cy="0"/>
+        </a:xfrm>
+      </p:grpSpPr>
+      <p:sp>
+        <p:nvSpPr>
+          <p:cNvPr id="2" name="Título 1">
+            <a:extLst>
+              <a:ext uri="{FF2B5EF4-FFF2-40B4-BE49-F238E27FC236}">
+                <a16:creationId xmlns:a16="http://schemas.microsoft.com/office/drawing/2014/main" id="{C65A0631-47E2-4854-94DA-DD27A379FEF1}"/>
+              </a:ext>
+            </a:extLst>
+          </p:cNvPr>
+          <p:cNvSpPr>
+            <a:spLocks noGrp="1"/>
+          </p:cNvSpPr>
+          <p:nvPr>
+            <p:ph type="title"/>
+          </p:nvPr>
+        </p:nvSpPr>
+        <p:spPr>
+          <a:xfrm>
+            <a:off x="391887" y="309281"/>
+            <a:ext cx="8360228" cy="1160931"/>
+          </a:xfrm>
+        </p:spPr>
+        <p:txBody>
+          <a:bodyPr anchor="ctr">
+            <a:normAutofit fontScale="90000"/>
+          </a:bodyPr>
+          <a:lstStyle/>
+          <a:p>
+            <a:r>
+              <a:rPr lang="es-VE" sz="6000" b="1" dirty="0"/>
+              <a:t>3. CREENCIAS ERRÓNEAS</a:t>
+            </a:r>
+            <a:br>
+              <a:rPr lang="es-VE" sz="6600" b="1" dirty="0"/>
+            </a:br>
+            <a:r>
+              <a:rPr lang="es-VE" b="1" i="1" dirty="0"/>
+              <a:t>3.4. </a:t>
+            </a:r>
+            <a:r>
+              <a:rPr lang="en-US" b="1" i="1" dirty="0"/>
+              <a:t> </a:t>
+            </a:r>
+            <a:r>
+              <a:rPr lang="es-VE" b="1" i="1" dirty="0"/>
+              <a:t>Materialismo</a:t>
+            </a:r>
+            <a:endParaRPr lang="es-VE" sz="6600" b="1" dirty="0"/>
+          </a:p>
+        </p:txBody>
+      </p:sp>
+      <p:sp>
+        <p:nvSpPr>
+          <p:cNvPr id="3" name="Marcador de contenido 2">
+            <a:extLst>
+              <a:ext uri="{FF2B5EF4-FFF2-40B4-BE49-F238E27FC236}">
+                <a16:creationId xmlns:a16="http://schemas.microsoft.com/office/drawing/2014/main" id="{AA130F57-7D31-4139-81B2-4D70486C00F2}"/>
+              </a:ext>
+            </a:extLst>
+          </p:cNvPr>
+          <p:cNvSpPr>
+            <a:spLocks noGrp="1"/>
+          </p:cNvSpPr>
+          <p:nvPr>
+            <p:ph idx="1"/>
+          </p:nvPr>
+        </p:nvSpPr>
+        <p:spPr>
+          <a:xfrm>
+            <a:off x="391887" y="1604685"/>
+            <a:ext cx="8360228" cy="3935505"/>
+          </a:xfrm>
+        </p:spPr>
+        <p:txBody>
+          <a:bodyPr anchor="ctr">
+            <a:normAutofit/>
+          </a:bodyPr>
+          <a:lstStyle/>
+          <a:p>
+            <a:pPr marL="0" indent="0">
+              <a:buNone/>
+            </a:pPr>
+            <a:r>
+              <a:rPr lang="es-VE" dirty="0"/>
+              <a:t>El materialismo es la doctrina filosófica según la cual </a:t>
+            </a:r>
+            <a:r>
+              <a:rPr lang="es-VE" b="1" dirty="0"/>
+              <a:t>la materia es lo primario</a:t>
+            </a:r>
+            <a:r>
+              <a:rPr lang="es-VE" dirty="0"/>
+              <a:t> y que la conciencia existe como consecuencia de un estado altamente organizado de esta, lo que produce un cambio del modo de ser o de las propiedades de un objeto, un individuo, una entidad o un estado.</a:t>
+            </a:r>
+          </a:p>
+          <a:p>
+            <a:pPr marL="0" indent="0">
+              <a:buNone/>
+            </a:pPr>
+            <a:endParaRPr lang="es-VE" dirty="0"/>
+          </a:p>
+          <a:p>
+            <a:pPr marL="0" indent="0">
+              <a:buNone/>
+            </a:pPr>
+            <a:r>
+              <a:rPr lang="es-VE" b="1" dirty="0"/>
+              <a:t>¿Cuál es el antídoto para el materialismo?</a:t>
+            </a:r>
+            <a:r>
+              <a:rPr lang="es-VE" dirty="0"/>
+              <a:t> ¡El evangelio predicado en la demostración del Espíritu y con señales que lo siguen! </a:t>
+            </a:r>
+            <a:r>
+              <a:rPr lang="es-VE" dirty="0">
+                <a:solidFill>
+                  <a:srgbClr val="FFFF00"/>
+                </a:solidFill>
+              </a:rPr>
+              <a:t>[</a:t>
+            </a:r>
+            <a:r>
+              <a:rPr lang="es-VE" b="1" dirty="0">
+                <a:solidFill>
+                  <a:srgbClr val="FFFF00"/>
+                </a:solidFill>
+              </a:rPr>
+              <a:t>Mar 16:20]</a:t>
+            </a:r>
+            <a:r>
+              <a:rPr lang="es-VE" dirty="0">
+                <a:solidFill>
+                  <a:srgbClr val="FFFF00"/>
+                </a:solidFill>
+              </a:rPr>
+              <a:t> “Y ellos, saliendo, predicaron en todas partes, ayudándoles el Señor y confirmando la palabra con las señales que la seguían. Amén. ”</a:t>
+            </a:r>
+          </a:p>
+        </p:txBody>
+      </p:sp>
+    </p:spTree>
+    <p:extLst>
+      <p:ext uri="{BB962C8B-B14F-4D97-AF65-F5344CB8AC3E}">
+        <p14:creationId xmlns:p14="http://schemas.microsoft.com/office/powerpoint/2010/main" val="722042348"/>
+      </p:ext>
+    </p:extLst>
+  </p:cSld>
+  <p:clrMapOvr>
+    <a:masterClrMapping/>
+  </p:clrMapOvr>
+</p:sld>
+</file>
+
+<file path=ppt/slides/slide16.xml><?xml version="1.0" encoding="utf-8"?>
+<p:sld xmlns:a="http://schemas.openxmlformats.org/drawingml/2006/main" xmlns:r="http://schemas.openxmlformats.org/officeDocument/2006/relationships" xmlns:p="http://schemas.openxmlformats.org/presentationml/2006/main">
+  <p:cSld>
+    <p:bg>
+      <p:bgPr>
+        <a:gradFill flip="none" rotWithShape="1">
+          <a:gsLst>
+            <a:gs pos="0">
+              <a:schemeClr val="accent6">
+                <a:lumMod val="89000"/>
+              </a:schemeClr>
+            </a:gs>
+            <a:gs pos="23000">
+              <a:schemeClr val="accent6">
+                <a:lumMod val="89000"/>
+              </a:schemeClr>
+            </a:gs>
+            <a:gs pos="69000">
+              <a:schemeClr val="accent6">
+                <a:lumMod val="75000"/>
+              </a:schemeClr>
+            </a:gs>
+            <a:gs pos="97000">
+              <a:schemeClr val="accent6">
+                <a:lumMod val="70000"/>
+              </a:schemeClr>
+            </a:gs>
+          </a:gsLst>
+          <a:path path="circle">
+            <a:fillToRect l="50000" t="50000" r="50000" b="50000"/>
+          </a:path>
+          <a:tileRect/>
+        </a:gradFill>
+        <a:effectLst/>
+      </p:bgPr>
+    </p:bg>
+    <p:spTree>
+      <p:nvGrpSpPr>
+        <p:cNvPr id="1" name=""/>
+        <p:cNvGrpSpPr/>
+        <p:nvPr/>
+      </p:nvGrpSpPr>
+      <p:grpSpPr>
+        <a:xfrm>
+          <a:off x="0" y="0"/>
+          <a:ext cx="0" cy="0"/>
+          <a:chOff x="0" y="0"/>
+          <a:chExt cx="0" cy="0"/>
+        </a:xfrm>
+      </p:grpSpPr>
+      <p:sp>
+        <p:nvSpPr>
+          <p:cNvPr id="2" name="Título 1">
+            <a:extLst>
+              <a:ext uri="{FF2B5EF4-FFF2-40B4-BE49-F238E27FC236}">
+                <a16:creationId xmlns:a16="http://schemas.microsoft.com/office/drawing/2014/main" id="{C65A0631-47E2-4854-94DA-DD27A379FEF1}"/>
+              </a:ext>
+            </a:extLst>
+          </p:cNvPr>
+          <p:cNvSpPr>
+            <a:spLocks noGrp="1"/>
+          </p:cNvSpPr>
+          <p:nvPr>
+            <p:ph type="title"/>
+          </p:nvPr>
+        </p:nvSpPr>
+        <p:spPr>
+          <a:xfrm>
+            <a:off x="391887" y="309281"/>
+            <a:ext cx="8360228" cy="1160931"/>
+          </a:xfrm>
+        </p:spPr>
+        <p:txBody>
+          <a:bodyPr anchor="ctr">
+            <a:normAutofit fontScale="90000"/>
+          </a:bodyPr>
+          <a:lstStyle/>
+          <a:p>
+            <a:r>
+              <a:rPr lang="es-VE" sz="6000" b="1" dirty="0"/>
+              <a:t>3. CREENCIAS ERRÓNEAS</a:t>
+            </a:r>
+            <a:br>
+              <a:rPr lang="es-VE" sz="6600" b="1" dirty="0"/>
+            </a:br>
+            <a:r>
+              <a:rPr lang="es-VE" b="1" i="1" dirty="0"/>
+              <a:t>3.5.</a:t>
+            </a:r>
+            <a:r>
+              <a:rPr lang="en-US" b="1" i="1" dirty="0"/>
+              <a:t> </a:t>
+            </a:r>
+            <a:r>
+              <a:rPr lang="es-VE" b="1" i="1" dirty="0"/>
+              <a:t>Deísmo</a:t>
+            </a:r>
+            <a:endParaRPr lang="es-VE" sz="6600" b="1" dirty="0"/>
+          </a:p>
+        </p:txBody>
+      </p:sp>
+      <p:sp>
+        <p:nvSpPr>
+          <p:cNvPr id="3" name="Marcador de contenido 2">
+            <a:extLst>
+              <a:ext uri="{FF2B5EF4-FFF2-40B4-BE49-F238E27FC236}">
+                <a16:creationId xmlns:a16="http://schemas.microsoft.com/office/drawing/2014/main" id="{AA130F57-7D31-4139-81B2-4D70486C00F2}"/>
+              </a:ext>
+            </a:extLst>
+          </p:cNvPr>
+          <p:cNvSpPr>
+            <a:spLocks noGrp="1"/>
+          </p:cNvSpPr>
+          <p:nvPr>
+            <p:ph idx="1"/>
+          </p:nvPr>
+        </p:nvSpPr>
+        <p:spPr>
+          <a:xfrm>
+            <a:off x="391887" y="1604685"/>
+            <a:ext cx="8360228" cy="3935505"/>
+          </a:xfrm>
+        </p:spPr>
+        <p:txBody>
+          <a:bodyPr anchor="ctr">
+            <a:normAutofit/>
+          </a:bodyPr>
+          <a:lstStyle/>
+          <a:p>
+            <a:pPr marL="0" indent="0">
+              <a:buNone/>
+            </a:pPr>
+            <a:r>
+              <a:rPr lang="es-VE" dirty="0"/>
+              <a:t>El deísmo admite que </a:t>
+            </a:r>
+            <a:r>
+              <a:rPr lang="es-VE" b="1" dirty="0">
+                <a:solidFill>
+                  <a:schemeClr val="bg1"/>
+                </a:solidFill>
+                <a:highlight>
+                  <a:srgbClr val="FFFF00"/>
+                </a:highlight>
+              </a:rPr>
+              <a:t>hay un Dios personal, que creó al mundo</a:t>
+            </a:r>
+            <a:r>
+              <a:rPr lang="es-VE" dirty="0"/>
+              <a:t>; pero insiste en que después de la creación lo dejó para que </a:t>
+            </a:r>
+            <a:r>
+              <a:rPr lang="es-VE" dirty="0">
+                <a:solidFill>
+                  <a:schemeClr val="bg1"/>
+                </a:solidFill>
+                <a:highlight>
+                  <a:srgbClr val="FFFF00"/>
+                </a:highlight>
+              </a:rPr>
+              <a:t>se gobernara por las leyes naturales</a:t>
+            </a:r>
+            <a:r>
+              <a:rPr lang="es-VE" dirty="0"/>
+              <a:t>. De ahí que no sea posible revelación o milagro alguno. </a:t>
+            </a:r>
+          </a:p>
+          <a:p>
+            <a:pPr marL="0" indent="0">
+              <a:buNone/>
+            </a:pPr>
+            <a:endParaRPr lang="es-VE" dirty="0"/>
+          </a:p>
+          <a:p>
+            <a:pPr marL="0" indent="0">
+              <a:buNone/>
+            </a:pPr>
+            <a:r>
+              <a:rPr lang="es-VE" dirty="0"/>
+              <a:t>Dios está separado del mundo y es realmente superior a él; pero por otra parte, está en el mundo. </a:t>
+            </a:r>
+            <a:r>
+              <a:rPr lang="es-VE" b="1" dirty="0"/>
+              <a:t>Envió al Hijo</a:t>
+            </a:r>
+            <a:r>
+              <a:rPr lang="es-VE" dirty="0"/>
+              <a:t> para que estuviera con nosotros, y </a:t>
+            </a:r>
+            <a:r>
+              <a:rPr lang="es-VE" b="1" dirty="0"/>
+              <a:t>el Hijo envió al Espíritu Santo</a:t>
+            </a:r>
+            <a:r>
+              <a:rPr lang="es-VE" dirty="0"/>
+              <a:t> para que estuviera en nosotros. A la pregunta de </a:t>
+            </a:r>
+            <a:r>
+              <a:rPr lang="es-VE" b="1" dirty="0"/>
+              <a:t>¿está Dios fuera del mundo o en él?</a:t>
+            </a:r>
+            <a:r>
+              <a:rPr lang="es-VE" dirty="0"/>
+              <a:t> la Biblia responde: Está fuera y dentro del mundo.</a:t>
+            </a:r>
+          </a:p>
+        </p:txBody>
+      </p:sp>
+    </p:spTree>
+    <p:extLst>
+      <p:ext uri="{BB962C8B-B14F-4D97-AF65-F5344CB8AC3E}">
+        <p14:creationId xmlns:p14="http://schemas.microsoft.com/office/powerpoint/2010/main" val="2482518816"/>
       </p:ext>
     </p:extLst>
   </p:cSld>
@@ -3389,18 +5504,6 @@
               <a:rPr lang="es-VE" sz="6600" b="1" dirty="0"/>
               <a:t>1. LA EXISTENCIA DE DIOS</a:t>
             </a:r>
-            <a:br>
-              <a:rPr lang="es-VE" sz="6600" b="1" dirty="0"/>
-            </a:br>
-            <a:r>
-              <a:rPr lang="es-VE" b="1" dirty="0"/>
-              <a:t>1.1. </a:t>
-            </a:r>
-            <a:r>
-              <a:rPr lang="es-VE" b="1" i="1" dirty="0"/>
-              <a:t>Su existencia evidente</a:t>
-            </a:r>
-            <a:endParaRPr lang="es-VE" sz="6600" b="1" dirty="0"/>
           </a:p>
         </p:txBody>
       </p:sp>
@@ -3422,8 +5525,8 @@
         </p:nvSpPr>
         <p:spPr>
           <a:xfrm>
-            <a:off x="391887" y="1828800"/>
-            <a:ext cx="8360228" cy="3576917"/>
+            <a:off x="391887" y="1714502"/>
+            <a:ext cx="8360228" cy="3691216"/>
           </a:xfrm>
         </p:spPr>
         <p:txBody>
@@ -3707,8 +5810,8 @@
         </p:nvSpPr>
         <p:spPr>
           <a:xfrm>
-            <a:off x="391887" y="309281"/>
-            <a:ext cx="8360228" cy="1160931"/>
+            <a:off x="228600" y="309281"/>
+            <a:ext cx="8686800" cy="1160931"/>
           </a:xfrm>
         </p:spPr>
         <p:txBody>

</xml_diff>

<commit_message>
4. Dios (Parte 2) y Examen 1
</commit_message>
<xml_diff>
--- a/slideshow/Teologia Sistematica y Biblica - Myer Pearlman/Clases/4. Dios.pptx
+++ b/slideshow/Teologia Sistematica y Biblica - Myer Pearlman/Clases/4. Dios.pptx
@@ -21,6 +21,18 @@
     <p:sldId id="271" r:id="rId15"/>
     <p:sldId id="272" r:id="rId16"/>
     <p:sldId id="273" r:id="rId17"/>
+    <p:sldId id="274" r:id="rId18"/>
+    <p:sldId id="275" r:id="rId19"/>
+    <p:sldId id="276" r:id="rId20"/>
+    <p:sldId id="277" r:id="rId21"/>
+    <p:sldId id="278" r:id="rId22"/>
+    <p:sldId id="279" r:id="rId23"/>
+    <p:sldId id="280" r:id="rId24"/>
+    <p:sldId id="281" r:id="rId25"/>
+    <p:sldId id="282" r:id="rId26"/>
+    <p:sldId id="283" r:id="rId27"/>
+    <p:sldId id="284" r:id="rId28"/>
+    <p:sldId id="285" r:id="rId29"/>
   </p:sldIdLst>
   <p:sldSz cx="9144000" cy="5715000" type="screen16x10"/>
   <p:notesSz cx="6858000" cy="9144000"/>
@@ -258,7 +270,7 @@
           <a:p>
             <a:fld id="{50DEE611-8BEF-4990-B4F5-91A0FAC492E5}" type="datetimeFigureOut">
               <a:rPr lang="es-VE" smtClean="0"/>
-              <a:t>5/3/2021</a:t>
+              <a:t>13/3/2021</a:t>
             </a:fld>
             <a:endParaRPr lang="es-VE" dirty="0"/>
           </a:p>
@@ -428,7 +440,7 @@
           <a:p>
             <a:fld id="{50DEE611-8BEF-4990-B4F5-91A0FAC492E5}" type="datetimeFigureOut">
               <a:rPr lang="es-VE" smtClean="0"/>
-              <a:t>5/3/2021</a:t>
+              <a:t>13/3/2021</a:t>
             </a:fld>
             <a:endParaRPr lang="es-VE" dirty="0"/>
           </a:p>
@@ -608,7 +620,7 @@
           <a:p>
             <a:fld id="{50DEE611-8BEF-4990-B4F5-91A0FAC492E5}" type="datetimeFigureOut">
               <a:rPr lang="es-VE" smtClean="0"/>
-              <a:t>5/3/2021</a:t>
+              <a:t>13/3/2021</a:t>
             </a:fld>
             <a:endParaRPr lang="es-VE" dirty="0"/>
           </a:p>
@@ -778,7 +790,7 @@
           <a:p>
             <a:fld id="{50DEE611-8BEF-4990-B4F5-91A0FAC492E5}" type="datetimeFigureOut">
               <a:rPr lang="es-VE" smtClean="0"/>
-              <a:t>5/3/2021</a:t>
+              <a:t>13/3/2021</a:t>
             </a:fld>
             <a:endParaRPr lang="es-VE" dirty="0"/>
           </a:p>
@@ -1024,7 +1036,7 @@
           <a:p>
             <a:fld id="{50DEE611-8BEF-4990-B4F5-91A0FAC492E5}" type="datetimeFigureOut">
               <a:rPr lang="es-VE" smtClean="0"/>
-              <a:t>5/3/2021</a:t>
+              <a:t>13/3/2021</a:t>
             </a:fld>
             <a:endParaRPr lang="es-VE" dirty="0"/>
           </a:p>
@@ -1256,7 +1268,7 @@
           <a:p>
             <a:fld id="{50DEE611-8BEF-4990-B4F5-91A0FAC492E5}" type="datetimeFigureOut">
               <a:rPr lang="es-VE" smtClean="0"/>
-              <a:t>5/3/2021</a:t>
+              <a:t>13/3/2021</a:t>
             </a:fld>
             <a:endParaRPr lang="es-VE" dirty="0"/>
           </a:p>
@@ -1623,7 +1635,7 @@
           <a:p>
             <a:fld id="{50DEE611-8BEF-4990-B4F5-91A0FAC492E5}" type="datetimeFigureOut">
               <a:rPr lang="es-VE" smtClean="0"/>
-              <a:t>5/3/2021</a:t>
+              <a:t>13/3/2021</a:t>
             </a:fld>
             <a:endParaRPr lang="es-VE" dirty="0"/>
           </a:p>
@@ -1741,7 +1753,7 @@
           <a:p>
             <a:fld id="{50DEE611-8BEF-4990-B4F5-91A0FAC492E5}" type="datetimeFigureOut">
               <a:rPr lang="es-VE" smtClean="0"/>
-              <a:t>5/3/2021</a:t>
+              <a:t>13/3/2021</a:t>
             </a:fld>
             <a:endParaRPr lang="es-VE" dirty="0"/>
           </a:p>
@@ -1836,7 +1848,7 @@
           <a:p>
             <a:fld id="{50DEE611-8BEF-4990-B4F5-91A0FAC492E5}" type="datetimeFigureOut">
               <a:rPr lang="es-VE" smtClean="0"/>
-              <a:t>5/3/2021</a:t>
+              <a:t>13/3/2021</a:t>
             </a:fld>
             <a:endParaRPr lang="es-VE" dirty="0"/>
           </a:p>
@@ -2113,7 +2125,7 @@
           <a:p>
             <a:fld id="{50DEE611-8BEF-4990-B4F5-91A0FAC492E5}" type="datetimeFigureOut">
               <a:rPr lang="es-VE" smtClean="0"/>
-              <a:t>5/3/2021</a:t>
+              <a:t>13/3/2021</a:t>
             </a:fld>
             <a:endParaRPr lang="es-VE" dirty="0"/>
           </a:p>
@@ -2370,7 +2382,7 @@
           <a:p>
             <a:fld id="{50DEE611-8BEF-4990-B4F5-91A0FAC492E5}" type="datetimeFigureOut">
               <a:rPr lang="es-VE" smtClean="0"/>
-              <a:t>5/3/2021</a:t>
+              <a:t>13/3/2021</a:t>
             </a:fld>
             <a:endParaRPr lang="es-VE" dirty="0"/>
           </a:p>
@@ -2586,7 +2598,7 @@
           <a:p>
             <a:fld id="{50DEE611-8BEF-4990-B4F5-91A0FAC492E5}" type="datetimeFigureOut">
               <a:rPr lang="es-VE" smtClean="0"/>
-              <a:t>5/3/2021</a:t>
+              <a:t>13/3/2021</a:t>
             </a:fld>
             <a:endParaRPr lang="es-VE" dirty="0"/>
           </a:p>
@@ -5322,7 +5334,7 @@
 </p:sld>
 </file>
 
-<file path=ppt/slides/slide2.xml><?xml version="1.0" encoding="utf-8"?>
+<file path=ppt/slides/slide17.xml><?xml version="1.0" encoding="utf-8"?>
 <p:sld xmlns:a="http://schemas.openxmlformats.org/drawingml/2006/main" xmlns:r="http://schemas.openxmlformats.org/officeDocument/2006/relationships" xmlns:p="http://schemas.openxmlformats.org/presentationml/2006/main">
   <p:cSld>
     <p:bg>
@@ -5330,22 +5342,22 @@
         <a:gradFill flip="none" rotWithShape="1">
           <a:gsLst>
             <a:gs pos="0">
-              <a:schemeClr val="accent1">
+              <a:schemeClr val="accent3">
                 <a:lumMod val="89000"/>
               </a:schemeClr>
             </a:gs>
             <a:gs pos="23000">
-              <a:schemeClr val="accent1">
+              <a:schemeClr val="accent3">
                 <a:lumMod val="89000"/>
               </a:schemeClr>
             </a:gs>
             <a:gs pos="69000">
-              <a:schemeClr val="accent1">
+              <a:schemeClr val="accent3">
                 <a:lumMod val="75000"/>
               </a:schemeClr>
             </a:gs>
             <a:gs pos="97000">
-              <a:schemeClr val="accent1">
+              <a:schemeClr val="accent3">
                 <a:lumMod val="70000"/>
               </a:schemeClr>
             </a:gs>
@@ -5401,6 +5413,525 @@
           <a:lstStyle/>
           <a:p>
             <a:r>
+              <a:rPr lang="es-VE" sz="8000" b="1" dirty="0">
+                <a:latin typeface="+mn-lt"/>
+              </a:rPr>
+              <a:t>3. LOS ATRIBUTOS DE DIOS</a:t>
+            </a:r>
+          </a:p>
+        </p:txBody>
+      </p:sp>
+    </p:spTree>
+    <p:extLst>
+      <p:ext uri="{BB962C8B-B14F-4D97-AF65-F5344CB8AC3E}">
+        <p14:creationId xmlns:p14="http://schemas.microsoft.com/office/powerpoint/2010/main" val="3621874"/>
+      </p:ext>
+    </p:extLst>
+  </p:cSld>
+  <p:clrMapOvr>
+    <a:masterClrMapping/>
+  </p:clrMapOvr>
+</p:sld>
+</file>
+
+<file path=ppt/slides/slide18.xml><?xml version="1.0" encoding="utf-8"?>
+<p:sld xmlns:a="http://schemas.openxmlformats.org/drawingml/2006/main" xmlns:r="http://schemas.openxmlformats.org/officeDocument/2006/relationships" xmlns:p="http://schemas.openxmlformats.org/presentationml/2006/main">
+  <p:cSld>
+    <p:bg>
+      <p:bgPr>
+        <a:gradFill flip="none" rotWithShape="1">
+          <a:gsLst>
+            <a:gs pos="0">
+              <a:schemeClr val="accent3">
+                <a:lumMod val="89000"/>
+              </a:schemeClr>
+            </a:gs>
+            <a:gs pos="23000">
+              <a:schemeClr val="accent3">
+                <a:lumMod val="89000"/>
+              </a:schemeClr>
+            </a:gs>
+            <a:gs pos="69000">
+              <a:schemeClr val="accent3">
+                <a:lumMod val="75000"/>
+              </a:schemeClr>
+            </a:gs>
+            <a:gs pos="97000">
+              <a:schemeClr val="accent3">
+                <a:lumMod val="70000"/>
+              </a:schemeClr>
+            </a:gs>
+          </a:gsLst>
+          <a:path path="circle">
+            <a:fillToRect l="50000" t="50000" r="50000" b="50000"/>
+          </a:path>
+          <a:tileRect/>
+        </a:gradFill>
+        <a:effectLst/>
+      </p:bgPr>
+    </p:bg>
+    <p:spTree>
+      <p:nvGrpSpPr>
+        <p:cNvPr id="1" name=""/>
+        <p:cNvGrpSpPr/>
+        <p:nvPr/>
+      </p:nvGrpSpPr>
+      <p:grpSpPr>
+        <a:xfrm>
+          <a:off x="0" y="0"/>
+          <a:ext cx="0" cy="0"/>
+          <a:chOff x="0" y="0"/>
+          <a:chExt cx="0" cy="0"/>
+        </a:xfrm>
+      </p:grpSpPr>
+      <p:sp>
+        <p:nvSpPr>
+          <p:cNvPr id="2" name="Título 1">
+            <a:extLst>
+              <a:ext uri="{FF2B5EF4-FFF2-40B4-BE49-F238E27FC236}">
+                <a16:creationId xmlns:a16="http://schemas.microsoft.com/office/drawing/2014/main" id="{C65A0631-47E2-4854-94DA-DD27A379FEF1}"/>
+              </a:ext>
+            </a:extLst>
+          </p:cNvPr>
+          <p:cNvSpPr>
+            <a:spLocks noGrp="1"/>
+          </p:cNvSpPr>
+          <p:nvPr>
+            <p:ph type="title"/>
+          </p:nvPr>
+        </p:nvSpPr>
+        <p:spPr>
+          <a:xfrm>
+            <a:off x="228600" y="309281"/>
+            <a:ext cx="8686800" cy="1187009"/>
+          </a:xfrm>
+        </p:spPr>
+        <p:txBody>
+          <a:bodyPr anchor="ctr">
+            <a:normAutofit fontScale="90000"/>
+          </a:bodyPr>
+          <a:lstStyle/>
+          <a:p>
+            <a:r>
+              <a:rPr lang="es-VE" sz="6000" b="1" dirty="0"/>
+              <a:t>3. LOS ATRIBUTOS DE DIOS</a:t>
+            </a:r>
+            <a:br>
+              <a:rPr lang="es-VE" sz="6000" b="1" dirty="0"/>
+            </a:br>
+            <a:r>
+              <a:rPr lang="es-VE" sz="3100" b="1" dirty="0">
+                <a:solidFill>
+                  <a:srgbClr val="FFFF00"/>
+                </a:solidFill>
+              </a:rPr>
+              <a:t>Introducción</a:t>
+            </a:r>
+            <a:endParaRPr lang="es-VE" sz="6600" b="1" dirty="0">
+              <a:solidFill>
+                <a:srgbClr val="FFFF00"/>
+              </a:solidFill>
+            </a:endParaRPr>
+          </a:p>
+        </p:txBody>
+      </p:sp>
+      <p:sp>
+        <p:nvSpPr>
+          <p:cNvPr id="3" name="Marcador de contenido 2">
+            <a:extLst>
+              <a:ext uri="{FF2B5EF4-FFF2-40B4-BE49-F238E27FC236}">
+                <a16:creationId xmlns:a16="http://schemas.microsoft.com/office/drawing/2014/main" id="{AA130F57-7D31-4139-81B2-4D70486C00F2}"/>
+              </a:ext>
+            </a:extLst>
+          </p:cNvPr>
+          <p:cNvSpPr>
+            <a:spLocks noGrp="1"/>
+          </p:cNvSpPr>
+          <p:nvPr>
+            <p:ph idx="1"/>
+          </p:nvPr>
+        </p:nvSpPr>
+        <p:spPr>
+          <a:xfrm>
+            <a:off x="228600" y="1496291"/>
+            <a:ext cx="8686800" cy="4043900"/>
+          </a:xfrm>
+        </p:spPr>
+        <p:txBody>
+          <a:bodyPr anchor="ctr">
+            <a:normAutofit/>
+          </a:bodyPr>
+          <a:lstStyle/>
+          <a:p>
+            <a:pPr marL="0" indent="0">
+              <a:buNone/>
+            </a:pPr>
+            <a:r>
+              <a:rPr lang="es-VE" sz="2800" dirty="0">
+                <a:solidFill>
+                  <a:srgbClr val="F2F2F2"/>
+                </a:solidFill>
+              </a:rPr>
+              <a:t>Dios se ha revelado en un idioma que </a:t>
+            </a:r>
+            <a:r>
+              <a:rPr lang="es-VE" sz="2800" b="1" dirty="0">
+                <a:solidFill>
+                  <a:srgbClr val="F2F2F2"/>
+                </a:solidFill>
+              </a:rPr>
+              <a:t>podemos entender</a:t>
+            </a:r>
+            <a:r>
+              <a:rPr lang="es-VE" sz="2800" dirty="0">
+                <a:solidFill>
+                  <a:srgbClr val="F2F2F2"/>
+                </a:solidFill>
+              </a:rPr>
+              <a:t>, y esa revelación está contenida en </a:t>
+            </a:r>
+            <a:r>
+              <a:rPr lang="es-VE" sz="2800" b="1" dirty="0">
+                <a:solidFill>
+                  <a:srgbClr val="F2F2F2"/>
+                </a:solidFill>
+              </a:rPr>
+              <a:t>las Escrituras</a:t>
+            </a:r>
+            <a:r>
+              <a:rPr lang="es-VE" sz="2800" dirty="0">
+                <a:solidFill>
+                  <a:srgbClr val="F2F2F2"/>
+                </a:solidFill>
+              </a:rPr>
+              <a:t>. Por ejemplo, Dios dice de sí mismo: </a:t>
+            </a:r>
+            <a:r>
+              <a:rPr lang="es-VE" sz="2800" b="1" dirty="0">
+                <a:solidFill>
+                  <a:srgbClr val="F2F2F2"/>
+                </a:solidFill>
+              </a:rPr>
+              <a:t>“Yo soy santo.”</a:t>
+            </a:r>
+            <a:r>
+              <a:rPr lang="es-VE" sz="2800" dirty="0">
+                <a:solidFill>
+                  <a:srgbClr val="F2F2F2"/>
+                </a:solidFill>
+              </a:rPr>
+              <a:t> Por lo tanto podemos decir que </a:t>
+            </a:r>
+            <a:r>
+              <a:rPr lang="es-VE" sz="2800" b="1" dirty="0">
+                <a:solidFill>
+                  <a:srgbClr val="F2F2F2"/>
+                </a:solidFill>
+              </a:rPr>
+              <a:t>Dios es santo</a:t>
+            </a:r>
+            <a:r>
+              <a:rPr lang="es-VE" sz="2800" dirty="0">
+                <a:solidFill>
+                  <a:srgbClr val="F2F2F2"/>
+                </a:solidFill>
+              </a:rPr>
+              <a:t>.</a:t>
+            </a:r>
+          </a:p>
+          <a:p>
+            <a:pPr marL="0" indent="0">
+              <a:buNone/>
+            </a:pPr>
+            <a:endParaRPr lang="es-VE" sz="2800" dirty="0">
+              <a:solidFill>
+                <a:srgbClr val="F2F2F2"/>
+              </a:solidFill>
+            </a:endParaRPr>
+          </a:p>
+          <a:p>
+            <a:pPr marL="0" indent="0">
+              <a:buNone/>
+            </a:pPr>
+            <a:r>
+              <a:rPr lang="es-VE" sz="2800" dirty="0">
+                <a:solidFill>
+                  <a:srgbClr val="F2F2F2"/>
+                </a:solidFill>
+              </a:rPr>
+              <a:t>Podemos regular nuestros pensamientos e ideas con respecto a Dios con la ayuda de </a:t>
+            </a:r>
+            <a:r>
+              <a:rPr lang="es-VE" sz="2800" b="1" dirty="0">
+                <a:solidFill>
+                  <a:srgbClr val="F2F2F2"/>
+                </a:solidFill>
+              </a:rPr>
+              <a:t>la revelación que Dios ha dado de sí mismo</a:t>
+            </a:r>
+            <a:r>
+              <a:rPr lang="es-VE" sz="2800" dirty="0">
+                <a:solidFill>
+                  <a:srgbClr val="F2F2F2"/>
+                </a:solidFill>
+              </a:rPr>
+              <a:t>.</a:t>
+            </a:r>
+          </a:p>
+        </p:txBody>
+      </p:sp>
+    </p:spTree>
+    <p:extLst>
+      <p:ext uri="{BB962C8B-B14F-4D97-AF65-F5344CB8AC3E}">
+        <p14:creationId xmlns:p14="http://schemas.microsoft.com/office/powerpoint/2010/main" val="4231446692"/>
+      </p:ext>
+    </p:extLst>
+  </p:cSld>
+  <p:clrMapOvr>
+    <a:masterClrMapping/>
+  </p:clrMapOvr>
+</p:sld>
+</file>
+
+<file path=ppt/slides/slide19.xml><?xml version="1.0" encoding="utf-8"?>
+<p:sld xmlns:a="http://schemas.openxmlformats.org/drawingml/2006/main" xmlns:r="http://schemas.openxmlformats.org/officeDocument/2006/relationships" xmlns:p="http://schemas.openxmlformats.org/presentationml/2006/main">
+  <p:cSld>
+    <p:bg>
+      <p:bgPr>
+        <a:gradFill flip="none" rotWithShape="1">
+          <a:gsLst>
+            <a:gs pos="0">
+              <a:schemeClr val="accent3">
+                <a:lumMod val="89000"/>
+              </a:schemeClr>
+            </a:gs>
+            <a:gs pos="23000">
+              <a:schemeClr val="accent3">
+                <a:lumMod val="89000"/>
+              </a:schemeClr>
+            </a:gs>
+            <a:gs pos="69000">
+              <a:schemeClr val="accent3">
+                <a:lumMod val="75000"/>
+              </a:schemeClr>
+            </a:gs>
+            <a:gs pos="97000">
+              <a:schemeClr val="accent3">
+                <a:lumMod val="70000"/>
+              </a:schemeClr>
+            </a:gs>
+          </a:gsLst>
+          <a:path path="circle">
+            <a:fillToRect l="50000" t="50000" r="50000" b="50000"/>
+          </a:path>
+          <a:tileRect/>
+        </a:gradFill>
+        <a:effectLst/>
+      </p:bgPr>
+    </p:bg>
+    <p:spTree>
+      <p:nvGrpSpPr>
+        <p:cNvPr id="1" name=""/>
+        <p:cNvGrpSpPr/>
+        <p:nvPr/>
+      </p:nvGrpSpPr>
+      <p:grpSpPr>
+        <a:xfrm>
+          <a:off x="0" y="0"/>
+          <a:ext cx="0" cy="0"/>
+          <a:chOff x="0" y="0"/>
+          <a:chExt cx="0" cy="0"/>
+        </a:xfrm>
+      </p:grpSpPr>
+      <p:sp>
+        <p:nvSpPr>
+          <p:cNvPr id="2" name="Título 1">
+            <a:extLst>
+              <a:ext uri="{FF2B5EF4-FFF2-40B4-BE49-F238E27FC236}">
+                <a16:creationId xmlns:a16="http://schemas.microsoft.com/office/drawing/2014/main" id="{C65A0631-47E2-4854-94DA-DD27A379FEF1}"/>
+              </a:ext>
+            </a:extLst>
+          </p:cNvPr>
+          <p:cNvSpPr>
+            <a:spLocks noGrp="1"/>
+          </p:cNvSpPr>
+          <p:nvPr>
+            <p:ph type="title"/>
+          </p:nvPr>
+        </p:nvSpPr>
+        <p:spPr>
+          <a:xfrm>
+            <a:off x="228600" y="309281"/>
+            <a:ext cx="8686800" cy="1160931"/>
+          </a:xfrm>
+        </p:spPr>
+        <p:txBody>
+          <a:bodyPr anchor="ctr">
+            <a:normAutofit fontScale="90000"/>
+          </a:bodyPr>
+          <a:lstStyle/>
+          <a:p>
+            <a:r>
+              <a:rPr lang="es-VE" sz="6000" b="1" dirty="0"/>
+              <a:t>3. LOS ATRIBUTOS DE DIOS</a:t>
+            </a:r>
+            <a:br>
+              <a:rPr lang="es-VE" sz="6600" b="1" dirty="0"/>
+            </a:br>
+            <a:r>
+              <a:rPr lang="es-VE" sz="3100" b="1" dirty="0"/>
+              <a:t>¿Diferencia entre el nombre de Dios y los atributos de Dios?</a:t>
+            </a:r>
+            <a:endParaRPr lang="es-VE" sz="6600" b="1" dirty="0"/>
+          </a:p>
+        </p:txBody>
+      </p:sp>
+      <p:sp>
+        <p:nvSpPr>
+          <p:cNvPr id="3" name="Marcador de contenido 2">
+            <a:extLst>
+              <a:ext uri="{FF2B5EF4-FFF2-40B4-BE49-F238E27FC236}">
+                <a16:creationId xmlns:a16="http://schemas.microsoft.com/office/drawing/2014/main" id="{AA130F57-7D31-4139-81B2-4D70486C00F2}"/>
+              </a:ext>
+            </a:extLst>
+          </p:cNvPr>
+          <p:cNvSpPr>
+            <a:spLocks noGrp="1"/>
+          </p:cNvSpPr>
+          <p:nvPr>
+            <p:ph idx="1"/>
+          </p:nvPr>
+        </p:nvSpPr>
+        <p:spPr>
+          <a:xfrm>
+            <a:off x="228600" y="1604685"/>
+            <a:ext cx="8686800" cy="3935505"/>
+          </a:xfrm>
+        </p:spPr>
+        <p:txBody>
+          <a:bodyPr anchor="ctr">
+            <a:normAutofit/>
+          </a:bodyPr>
+          <a:lstStyle/>
+          <a:p>
+            <a:pPr marL="0" indent="0" algn="ctr">
+              <a:buNone/>
+            </a:pPr>
+            <a:r>
+              <a:rPr lang="es-VE" sz="4000" dirty="0"/>
+              <a:t>El nombre de Dios expresa </a:t>
+            </a:r>
+            <a:r>
+              <a:rPr lang="es-VE" sz="4000" b="1" dirty="0"/>
+              <a:t>todo su ser</a:t>
+            </a:r>
+            <a:r>
+              <a:rPr lang="es-VE" sz="4000" dirty="0"/>
+              <a:t>, mientras que sus </a:t>
+            </a:r>
+            <a:r>
+              <a:rPr lang="es-VE" sz="4000" b="1" dirty="0"/>
+              <a:t>atributos </a:t>
+            </a:r>
+            <a:r>
+              <a:rPr lang="es-VE" sz="4000" dirty="0"/>
+              <a:t>indican varias facetas o aspectos de su carácter.</a:t>
+            </a:r>
+          </a:p>
+        </p:txBody>
+      </p:sp>
+    </p:spTree>
+    <p:extLst>
+      <p:ext uri="{BB962C8B-B14F-4D97-AF65-F5344CB8AC3E}">
+        <p14:creationId xmlns:p14="http://schemas.microsoft.com/office/powerpoint/2010/main" val="94313125"/>
+      </p:ext>
+    </p:extLst>
+  </p:cSld>
+  <p:clrMapOvr>
+    <a:masterClrMapping/>
+  </p:clrMapOvr>
+</p:sld>
+</file>
+
+<file path=ppt/slides/slide2.xml><?xml version="1.0" encoding="utf-8"?>
+<p:sld xmlns:a="http://schemas.openxmlformats.org/drawingml/2006/main" xmlns:r="http://schemas.openxmlformats.org/officeDocument/2006/relationships" xmlns:p="http://schemas.openxmlformats.org/presentationml/2006/main">
+  <p:cSld>
+    <p:bg>
+      <p:bgPr>
+        <a:gradFill flip="none" rotWithShape="1">
+          <a:gsLst>
+            <a:gs pos="0">
+              <a:schemeClr val="accent1">
+                <a:lumMod val="89000"/>
+              </a:schemeClr>
+            </a:gs>
+            <a:gs pos="23000">
+              <a:schemeClr val="accent1">
+                <a:lumMod val="89000"/>
+              </a:schemeClr>
+            </a:gs>
+            <a:gs pos="69000">
+              <a:schemeClr val="accent1">
+                <a:lumMod val="75000"/>
+              </a:schemeClr>
+            </a:gs>
+            <a:gs pos="97000">
+              <a:schemeClr val="accent1">
+                <a:lumMod val="70000"/>
+              </a:schemeClr>
+            </a:gs>
+          </a:gsLst>
+          <a:path path="circle">
+            <a:fillToRect l="50000" t="50000" r="50000" b="50000"/>
+          </a:path>
+          <a:tileRect/>
+        </a:gradFill>
+        <a:effectLst/>
+      </p:bgPr>
+    </p:bg>
+    <p:spTree>
+      <p:nvGrpSpPr>
+        <p:cNvPr id="1" name=""/>
+        <p:cNvGrpSpPr/>
+        <p:nvPr/>
+      </p:nvGrpSpPr>
+      <p:grpSpPr>
+        <a:xfrm>
+          <a:off x="0" y="0"/>
+          <a:ext cx="0" cy="0"/>
+          <a:chOff x="0" y="0"/>
+          <a:chExt cx="0" cy="0"/>
+        </a:xfrm>
+      </p:grpSpPr>
+      <p:sp>
+        <p:nvSpPr>
+          <p:cNvPr id="2" name="Título 1">
+            <a:extLst>
+              <a:ext uri="{FF2B5EF4-FFF2-40B4-BE49-F238E27FC236}">
+                <a16:creationId xmlns:a16="http://schemas.microsoft.com/office/drawing/2014/main" id="{FD39663B-C752-4318-8673-4C9548A38A4C}"/>
+              </a:ext>
+            </a:extLst>
+          </p:cNvPr>
+          <p:cNvSpPr>
+            <a:spLocks noGrp="1"/>
+          </p:cNvSpPr>
+          <p:nvPr>
+            <p:ph type="ctrTitle"/>
+          </p:nvPr>
+        </p:nvSpPr>
+        <p:spPr>
+          <a:xfrm>
+            <a:off x="313766" y="408214"/>
+            <a:ext cx="8516471" cy="4947557"/>
+          </a:xfrm>
+        </p:spPr>
+        <p:txBody>
+          <a:bodyPr anchor="ctr">
+            <a:noAutofit/>
+          </a:bodyPr>
+          <a:lstStyle/>
+          <a:p>
+            <a:r>
               <a:rPr lang="es-VE" sz="8800" b="1" dirty="0">
                 <a:latin typeface="+mn-lt"/>
               </a:rPr>
@@ -5413,6 +5944,2095 @@
     <p:extLst>
       <p:ext uri="{BB962C8B-B14F-4D97-AF65-F5344CB8AC3E}">
         <p14:creationId xmlns:p14="http://schemas.microsoft.com/office/powerpoint/2010/main" val="3365219149"/>
+      </p:ext>
+    </p:extLst>
+  </p:cSld>
+  <p:clrMapOvr>
+    <a:masterClrMapping/>
+  </p:clrMapOvr>
+</p:sld>
+</file>
+
+<file path=ppt/slides/slide20.xml><?xml version="1.0" encoding="utf-8"?>
+<p:sld xmlns:a="http://schemas.openxmlformats.org/drawingml/2006/main" xmlns:r="http://schemas.openxmlformats.org/officeDocument/2006/relationships" xmlns:p="http://schemas.openxmlformats.org/presentationml/2006/main">
+  <p:cSld>
+    <p:bg>
+      <p:bgPr>
+        <a:gradFill flip="none" rotWithShape="1">
+          <a:gsLst>
+            <a:gs pos="0">
+              <a:schemeClr val="accent3">
+                <a:lumMod val="89000"/>
+              </a:schemeClr>
+            </a:gs>
+            <a:gs pos="23000">
+              <a:schemeClr val="accent3">
+                <a:lumMod val="89000"/>
+              </a:schemeClr>
+            </a:gs>
+            <a:gs pos="69000">
+              <a:schemeClr val="accent3">
+                <a:lumMod val="75000"/>
+              </a:schemeClr>
+            </a:gs>
+            <a:gs pos="97000">
+              <a:schemeClr val="accent3">
+                <a:lumMod val="70000"/>
+              </a:schemeClr>
+            </a:gs>
+          </a:gsLst>
+          <a:path path="circle">
+            <a:fillToRect l="50000" t="50000" r="50000" b="50000"/>
+          </a:path>
+          <a:tileRect/>
+        </a:gradFill>
+        <a:effectLst/>
+      </p:bgPr>
+    </p:bg>
+    <p:spTree>
+      <p:nvGrpSpPr>
+        <p:cNvPr id="1" name=""/>
+        <p:cNvGrpSpPr/>
+        <p:nvPr/>
+      </p:nvGrpSpPr>
+      <p:grpSpPr>
+        <a:xfrm>
+          <a:off x="0" y="0"/>
+          <a:ext cx="0" cy="0"/>
+          <a:chOff x="0" y="0"/>
+          <a:chExt cx="0" cy="0"/>
+        </a:xfrm>
+      </p:grpSpPr>
+      <p:sp>
+        <p:nvSpPr>
+          <p:cNvPr id="2" name="Título 1">
+            <a:extLst>
+              <a:ext uri="{FF2B5EF4-FFF2-40B4-BE49-F238E27FC236}">
+                <a16:creationId xmlns:a16="http://schemas.microsoft.com/office/drawing/2014/main" id="{C65A0631-47E2-4854-94DA-DD27A379FEF1}"/>
+              </a:ext>
+            </a:extLst>
+          </p:cNvPr>
+          <p:cNvSpPr>
+            <a:spLocks noGrp="1"/>
+          </p:cNvSpPr>
+          <p:nvPr>
+            <p:ph type="title"/>
+          </p:nvPr>
+        </p:nvSpPr>
+        <p:spPr>
+          <a:xfrm>
+            <a:off x="228600" y="309281"/>
+            <a:ext cx="8686800" cy="1160931"/>
+          </a:xfrm>
+        </p:spPr>
+        <p:txBody>
+          <a:bodyPr anchor="ctr">
+            <a:normAutofit fontScale="90000"/>
+          </a:bodyPr>
+          <a:lstStyle/>
+          <a:p>
+            <a:r>
+              <a:rPr lang="es-VE" sz="6000" b="1" dirty="0"/>
+              <a:t>3. LOS ATRIBUTOS DE DIOS</a:t>
+            </a:r>
+            <a:br>
+              <a:rPr lang="es-VE" sz="6600" b="1" dirty="0"/>
+            </a:br>
+            <a:r>
+              <a:rPr lang="es-VE" sz="3100" b="1" dirty="0"/>
+              <a:t>Tipos de atributos</a:t>
+            </a:r>
+            <a:endParaRPr lang="es-VE" sz="6600" b="1" dirty="0"/>
+          </a:p>
+        </p:txBody>
+      </p:sp>
+      <p:sp>
+        <p:nvSpPr>
+          <p:cNvPr id="3" name="Marcador de contenido 2">
+            <a:extLst>
+              <a:ext uri="{FF2B5EF4-FFF2-40B4-BE49-F238E27FC236}">
+                <a16:creationId xmlns:a16="http://schemas.microsoft.com/office/drawing/2014/main" id="{AA130F57-7D31-4139-81B2-4D70486C00F2}"/>
+              </a:ext>
+            </a:extLst>
+          </p:cNvPr>
+          <p:cNvSpPr>
+            <a:spLocks noGrp="1"/>
+          </p:cNvSpPr>
+          <p:nvPr>
+            <p:ph idx="1"/>
+          </p:nvPr>
+        </p:nvSpPr>
+        <p:spPr>
+          <a:xfrm>
+            <a:off x="228600" y="1862052"/>
+            <a:ext cx="8686800" cy="3420772"/>
+          </a:xfrm>
+        </p:spPr>
+        <p:txBody>
+          <a:bodyPr anchor="ctr">
+            <a:normAutofit/>
+          </a:bodyPr>
+          <a:lstStyle/>
+          <a:p>
+            <a:pPr marL="742950" indent="-742950">
+              <a:buAutoNum type="arabicPeriod"/>
+            </a:pPr>
+            <a:r>
+              <a:rPr lang="es-VE" sz="2800" b="1" dirty="0">
+                <a:solidFill>
+                  <a:srgbClr val="FFFF00"/>
+                </a:solidFill>
+              </a:rPr>
+              <a:t>Atributos no relacionados:</a:t>
+            </a:r>
+            <a:r>
+              <a:rPr lang="es-VE" sz="2800" dirty="0"/>
+              <a:t> lo que Dios es en sí mismo, aparte de la creación. Responden a la siguiente pregunta: ¿Qué cualidades caracterizaron a Dios antes de existir lo creado?</a:t>
+            </a:r>
+          </a:p>
+          <a:p>
+            <a:pPr marL="742950" indent="-742950">
+              <a:buAutoNum type="arabicPeriod"/>
+            </a:pPr>
+            <a:r>
+              <a:rPr lang="es-VE" sz="2800" b="1" dirty="0">
+                <a:solidFill>
+                  <a:srgbClr val="FFFF00"/>
+                </a:solidFill>
+              </a:rPr>
+              <a:t>Atributos activos:</a:t>
+            </a:r>
+            <a:r>
+              <a:rPr lang="es-VE" sz="2800" dirty="0"/>
+              <a:t> lo que Dios es con relación al universo.</a:t>
+            </a:r>
+          </a:p>
+          <a:p>
+            <a:pPr marL="742950" indent="-742950">
+              <a:buAutoNum type="arabicPeriod"/>
+            </a:pPr>
+            <a:r>
+              <a:rPr lang="es-VE" sz="2800" b="1" dirty="0">
+                <a:solidFill>
+                  <a:srgbClr val="FFFF00"/>
+                </a:solidFill>
+              </a:rPr>
+              <a:t>Los atributos morales:</a:t>
+            </a:r>
+            <a:r>
+              <a:rPr lang="es-VE" sz="2800" dirty="0"/>
+              <a:t> lo que Dios es con relación a sus seres morales.</a:t>
+            </a:r>
+          </a:p>
+        </p:txBody>
+      </p:sp>
+    </p:spTree>
+    <p:extLst>
+      <p:ext uri="{BB962C8B-B14F-4D97-AF65-F5344CB8AC3E}">
+        <p14:creationId xmlns:p14="http://schemas.microsoft.com/office/powerpoint/2010/main" val="759576161"/>
+      </p:ext>
+    </p:extLst>
+  </p:cSld>
+  <p:clrMapOvr>
+    <a:masterClrMapping/>
+  </p:clrMapOvr>
+</p:sld>
+</file>
+
+<file path=ppt/slides/slide21.xml><?xml version="1.0" encoding="utf-8"?>
+<p:sld xmlns:a="http://schemas.openxmlformats.org/drawingml/2006/main" xmlns:r="http://schemas.openxmlformats.org/officeDocument/2006/relationships" xmlns:p="http://schemas.openxmlformats.org/presentationml/2006/main">
+  <p:cSld>
+    <p:bg>
+      <p:bgPr>
+        <a:gradFill flip="none" rotWithShape="1">
+          <a:gsLst>
+            <a:gs pos="0">
+              <a:schemeClr val="accent3">
+                <a:lumMod val="89000"/>
+              </a:schemeClr>
+            </a:gs>
+            <a:gs pos="23000">
+              <a:schemeClr val="accent3">
+                <a:lumMod val="89000"/>
+              </a:schemeClr>
+            </a:gs>
+            <a:gs pos="69000">
+              <a:schemeClr val="accent3">
+                <a:lumMod val="75000"/>
+              </a:schemeClr>
+            </a:gs>
+            <a:gs pos="97000">
+              <a:schemeClr val="accent3">
+                <a:lumMod val="70000"/>
+              </a:schemeClr>
+            </a:gs>
+          </a:gsLst>
+          <a:path path="circle">
+            <a:fillToRect l="50000" t="50000" r="50000" b="50000"/>
+          </a:path>
+          <a:tileRect/>
+        </a:gradFill>
+        <a:effectLst/>
+      </p:bgPr>
+    </p:bg>
+    <p:spTree>
+      <p:nvGrpSpPr>
+        <p:cNvPr id="1" name=""/>
+        <p:cNvGrpSpPr/>
+        <p:nvPr/>
+      </p:nvGrpSpPr>
+      <p:grpSpPr>
+        <a:xfrm>
+          <a:off x="0" y="0"/>
+          <a:ext cx="0" cy="0"/>
+          <a:chOff x="0" y="0"/>
+          <a:chExt cx="0" cy="0"/>
+        </a:xfrm>
+      </p:grpSpPr>
+      <p:sp>
+        <p:nvSpPr>
+          <p:cNvPr id="2" name="Título 1">
+            <a:extLst>
+              <a:ext uri="{FF2B5EF4-FFF2-40B4-BE49-F238E27FC236}">
+                <a16:creationId xmlns:a16="http://schemas.microsoft.com/office/drawing/2014/main" id="{C65A0631-47E2-4854-94DA-DD27A379FEF1}"/>
+              </a:ext>
+            </a:extLst>
+          </p:cNvPr>
+          <p:cNvSpPr>
+            <a:spLocks noGrp="1"/>
+          </p:cNvSpPr>
+          <p:nvPr>
+            <p:ph type="title"/>
+          </p:nvPr>
+        </p:nvSpPr>
+        <p:spPr>
+          <a:xfrm>
+            <a:off x="228600" y="309281"/>
+            <a:ext cx="8686800" cy="1519519"/>
+          </a:xfrm>
+        </p:spPr>
+        <p:txBody>
+          <a:bodyPr anchor="ctr">
+            <a:normAutofit fontScale="90000"/>
+          </a:bodyPr>
+          <a:lstStyle/>
+          <a:p>
+            <a:r>
+              <a:rPr lang="es-VE" sz="6000" b="1" dirty="0"/>
+              <a:t>3. LOS ATRIBUTOS DE DIOS</a:t>
+            </a:r>
+            <a:br>
+              <a:rPr lang="es-VE" sz="6600" b="1" dirty="0"/>
+            </a:br>
+            <a:r>
+              <a:rPr lang="es-VE" sz="3200" b="1" dirty="0"/>
+              <a:t>3.1 Atributos no relacionados</a:t>
+            </a:r>
+            <a:br>
+              <a:rPr lang="es-VE" sz="3200" b="1" dirty="0"/>
+            </a:br>
+            <a:r>
+              <a:rPr lang="es-VE" sz="2700" b="1" dirty="0">
+                <a:solidFill>
+                  <a:srgbClr val="FFFF00"/>
+                </a:solidFill>
+              </a:rPr>
+              <a:t>3.1.1. Espiritualidad</a:t>
+            </a:r>
+            <a:endParaRPr lang="es-VE" sz="6600" b="1" dirty="0">
+              <a:solidFill>
+                <a:srgbClr val="FFFF00"/>
+              </a:solidFill>
+            </a:endParaRPr>
+          </a:p>
+        </p:txBody>
+      </p:sp>
+      <p:sp>
+        <p:nvSpPr>
+          <p:cNvPr id="3" name="Marcador de contenido 2">
+            <a:extLst>
+              <a:ext uri="{FF2B5EF4-FFF2-40B4-BE49-F238E27FC236}">
+                <a16:creationId xmlns:a16="http://schemas.microsoft.com/office/drawing/2014/main" id="{AA130F57-7D31-4139-81B2-4D70486C00F2}"/>
+              </a:ext>
+            </a:extLst>
+          </p:cNvPr>
+          <p:cNvSpPr>
+            <a:spLocks noGrp="1"/>
+          </p:cNvSpPr>
+          <p:nvPr>
+            <p:ph idx="1"/>
+          </p:nvPr>
+        </p:nvSpPr>
+        <p:spPr>
+          <a:xfrm>
+            <a:off x="228600" y="1945178"/>
+            <a:ext cx="8686800" cy="3460540"/>
+          </a:xfrm>
+        </p:spPr>
+        <p:txBody>
+          <a:bodyPr anchor="ctr">
+            <a:normAutofit lnSpcReduction="10000"/>
+          </a:bodyPr>
+          <a:lstStyle/>
+          <a:p>
+            <a:pPr marL="0" indent="0">
+              <a:buNone/>
+            </a:pPr>
+            <a:r>
+              <a:rPr lang="es-VE" sz="2800" dirty="0"/>
+              <a:t>Dios es Espíritu </a:t>
+            </a:r>
+            <a:r>
+              <a:rPr lang="es-VE" sz="2800" b="1" dirty="0">
+                <a:solidFill>
+                  <a:srgbClr val="FFFF00"/>
+                </a:solidFill>
+              </a:rPr>
+              <a:t>[</a:t>
+            </a:r>
+            <a:r>
+              <a:rPr lang="es-VE" sz="2800" b="1" dirty="0" err="1">
+                <a:solidFill>
+                  <a:srgbClr val="FFFF00"/>
+                </a:solidFill>
+              </a:rPr>
+              <a:t>Jn</a:t>
+            </a:r>
+            <a:r>
+              <a:rPr lang="es-VE" sz="2800" b="1" dirty="0">
+                <a:solidFill>
+                  <a:srgbClr val="FFFF00"/>
+                </a:solidFill>
+              </a:rPr>
+              <a:t> 4:24]</a:t>
+            </a:r>
+            <a:r>
+              <a:rPr lang="es-VE" sz="2800" dirty="0"/>
+              <a:t> y como Espíritu, Dios no está sujeto a las </a:t>
+            </a:r>
+            <a:r>
+              <a:rPr lang="es-VE" sz="2800" b="1" dirty="0"/>
+              <a:t>limitaciones</a:t>
+            </a:r>
+            <a:r>
+              <a:rPr lang="es-VE" sz="2800" dirty="0"/>
+              <a:t> que por tener cuerpo sufren los seres humanos.</a:t>
+            </a:r>
+          </a:p>
+          <a:p>
+            <a:pPr marL="0" indent="0">
+              <a:buNone/>
+            </a:pPr>
+            <a:endParaRPr lang="es-VE" sz="2800" dirty="0"/>
+          </a:p>
+          <a:p>
+            <a:pPr marL="0" indent="0">
+              <a:buNone/>
+            </a:pPr>
+            <a:r>
+              <a:rPr lang="es-VE" sz="2800" dirty="0"/>
+              <a:t>No posee miembros corporales o pasiones, no está compuesto de </a:t>
+            </a:r>
+            <a:r>
+              <a:rPr lang="es-VE" sz="2800" b="1" dirty="0"/>
+              <a:t>elementos materiales</a:t>
+            </a:r>
+            <a:r>
+              <a:rPr lang="es-VE" sz="2800" dirty="0"/>
+              <a:t>, y no está sujeto a las condiciones de la </a:t>
+            </a:r>
+            <a:r>
+              <a:rPr lang="es-VE" sz="2800" b="1" dirty="0"/>
+              <a:t>existencia natural</a:t>
+            </a:r>
+            <a:r>
+              <a:rPr lang="es-VE" sz="2800" dirty="0"/>
+              <a:t>. De ahí que no pueda ser visto con ojos naturales o comprendido por los sentidos naturales.</a:t>
+            </a:r>
+          </a:p>
+        </p:txBody>
+      </p:sp>
+    </p:spTree>
+    <p:extLst>
+      <p:ext uri="{BB962C8B-B14F-4D97-AF65-F5344CB8AC3E}">
+        <p14:creationId xmlns:p14="http://schemas.microsoft.com/office/powerpoint/2010/main" val="229912469"/>
+      </p:ext>
+    </p:extLst>
+  </p:cSld>
+  <p:clrMapOvr>
+    <a:masterClrMapping/>
+  </p:clrMapOvr>
+</p:sld>
+</file>
+
+<file path=ppt/slides/slide22.xml><?xml version="1.0" encoding="utf-8"?>
+<p:sld xmlns:a="http://schemas.openxmlformats.org/drawingml/2006/main" xmlns:r="http://schemas.openxmlformats.org/officeDocument/2006/relationships" xmlns:p="http://schemas.openxmlformats.org/presentationml/2006/main">
+  <p:cSld>
+    <p:bg>
+      <p:bgPr>
+        <a:gradFill flip="none" rotWithShape="1">
+          <a:gsLst>
+            <a:gs pos="0">
+              <a:schemeClr val="accent3">
+                <a:lumMod val="89000"/>
+              </a:schemeClr>
+            </a:gs>
+            <a:gs pos="23000">
+              <a:schemeClr val="accent3">
+                <a:lumMod val="89000"/>
+              </a:schemeClr>
+            </a:gs>
+            <a:gs pos="69000">
+              <a:schemeClr val="accent3">
+                <a:lumMod val="75000"/>
+              </a:schemeClr>
+            </a:gs>
+            <a:gs pos="97000">
+              <a:schemeClr val="accent3">
+                <a:lumMod val="70000"/>
+              </a:schemeClr>
+            </a:gs>
+          </a:gsLst>
+          <a:path path="circle">
+            <a:fillToRect l="50000" t="50000" r="50000" b="50000"/>
+          </a:path>
+          <a:tileRect/>
+        </a:gradFill>
+        <a:effectLst/>
+      </p:bgPr>
+    </p:bg>
+    <p:spTree>
+      <p:nvGrpSpPr>
+        <p:cNvPr id="1" name=""/>
+        <p:cNvGrpSpPr/>
+        <p:nvPr/>
+      </p:nvGrpSpPr>
+      <p:grpSpPr>
+        <a:xfrm>
+          <a:off x="0" y="0"/>
+          <a:ext cx="0" cy="0"/>
+          <a:chOff x="0" y="0"/>
+          <a:chExt cx="0" cy="0"/>
+        </a:xfrm>
+      </p:grpSpPr>
+      <p:sp>
+        <p:nvSpPr>
+          <p:cNvPr id="2" name="Título 1">
+            <a:extLst>
+              <a:ext uri="{FF2B5EF4-FFF2-40B4-BE49-F238E27FC236}">
+                <a16:creationId xmlns:a16="http://schemas.microsoft.com/office/drawing/2014/main" id="{C65A0631-47E2-4854-94DA-DD27A379FEF1}"/>
+              </a:ext>
+            </a:extLst>
+          </p:cNvPr>
+          <p:cNvSpPr>
+            <a:spLocks noGrp="1"/>
+          </p:cNvSpPr>
+          <p:nvPr>
+            <p:ph type="title"/>
+          </p:nvPr>
+        </p:nvSpPr>
+        <p:spPr>
+          <a:xfrm>
+            <a:off x="228600" y="309281"/>
+            <a:ext cx="8686800" cy="1519519"/>
+          </a:xfrm>
+        </p:spPr>
+        <p:txBody>
+          <a:bodyPr anchor="ctr">
+            <a:normAutofit fontScale="90000"/>
+          </a:bodyPr>
+          <a:lstStyle/>
+          <a:p>
+            <a:r>
+              <a:rPr lang="es-VE" sz="6000" b="1" dirty="0"/>
+              <a:t>3. LOS ATRIBUTOS DE DIOS</a:t>
+            </a:r>
+            <a:br>
+              <a:rPr lang="es-VE" sz="6600" b="1" dirty="0"/>
+            </a:br>
+            <a:r>
+              <a:rPr lang="es-VE" sz="3200" b="1" dirty="0"/>
+              <a:t>3.1 Atributos no relacionados</a:t>
+            </a:r>
+            <a:br>
+              <a:rPr lang="es-VE" sz="3200" b="1" dirty="0"/>
+            </a:br>
+            <a:r>
+              <a:rPr lang="es-VE" sz="2700" b="1" dirty="0">
+                <a:solidFill>
+                  <a:srgbClr val="FFFF00"/>
+                </a:solidFill>
+              </a:rPr>
+              <a:t>3.1.2. Infinidad</a:t>
+            </a:r>
+            <a:endParaRPr lang="es-VE" sz="6600" b="1" dirty="0">
+              <a:solidFill>
+                <a:srgbClr val="FFFF00"/>
+              </a:solidFill>
+            </a:endParaRPr>
+          </a:p>
+        </p:txBody>
+      </p:sp>
+      <p:sp>
+        <p:nvSpPr>
+          <p:cNvPr id="3" name="Marcador de contenido 2">
+            <a:extLst>
+              <a:ext uri="{FF2B5EF4-FFF2-40B4-BE49-F238E27FC236}">
+                <a16:creationId xmlns:a16="http://schemas.microsoft.com/office/drawing/2014/main" id="{AA130F57-7D31-4139-81B2-4D70486C00F2}"/>
+              </a:ext>
+            </a:extLst>
+          </p:cNvPr>
+          <p:cNvSpPr>
+            <a:spLocks noGrp="1"/>
+          </p:cNvSpPr>
+          <p:nvPr>
+            <p:ph idx="1"/>
+          </p:nvPr>
+        </p:nvSpPr>
+        <p:spPr>
+          <a:xfrm>
+            <a:off x="228600" y="1945178"/>
+            <a:ext cx="8686800" cy="3460540"/>
+          </a:xfrm>
+        </p:spPr>
+        <p:txBody>
+          <a:bodyPr anchor="ctr">
+            <a:normAutofit/>
+          </a:bodyPr>
+          <a:lstStyle/>
+          <a:p>
+            <a:pPr marL="0" indent="0">
+              <a:buNone/>
+            </a:pPr>
+            <a:r>
+              <a:rPr lang="es-VE" sz="2800" dirty="0"/>
+              <a:t>En la </a:t>
+            </a:r>
+            <a:r>
+              <a:rPr lang="es-VE" sz="2800" b="1" dirty="0"/>
+              <a:t>infinidad</a:t>
+            </a:r>
+            <a:r>
+              <a:rPr lang="es-VE" sz="2800" dirty="0"/>
+              <a:t> se implica que </a:t>
+            </a:r>
+            <a:r>
+              <a:rPr lang="es-VE" sz="2800" b="1" dirty="0"/>
+              <a:t>Dios no puede estar limitado</a:t>
+            </a:r>
+            <a:r>
+              <a:rPr lang="es-VE" sz="2800" dirty="0"/>
+              <a:t> por el Universo, por el tiempo, por el espacio ni confinado de ninguna forma a su creación </a:t>
+            </a:r>
+            <a:r>
+              <a:rPr lang="es-VE" sz="2800" b="1" dirty="0">
+                <a:solidFill>
+                  <a:srgbClr val="FFFF00"/>
+                </a:solidFill>
+              </a:rPr>
+              <a:t>[1Re 8:27]</a:t>
+            </a:r>
+            <a:r>
+              <a:rPr lang="es-VE" sz="2800" dirty="0"/>
+              <a:t>.</a:t>
+            </a:r>
+          </a:p>
+          <a:p>
+            <a:pPr marL="0" indent="0">
+              <a:buNone/>
+            </a:pPr>
+            <a:endParaRPr lang="es-VE" sz="2800" dirty="0"/>
+          </a:p>
+          <a:p>
+            <a:pPr marL="0" indent="0">
+              <a:buNone/>
+            </a:pPr>
+            <a:r>
+              <a:rPr lang="es-VE" sz="2800" dirty="0"/>
+              <a:t>Pensemos por contraste en el ser humano, </a:t>
+            </a:r>
+            <a:r>
+              <a:rPr lang="es-VE" sz="2800" b="1" dirty="0"/>
+              <a:t>finito</a:t>
+            </a:r>
+            <a:r>
+              <a:rPr lang="es-VE" sz="2800" dirty="0"/>
+              <a:t>, con una existencia limitada por el tiempo y el espacio. </a:t>
+            </a:r>
+            <a:r>
+              <a:rPr lang="es-VE" sz="2800" b="1" dirty="0"/>
+              <a:t>Para Dios esas limitaciones no aplican</a:t>
+            </a:r>
+            <a:r>
+              <a:rPr lang="es-VE" sz="2800" dirty="0"/>
+              <a:t>.</a:t>
+            </a:r>
+            <a:endParaRPr lang="es-VE" sz="3600" dirty="0"/>
+          </a:p>
+        </p:txBody>
+      </p:sp>
+    </p:spTree>
+    <p:extLst>
+      <p:ext uri="{BB962C8B-B14F-4D97-AF65-F5344CB8AC3E}">
+        <p14:creationId xmlns:p14="http://schemas.microsoft.com/office/powerpoint/2010/main" val="3119814520"/>
+      </p:ext>
+    </p:extLst>
+  </p:cSld>
+  <p:clrMapOvr>
+    <a:masterClrMapping/>
+  </p:clrMapOvr>
+</p:sld>
+</file>
+
+<file path=ppt/slides/slide23.xml><?xml version="1.0" encoding="utf-8"?>
+<p:sld xmlns:a="http://schemas.openxmlformats.org/drawingml/2006/main" xmlns:r="http://schemas.openxmlformats.org/officeDocument/2006/relationships" xmlns:p="http://schemas.openxmlformats.org/presentationml/2006/main">
+  <p:cSld>
+    <p:bg>
+      <p:bgPr>
+        <a:gradFill flip="none" rotWithShape="1">
+          <a:gsLst>
+            <a:gs pos="0">
+              <a:schemeClr val="accent3">
+                <a:lumMod val="89000"/>
+              </a:schemeClr>
+            </a:gs>
+            <a:gs pos="23000">
+              <a:schemeClr val="accent3">
+                <a:lumMod val="89000"/>
+              </a:schemeClr>
+            </a:gs>
+            <a:gs pos="69000">
+              <a:schemeClr val="accent3">
+                <a:lumMod val="75000"/>
+              </a:schemeClr>
+            </a:gs>
+            <a:gs pos="97000">
+              <a:schemeClr val="accent3">
+                <a:lumMod val="70000"/>
+              </a:schemeClr>
+            </a:gs>
+          </a:gsLst>
+          <a:path path="circle">
+            <a:fillToRect l="50000" t="50000" r="50000" b="50000"/>
+          </a:path>
+          <a:tileRect/>
+        </a:gradFill>
+        <a:effectLst/>
+      </p:bgPr>
+    </p:bg>
+    <p:spTree>
+      <p:nvGrpSpPr>
+        <p:cNvPr id="1" name=""/>
+        <p:cNvGrpSpPr/>
+        <p:nvPr/>
+      </p:nvGrpSpPr>
+      <p:grpSpPr>
+        <a:xfrm>
+          <a:off x="0" y="0"/>
+          <a:ext cx="0" cy="0"/>
+          <a:chOff x="0" y="0"/>
+          <a:chExt cx="0" cy="0"/>
+        </a:xfrm>
+      </p:grpSpPr>
+      <p:sp>
+        <p:nvSpPr>
+          <p:cNvPr id="2" name="Título 1">
+            <a:extLst>
+              <a:ext uri="{FF2B5EF4-FFF2-40B4-BE49-F238E27FC236}">
+                <a16:creationId xmlns:a16="http://schemas.microsoft.com/office/drawing/2014/main" id="{C65A0631-47E2-4854-94DA-DD27A379FEF1}"/>
+              </a:ext>
+            </a:extLst>
+          </p:cNvPr>
+          <p:cNvSpPr>
+            <a:spLocks noGrp="1"/>
+          </p:cNvSpPr>
+          <p:nvPr>
+            <p:ph type="title"/>
+          </p:nvPr>
+        </p:nvSpPr>
+        <p:spPr>
+          <a:xfrm>
+            <a:off x="228600" y="309281"/>
+            <a:ext cx="8686800" cy="1519519"/>
+          </a:xfrm>
+        </p:spPr>
+        <p:txBody>
+          <a:bodyPr anchor="ctr">
+            <a:normAutofit fontScale="90000"/>
+          </a:bodyPr>
+          <a:lstStyle/>
+          <a:p>
+            <a:r>
+              <a:rPr lang="es-VE" sz="6000" b="1" dirty="0"/>
+              <a:t>3. LOS ATRIBUTOS DE DIOS</a:t>
+            </a:r>
+            <a:br>
+              <a:rPr lang="es-VE" sz="6600" b="1" dirty="0"/>
+            </a:br>
+            <a:r>
+              <a:rPr lang="es-VE" sz="3200" b="1" dirty="0"/>
+              <a:t>3.1 Atributos no relacionados</a:t>
+            </a:r>
+            <a:br>
+              <a:rPr lang="es-VE" sz="3200" b="1" dirty="0"/>
+            </a:br>
+            <a:r>
+              <a:rPr lang="es-VE" sz="2700" b="1" dirty="0">
+                <a:solidFill>
+                  <a:srgbClr val="FFFF00"/>
+                </a:solidFill>
+              </a:rPr>
+              <a:t>3.1.2. Unidad y unicidad</a:t>
+            </a:r>
+            <a:endParaRPr lang="es-VE" sz="6600" b="1" dirty="0">
+              <a:solidFill>
+                <a:srgbClr val="FFFF00"/>
+              </a:solidFill>
+            </a:endParaRPr>
+          </a:p>
+        </p:txBody>
+      </p:sp>
+      <p:sp>
+        <p:nvSpPr>
+          <p:cNvPr id="3" name="Marcador de contenido 2">
+            <a:extLst>
+              <a:ext uri="{FF2B5EF4-FFF2-40B4-BE49-F238E27FC236}">
+                <a16:creationId xmlns:a16="http://schemas.microsoft.com/office/drawing/2014/main" id="{AA130F57-7D31-4139-81B2-4D70486C00F2}"/>
+              </a:ext>
+            </a:extLst>
+          </p:cNvPr>
+          <p:cNvSpPr>
+            <a:spLocks noGrp="1"/>
+          </p:cNvSpPr>
+          <p:nvPr>
+            <p:ph idx="1"/>
+          </p:nvPr>
+        </p:nvSpPr>
+        <p:spPr>
+          <a:xfrm>
+            <a:off x="228600" y="1945178"/>
+            <a:ext cx="8686800" cy="3460540"/>
+          </a:xfrm>
+        </p:spPr>
+        <p:txBody>
+          <a:bodyPr anchor="ctr">
+            <a:normAutofit/>
+          </a:bodyPr>
+          <a:lstStyle/>
+          <a:p>
+            <a:pPr marL="0" indent="0">
+              <a:buNone/>
+            </a:pPr>
+            <a:r>
+              <a:rPr lang="es-VE" sz="2800" dirty="0"/>
+              <a:t>Dios es numéricamente uno </a:t>
+            </a:r>
+            <a:r>
+              <a:rPr lang="es-VE" sz="2800" b="1" dirty="0"/>
+              <a:t>(unidad)</a:t>
+            </a:r>
+            <a:r>
+              <a:rPr lang="es-VE" sz="2800" dirty="0"/>
+              <a:t> y que en su carácter es único </a:t>
+            </a:r>
+            <a:r>
+              <a:rPr lang="es-VE" sz="2800" b="1" dirty="0"/>
+              <a:t>(unicidad)</a:t>
+            </a:r>
+            <a:r>
+              <a:rPr lang="es-VE" sz="2800" dirty="0"/>
+              <a:t>. Implica que no hay sino un solo Ser Divino, que la naturaleza del caso exige que haya solamente uno, y que todos los otros seres tiene su existencia </a:t>
+            </a:r>
+            <a:r>
+              <a:rPr lang="es-VE" sz="2800" b="1" dirty="0"/>
+              <a:t>de El, por El y par El</a:t>
+            </a:r>
+            <a:r>
+              <a:rPr lang="es-VE" sz="2800" dirty="0"/>
+              <a:t>.</a:t>
+            </a:r>
+          </a:p>
+          <a:p>
+            <a:pPr marL="0" indent="0">
+              <a:buNone/>
+            </a:pPr>
+            <a:endParaRPr lang="es-VE" sz="2800" dirty="0"/>
+          </a:p>
+          <a:p>
+            <a:pPr marL="0" indent="0">
+              <a:buNone/>
+            </a:pPr>
+            <a:r>
+              <a:rPr lang="es-VE" sz="2800" dirty="0"/>
+              <a:t>La Biblia nos enseña en varios pasajes que hay solamente </a:t>
+            </a:r>
+            <a:r>
+              <a:rPr lang="es-VE" sz="2800" b="1" dirty="0"/>
+              <a:t>un Dios verdadero</a:t>
+            </a:r>
+            <a:r>
+              <a:rPr lang="es-VE" sz="2800" dirty="0"/>
+              <a:t>. </a:t>
+            </a:r>
+            <a:r>
+              <a:rPr lang="es-VE" sz="2800" b="1" dirty="0">
+                <a:solidFill>
+                  <a:srgbClr val="FFFF00"/>
+                </a:solidFill>
+              </a:rPr>
+              <a:t>[</a:t>
+            </a:r>
+            <a:r>
+              <a:rPr lang="es-VE" sz="2800" b="1" dirty="0" err="1">
+                <a:solidFill>
+                  <a:srgbClr val="FFFF00"/>
+                </a:solidFill>
+              </a:rPr>
+              <a:t>Dt</a:t>
+            </a:r>
+            <a:r>
+              <a:rPr lang="es-VE" sz="2800" b="1" dirty="0">
+                <a:solidFill>
+                  <a:srgbClr val="FFFF00"/>
+                </a:solidFill>
+              </a:rPr>
+              <a:t> 6:4, 1R 8:60, 1Co 8:6]</a:t>
+            </a:r>
+            <a:endParaRPr lang="es-VE" sz="3600" b="1" dirty="0">
+              <a:solidFill>
+                <a:srgbClr val="FFFF00"/>
+              </a:solidFill>
+            </a:endParaRPr>
+          </a:p>
+        </p:txBody>
+      </p:sp>
+    </p:spTree>
+    <p:extLst>
+      <p:ext uri="{BB962C8B-B14F-4D97-AF65-F5344CB8AC3E}">
+        <p14:creationId xmlns:p14="http://schemas.microsoft.com/office/powerpoint/2010/main" val="1424422967"/>
+      </p:ext>
+    </p:extLst>
+  </p:cSld>
+  <p:clrMapOvr>
+    <a:masterClrMapping/>
+  </p:clrMapOvr>
+</p:sld>
+</file>
+
+<file path=ppt/slides/slide24.xml><?xml version="1.0" encoding="utf-8"?>
+<p:sld xmlns:a="http://schemas.openxmlformats.org/drawingml/2006/main" xmlns:r="http://schemas.openxmlformats.org/officeDocument/2006/relationships" xmlns:p="http://schemas.openxmlformats.org/presentationml/2006/main">
+  <p:cSld>
+    <p:bg>
+      <p:bgPr>
+        <a:gradFill flip="none" rotWithShape="1">
+          <a:gsLst>
+            <a:gs pos="0">
+              <a:schemeClr val="accent3">
+                <a:lumMod val="89000"/>
+              </a:schemeClr>
+            </a:gs>
+            <a:gs pos="23000">
+              <a:schemeClr val="accent3">
+                <a:lumMod val="89000"/>
+              </a:schemeClr>
+            </a:gs>
+            <a:gs pos="69000">
+              <a:schemeClr val="accent3">
+                <a:lumMod val="75000"/>
+              </a:schemeClr>
+            </a:gs>
+            <a:gs pos="97000">
+              <a:schemeClr val="accent3">
+                <a:lumMod val="70000"/>
+              </a:schemeClr>
+            </a:gs>
+          </a:gsLst>
+          <a:path path="circle">
+            <a:fillToRect l="50000" t="50000" r="50000" b="50000"/>
+          </a:path>
+          <a:tileRect/>
+        </a:gradFill>
+        <a:effectLst/>
+      </p:bgPr>
+    </p:bg>
+    <p:spTree>
+      <p:nvGrpSpPr>
+        <p:cNvPr id="1" name=""/>
+        <p:cNvGrpSpPr/>
+        <p:nvPr/>
+      </p:nvGrpSpPr>
+      <p:grpSpPr>
+        <a:xfrm>
+          <a:off x="0" y="0"/>
+          <a:ext cx="0" cy="0"/>
+          <a:chOff x="0" y="0"/>
+          <a:chExt cx="0" cy="0"/>
+        </a:xfrm>
+      </p:grpSpPr>
+      <p:sp>
+        <p:nvSpPr>
+          <p:cNvPr id="2" name="Título 1">
+            <a:extLst>
+              <a:ext uri="{FF2B5EF4-FFF2-40B4-BE49-F238E27FC236}">
+                <a16:creationId xmlns:a16="http://schemas.microsoft.com/office/drawing/2014/main" id="{C65A0631-47E2-4854-94DA-DD27A379FEF1}"/>
+              </a:ext>
+            </a:extLst>
+          </p:cNvPr>
+          <p:cNvSpPr>
+            <a:spLocks noGrp="1"/>
+          </p:cNvSpPr>
+          <p:nvPr>
+            <p:ph type="title"/>
+          </p:nvPr>
+        </p:nvSpPr>
+        <p:spPr>
+          <a:xfrm>
+            <a:off x="228600" y="309281"/>
+            <a:ext cx="8686800" cy="1519519"/>
+          </a:xfrm>
+        </p:spPr>
+        <p:txBody>
+          <a:bodyPr anchor="ctr">
+            <a:normAutofit fontScale="90000"/>
+          </a:bodyPr>
+          <a:lstStyle/>
+          <a:p>
+            <a:r>
+              <a:rPr lang="es-VE" sz="6000" b="1" dirty="0"/>
+              <a:t>3. LOS ATRIBUTOS DE DIOS</a:t>
+            </a:r>
+            <a:br>
+              <a:rPr lang="es-VE" sz="6600" b="1" dirty="0"/>
+            </a:br>
+            <a:r>
+              <a:rPr lang="es-VE" sz="3200" b="1" dirty="0"/>
+              <a:t>3.2 Atributos activos</a:t>
+            </a:r>
+            <a:br>
+              <a:rPr lang="es-VE" sz="3200" b="1" dirty="0"/>
+            </a:br>
+            <a:r>
+              <a:rPr lang="es-VE" sz="2700" b="1" dirty="0">
+                <a:solidFill>
+                  <a:srgbClr val="FFFF00"/>
+                </a:solidFill>
+              </a:rPr>
+              <a:t>3.2.1. Omnipotencia</a:t>
+            </a:r>
+            <a:endParaRPr lang="es-VE" sz="6600" b="1" dirty="0">
+              <a:solidFill>
+                <a:srgbClr val="FFFF00"/>
+              </a:solidFill>
+            </a:endParaRPr>
+          </a:p>
+        </p:txBody>
+      </p:sp>
+      <p:sp>
+        <p:nvSpPr>
+          <p:cNvPr id="3" name="Marcador de contenido 2">
+            <a:extLst>
+              <a:ext uri="{FF2B5EF4-FFF2-40B4-BE49-F238E27FC236}">
+                <a16:creationId xmlns:a16="http://schemas.microsoft.com/office/drawing/2014/main" id="{AA130F57-7D31-4139-81B2-4D70486C00F2}"/>
+              </a:ext>
+            </a:extLst>
+          </p:cNvPr>
+          <p:cNvSpPr>
+            <a:spLocks noGrp="1"/>
+          </p:cNvSpPr>
+          <p:nvPr>
+            <p:ph idx="1"/>
+          </p:nvPr>
+        </p:nvSpPr>
+        <p:spPr>
+          <a:xfrm>
+            <a:off x="228600" y="1945178"/>
+            <a:ext cx="8686800" cy="3460540"/>
+          </a:xfrm>
+        </p:spPr>
+        <p:txBody>
+          <a:bodyPr anchor="ctr">
+            <a:normAutofit fontScale="85000" lnSpcReduction="10000"/>
+          </a:bodyPr>
+          <a:lstStyle/>
+          <a:p>
+            <a:pPr marL="0" indent="0">
+              <a:buNone/>
+            </a:pPr>
+            <a:r>
+              <a:rPr lang="es-VE" sz="2800" dirty="0"/>
+              <a:t>La palabra omnipotente proviene de </a:t>
+            </a:r>
+            <a:r>
+              <a:rPr lang="es-VE" sz="2800" b="1" dirty="0"/>
+              <a:t>“</a:t>
+            </a:r>
+            <a:r>
+              <a:rPr lang="es-VE" sz="2800" b="1" dirty="0" err="1"/>
+              <a:t>omni</a:t>
+            </a:r>
+            <a:r>
+              <a:rPr lang="es-VE" sz="2800" b="1" dirty="0"/>
+              <a:t>”</a:t>
+            </a:r>
+            <a:r>
+              <a:rPr lang="es-VE" sz="2800" dirty="0"/>
+              <a:t> que significa </a:t>
+            </a:r>
+            <a:r>
+              <a:rPr lang="es-VE" sz="2800" b="1" dirty="0"/>
+              <a:t>“todo”</a:t>
+            </a:r>
+            <a:r>
+              <a:rPr lang="es-VE" sz="2800" dirty="0"/>
+              <a:t> y potente que significa </a:t>
+            </a:r>
+            <a:r>
+              <a:rPr lang="es-VE" sz="2800" b="1" dirty="0"/>
+              <a:t>“poder”.</a:t>
+            </a:r>
+            <a:r>
+              <a:rPr lang="es-VE" sz="2800" dirty="0"/>
+              <a:t> El es libre y tiene el poder para hacer todo lo que es consecuente con su naturaleza. Por ejemplo mentir o robar no son cosas consecuentes con su naturaleza.</a:t>
+            </a:r>
+          </a:p>
+          <a:p>
+            <a:pPr marL="0" indent="0">
+              <a:buNone/>
+            </a:pPr>
+            <a:endParaRPr lang="es-VE" sz="2800" dirty="0"/>
+          </a:p>
+          <a:p>
+            <a:pPr marL="0" indent="0">
+              <a:buNone/>
+            </a:pPr>
+            <a:r>
+              <a:rPr lang="es-VE" sz="2800" dirty="0"/>
+              <a:t>También tiene el control y soberanía </a:t>
+            </a:r>
+            <a:r>
+              <a:rPr lang="es-VE" sz="2800" b="1" dirty="0"/>
+              <a:t>sobre todo</a:t>
+            </a:r>
+            <a:r>
+              <a:rPr lang="es-VE" sz="2800" dirty="0"/>
+              <a:t> lo hecho o que puede ser hecho. Ni aun Satanás puede hacer nada sin su consentimiento.</a:t>
+            </a:r>
+          </a:p>
+          <a:p>
+            <a:pPr marL="0" indent="0">
+              <a:buNone/>
+            </a:pPr>
+            <a:endParaRPr lang="es-VE" sz="2800" b="1" dirty="0">
+              <a:solidFill>
+                <a:srgbClr val="FFFF00"/>
+              </a:solidFill>
+            </a:endParaRPr>
+          </a:p>
+          <a:p>
+            <a:pPr marL="0" indent="0">
+              <a:buNone/>
+            </a:pPr>
+            <a:r>
+              <a:rPr lang="es-VE" sz="2400" b="1" dirty="0">
+                <a:solidFill>
+                  <a:srgbClr val="FFFF00"/>
+                </a:solidFill>
+              </a:rPr>
+              <a:t>[Mt 19: 26]</a:t>
+            </a:r>
+          </a:p>
+        </p:txBody>
+      </p:sp>
+    </p:spTree>
+    <p:extLst>
+      <p:ext uri="{BB962C8B-B14F-4D97-AF65-F5344CB8AC3E}">
+        <p14:creationId xmlns:p14="http://schemas.microsoft.com/office/powerpoint/2010/main" val="2779956379"/>
+      </p:ext>
+    </p:extLst>
+  </p:cSld>
+  <p:clrMapOvr>
+    <a:masterClrMapping/>
+  </p:clrMapOvr>
+</p:sld>
+</file>
+
+<file path=ppt/slides/slide25.xml><?xml version="1.0" encoding="utf-8"?>
+<p:sld xmlns:a="http://schemas.openxmlformats.org/drawingml/2006/main" xmlns:r="http://schemas.openxmlformats.org/officeDocument/2006/relationships" xmlns:p="http://schemas.openxmlformats.org/presentationml/2006/main">
+  <p:cSld>
+    <p:bg>
+      <p:bgPr>
+        <a:gradFill flip="none" rotWithShape="1">
+          <a:gsLst>
+            <a:gs pos="0">
+              <a:schemeClr val="accent3">
+                <a:lumMod val="89000"/>
+              </a:schemeClr>
+            </a:gs>
+            <a:gs pos="23000">
+              <a:schemeClr val="accent3">
+                <a:lumMod val="89000"/>
+              </a:schemeClr>
+            </a:gs>
+            <a:gs pos="69000">
+              <a:schemeClr val="accent3">
+                <a:lumMod val="75000"/>
+              </a:schemeClr>
+            </a:gs>
+            <a:gs pos="97000">
+              <a:schemeClr val="accent3">
+                <a:lumMod val="70000"/>
+              </a:schemeClr>
+            </a:gs>
+          </a:gsLst>
+          <a:path path="circle">
+            <a:fillToRect l="50000" t="50000" r="50000" b="50000"/>
+          </a:path>
+          <a:tileRect/>
+        </a:gradFill>
+        <a:effectLst/>
+      </p:bgPr>
+    </p:bg>
+    <p:spTree>
+      <p:nvGrpSpPr>
+        <p:cNvPr id="1" name=""/>
+        <p:cNvGrpSpPr/>
+        <p:nvPr/>
+      </p:nvGrpSpPr>
+      <p:grpSpPr>
+        <a:xfrm>
+          <a:off x="0" y="0"/>
+          <a:ext cx="0" cy="0"/>
+          <a:chOff x="0" y="0"/>
+          <a:chExt cx="0" cy="0"/>
+        </a:xfrm>
+      </p:grpSpPr>
+      <p:sp>
+        <p:nvSpPr>
+          <p:cNvPr id="2" name="Título 1">
+            <a:extLst>
+              <a:ext uri="{FF2B5EF4-FFF2-40B4-BE49-F238E27FC236}">
+                <a16:creationId xmlns:a16="http://schemas.microsoft.com/office/drawing/2014/main" id="{C65A0631-47E2-4854-94DA-DD27A379FEF1}"/>
+              </a:ext>
+            </a:extLst>
+          </p:cNvPr>
+          <p:cNvSpPr>
+            <a:spLocks noGrp="1"/>
+          </p:cNvSpPr>
+          <p:nvPr>
+            <p:ph type="title"/>
+          </p:nvPr>
+        </p:nvSpPr>
+        <p:spPr>
+          <a:xfrm>
+            <a:off x="228600" y="309281"/>
+            <a:ext cx="8686800" cy="1519519"/>
+          </a:xfrm>
+        </p:spPr>
+        <p:txBody>
+          <a:bodyPr anchor="ctr">
+            <a:normAutofit fontScale="90000"/>
+          </a:bodyPr>
+          <a:lstStyle/>
+          <a:p>
+            <a:r>
+              <a:rPr lang="es-VE" sz="6000" b="1" dirty="0"/>
+              <a:t>3. LOS ATRIBUTOS DE DIOS</a:t>
+            </a:r>
+            <a:br>
+              <a:rPr lang="es-VE" sz="6600" b="1" dirty="0"/>
+            </a:br>
+            <a:r>
+              <a:rPr lang="es-VE" sz="3200" b="1" dirty="0"/>
+              <a:t>3.2 Atributos activos</a:t>
+            </a:r>
+            <a:br>
+              <a:rPr lang="es-VE" sz="3200" b="1" dirty="0"/>
+            </a:br>
+            <a:r>
+              <a:rPr lang="es-VE" sz="2700" b="1" dirty="0">
+                <a:solidFill>
+                  <a:srgbClr val="FFFF00"/>
+                </a:solidFill>
+              </a:rPr>
+              <a:t>3.2.2. Omnipresencia</a:t>
+            </a:r>
+            <a:endParaRPr lang="es-VE" sz="6600" b="1" dirty="0">
+              <a:solidFill>
+                <a:srgbClr val="FFFF00"/>
+              </a:solidFill>
+            </a:endParaRPr>
+          </a:p>
+        </p:txBody>
+      </p:sp>
+      <p:sp>
+        <p:nvSpPr>
+          <p:cNvPr id="3" name="Marcador de contenido 2">
+            <a:extLst>
+              <a:ext uri="{FF2B5EF4-FFF2-40B4-BE49-F238E27FC236}">
+                <a16:creationId xmlns:a16="http://schemas.microsoft.com/office/drawing/2014/main" id="{AA130F57-7D31-4139-81B2-4D70486C00F2}"/>
+              </a:ext>
+            </a:extLst>
+          </p:cNvPr>
+          <p:cNvSpPr>
+            <a:spLocks noGrp="1"/>
+          </p:cNvSpPr>
+          <p:nvPr>
+            <p:ph idx="1"/>
+          </p:nvPr>
+        </p:nvSpPr>
+        <p:spPr>
+          <a:xfrm>
+            <a:off x="228600" y="1945178"/>
+            <a:ext cx="8686800" cy="3460540"/>
+          </a:xfrm>
+        </p:spPr>
+        <p:txBody>
+          <a:bodyPr anchor="ctr">
+            <a:normAutofit/>
+          </a:bodyPr>
+          <a:lstStyle/>
+          <a:p>
+            <a:pPr marL="0" indent="0">
+              <a:buNone/>
+            </a:pPr>
+            <a:r>
+              <a:rPr lang="es-VE" sz="2400" b="1" dirty="0"/>
+              <a:t>“</a:t>
+            </a:r>
+            <a:r>
+              <a:rPr lang="es-VE" sz="2400" b="1" dirty="0" err="1"/>
+              <a:t>Omni</a:t>
+            </a:r>
+            <a:r>
+              <a:rPr lang="es-VE" sz="2400" b="1" dirty="0"/>
+              <a:t>”</a:t>
+            </a:r>
+            <a:r>
+              <a:rPr lang="es-VE" sz="2400" dirty="0"/>
+              <a:t> viene del latín </a:t>
+            </a:r>
+            <a:r>
+              <a:rPr lang="es-VE" sz="2400" b="1" dirty="0"/>
+              <a:t>“todo”</a:t>
+            </a:r>
+            <a:r>
+              <a:rPr lang="es-VE" sz="2400" dirty="0"/>
+              <a:t>. Es así como </a:t>
+            </a:r>
+            <a:r>
+              <a:rPr lang="es-VE" sz="2400" b="1" dirty="0"/>
+              <a:t>Omnipresencia</a:t>
+            </a:r>
+            <a:r>
+              <a:rPr lang="es-VE" sz="2400" dirty="0"/>
+              <a:t> significa que </a:t>
+            </a:r>
+            <a:r>
+              <a:rPr lang="es-VE" sz="2400" b="1" dirty="0"/>
+              <a:t>Dios está siempre presente en todas partes</a:t>
+            </a:r>
+            <a:r>
+              <a:rPr lang="es-VE" sz="2400" dirty="0"/>
+              <a:t>. Y cuando decimos que está en todas partes, no es que una parte de Dios esté en un sitio y otra en otro: Dios está </a:t>
+            </a:r>
+            <a:r>
+              <a:rPr lang="es-VE" sz="2400" b="1" dirty="0"/>
+              <a:t>Todo El </a:t>
+            </a:r>
+            <a:r>
+              <a:rPr lang="es-VE" sz="2400" dirty="0"/>
+              <a:t>en todas partes. </a:t>
+            </a:r>
+            <a:r>
+              <a:rPr lang="es-VE" sz="2400" b="1" dirty="0">
+                <a:solidFill>
+                  <a:srgbClr val="FFFF00"/>
+                </a:solidFill>
+              </a:rPr>
+              <a:t>[Sal 139:7-10]</a:t>
+            </a:r>
+            <a:endParaRPr lang="es-VE" sz="2400" dirty="0"/>
+          </a:p>
+          <a:p>
+            <a:pPr marL="0" indent="0">
+              <a:buNone/>
+            </a:pPr>
+            <a:endParaRPr lang="es-VE" sz="2400" b="1" dirty="0">
+              <a:solidFill>
+                <a:srgbClr val="FFFF00"/>
+              </a:solidFill>
+            </a:endParaRPr>
+          </a:p>
+          <a:p>
+            <a:pPr marL="0" indent="0">
+              <a:buNone/>
+            </a:pPr>
+            <a:r>
+              <a:rPr lang="es-VE" sz="2400" dirty="0"/>
+              <a:t>Aunque Dios está en todas partes, no significa que habite en todas partes. Sólo cuando entra en relación directa con un grupo o con una persona, se dice que habita o vive en ellos. </a:t>
+            </a:r>
+            <a:r>
+              <a:rPr lang="es-VE" sz="2400" b="1" dirty="0">
+                <a:solidFill>
+                  <a:srgbClr val="FFFF00"/>
+                </a:solidFill>
+              </a:rPr>
+              <a:t>[</a:t>
+            </a:r>
+            <a:r>
+              <a:rPr lang="es-VE" sz="2400" b="1" dirty="0" err="1">
+                <a:solidFill>
+                  <a:srgbClr val="FFFF00"/>
+                </a:solidFill>
+              </a:rPr>
+              <a:t>Gn</a:t>
+            </a:r>
+            <a:r>
+              <a:rPr lang="es-VE" sz="2400" b="1" dirty="0">
+                <a:solidFill>
+                  <a:srgbClr val="FFFF00"/>
+                </a:solidFill>
+              </a:rPr>
+              <a:t> 28:15]</a:t>
+            </a:r>
+          </a:p>
+        </p:txBody>
+      </p:sp>
+    </p:spTree>
+    <p:extLst>
+      <p:ext uri="{BB962C8B-B14F-4D97-AF65-F5344CB8AC3E}">
+        <p14:creationId xmlns:p14="http://schemas.microsoft.com/office/powerpoint/2010/main" val="2846368322"/>
+      </p:ext>
+    </p:extLst>
+  </p:cSld>
+  <p:clrMapOvr>
+    <a:masterClrMapping/>
+  </p:clrMapOvr>
+</p:sld>
+</file>
+
+<file path=ppt/slides/slide26.xml><?xml version="1.0" encoding="utf-8"?>
+<p:sld xmlns:a="http://schemas.openxmlformats.org/drawingml/2006/main" xmlns:r="http://schemas.openxmlformats.org/officeDocument/2006/relationships" xmlns:p="http://schemas.openxmlformats.org/presentationml/2006/main">
+  <p:cSld>
+    <p:bg>
+      <p:bgPr>
+        <a:gradFill flip="none" rotWithShape="1">
+          <a:gsLst>
+            <a:gs pos="0">
+              <a:schemeClr val="accent3">
+                <a:lumMod val="89000"/>
+              </a:schemeClr>
+            </a:gs>
+            <a:gs pos="23000">
+              <a:schemeClr val="accent3">
+                <a:lumMod val="89000"/>
+              </a:schemeClr>
+            </a:gs>
+            <a:gs pos="69000">
+              <a:schemeClr val="accent3">
+                <a:lumMod val="75000"/>
+              </a:schemeClr>
+            </a:gs>
+            <a:gs pos="97000">
+              <a:schemeClr val="accent3">
+                <a:lumMod val="70000"/>
+              </a:schemeClr>
+            </a:gs>
+          </a:gsLst>
+          <a:path path="circle">
+            <a:fillToRect l="50000" t="50000" r="50000" b="50000"/>
+          </a:path>
+          <a:tileRect/>
+        </a:gradFill>
+        <a:effectLst/>
+      </p:bgPr>
+    </p:bg>
+    <p:spTree>
+      <p:nvGrpSpPr>
+        <p:cNvPr id="1" name=""/>
+        <p:cNvGrpSpPr/>
+        <p:nvPr/>
+      </p:nvGrpSpPr>
+      <p:grpSpPr>
+        <a:xfrm>
+          <a:off x="0" y="0"/>
+          <a:ext cx="0" cy="0"/>
+          <a:chOff x="0" y="0"/>
+          <a:chExt cx="0" cy="0"/>
+        </a:xfrm>
+      </p:grpSpPr>
+      <p:sp>
+        <p:nvSpPr>
+          <p:cNvPr id="2" name="Título 1">
+            <a:extLst>
+              <a:ext uri="{FF2B5EF4-FFF2-40B4-BE49-F238E27FC236}">
+                <a16:creationId xmlns:a16="http://schemas.microsoft.com/office/drawing/2014/main" id="{C65A0631-47E2-4854-94DA-DD27A379FEF1}"/>
+              </a:ext>
+            </a:extLst>
+          </p:cNvPr>
+          <p:cNvSpPr>
+            <a:spLocks noGrp="1"/>
+          </p:cNvSpPr>
+          <p:nvPr>
+            <p:ph type="title"/>
+          </p:nvPr>
+        </p:nvSpPr>
+        <p:spPr>
+          <a:xfrm>
+            <a:off x="228600" y="309281"/>
+            <a:ext cx="8686800" cy="1519519"/>
+          </a:xfrm>
+        </p:spPr>
+        <p:txBody>
+          <a:bodyPr anchor="ctr">
+            <a:normAutofit fontScale="90000"/>
+          </a:bodyPr>
+          <a:lstStyle/>
+          <a:p>
+            <a:r>
+              <a:rPr lang="es-VE" sz="6000" b="1" dirty="0"/>
+              <a:t>3. LOS ATRIBUTOS DE DIOS</a:t>
+            </a:r>
+            <a:br>
+              <a:rPr lang="es-VE" sz="6600" b="1" dirty="0"/>
+            </a:br>
+            <a:r>
+              <a:rPr lang="es-VE" sz="3200" b="1" dirty="0"/>
+              <a:t>3.2 Atributos activos</a:t>
+            </a:r>
+            <a:br>
+              <a:rPr lang="es-VE" sz="3200" b="1" dirty="0"/>
+            </a:br>
+            <a:r>
+              <a:rPr lang="es-VE" sz="2700" b="1" dirty="0">
+                <a:solidFill>
+                  <a:srgbClr val="FFFF00"/>
+                </a:solidFill>
+              </a:rPr>
+              <a:t>3.2.3. Omnisciencia</a:t>
+            </a:r>
+            <a:endParaRPr lang="es-VE" sz="6600" b="1" dirty="0">
+              <a:solidFill>
+                <a:srgbClr val="FFFF00"/>
+              </a:solidFill>
+            </a:endParaRPr>
+          </a:p>
+        </p:txBody>
+      </p:sp>
+      <p:sp>
+        <p:nvSpPr>
+          <p:cNvPr id="3" name="Marcador de contenido 2">
+            <a:extLst>
+              <a:ext uri="{FF2B5EF4-FFF2-40B4-BE49-F238E27FC236}">
+                <a16:creationId xmlns:a16="http://schemas.microsoft.com/office/drawing/2014/main" id="{AA130F57-7D31-4139-81B2-4D70486C00F2}"/>
+              </a:ext>
+            </a:extLst>
+          </p:cNvPr>
+          <p:cNvSpPr>
+            <a:spLocks noGrp="1"/>
+          </p:cNvSpPr>
+          <p:nvPr>
+            <p:ph idx="1"/>
+          </p:nvPr>
+        </p:nvSpPr>
+        <p:spPr>
+          <a:xfrm>
+            <a:off x="228600" y="1945178"/>
+            <a:ext cx="8686800" cy="3460540"/>
+          </a:xfrm>
+        </p:spPr>
+        <p:txBody>
+          <a:bodyPr anchor="ctr">
+            <a:normAutofit/>
+          </a:bodyPr>
+          <a:lstStyle/>
+          <a:p>
+            <a:pPr marL="0" indent="0">
+              <a:buNone/>
+            </a:pPr>
+            <a:r>
+              <a:rPr lang="es-VE" sz="2400" dirty="0"/>
+              <a:t>Del latín </a:t>
+            </a:r>
+            <a:r>
+              <a:rPr lang="es-VE" sz="2400" b="1" dirty="0"/>
+              <a:t>“</a:t>
+            </a:r>
+            <a:r>
+              <a:rPr lang="es-VE" sz="2400" b="1" dirty="0" err="1"/>
+              <a:t>omnis</a:t>
+            </a:r>
+            <a:r>
+              <a:rPr lang="es-VE" sz="2400" b="1" dirty="0"/>
+              <a:t>” </a:t>
+            </a:r>
+            <a:r>
+              <a:rPr lang="es-VE" sz="2400" dirty="0"/>
+              <a:t>que es </a:t>
+            </a:r>
+            <a:r>
+              <a:rPr lang="es-VE" sz="2400" b="1" dirty="0"/>
+              <a:t>"todo"</a:t>
+            </a:r>
+            <a:r>
+              <a:rPr lang="es-VE" sz="2400" dirty="0"/>
+              <a:t>, y </a:t>
+            </a:r>
+            <a:r>
+              <a:rPr lang="es-VE" sz="2400" b="1" dirty="0"/>
+              <a:t>“</a:t>
+            </a:r>
+            <a:r>
+              <a:rPr lang="es-VE" sz="2400" b="1" dirty="0" err="1"/>
+              <a:t>scientia</a:t>
+            </a:r>
+            <a:r>
+              <a:rPr lang="es-VE" sz="2400" b="1" dirty="0"/>
+              <a:t>”</a:t>
+            </a:r>
+            <a:r>
+              <a:rPr lang="es-VE" sz="2400" dirty="0"/>
+              <a:t> que es </a:t>
+            </a:r>
+            <a:r>
+              <a:rPr lang="es-VE" sz="2400" b="1" dirty="0"/>
+              <a:t>"ciencia"</a:t>
+            </a:r>
+            <a:r>
+              <a:rPr lang="es-VE" sz="2400" dirty="0"/>
+              <a:t> es saber o conocer todo, es decir, el conocimiento absoluto.</a:t>
+            </a:r>
+          </a:p>
+          <a:p>
+            <a:pPr marL="0" indent="0">
+              <a:buNone/>
+            </a:pPr>
+            <a:endParaRPr lang="es-VE" sz="2400" dirty="0"/>
+          </a:p>
+          <a:p>
+            <a:pPr marL="0" indent="0">
+              <a:buNone/>
+            </a:pPr>
+            <a:r>
+              <a:rPr lang="es-VE" sz="2400" dirty="0"/>
+              <a:t>El conocimiento de Dios </a:t>
+            </a:r>
+            <a:r>
+              <a:rPr lang="es-VE" sz="2400" b="1" dirty="0"/>
+              <a:t>es perfecto</a:t>
+            </a:r>
+            <a:r>
+              <a:rPr lang="es-VE" sz="2400" dirty="0"/>
+              <a:t>, no tiene que razonar o reflexionar, o descubrir cosas, o aprender gradualmente, puesto que sus conocimientos con respecto al pasado, presenté y futuro son completos. </a:t>
+            </a:r>
+            <a:r>
+              <a:rPr lang="es-VE" sz="2400" dirty="0">
+                <a:solidFill>
+                  <a:srgbClr val="FFFF00"/>
+                </a:solidFill>
+              </a:rPr>
+              <a:t>[Mt 6:8]</a:t>
+            </a:r>
+          </a:p>
+        </p:txBody>
+      </p:sp>
+    </p:spTree>
+    <p:extLst>
+      <p:ext uri="{BB962C8B-B14F-4D97-AF65-F5344CB8AC3E}">
+        <p14:creationId xmlns:p14="http://schemas.microsoft.com/office/powerpoint/2010/main" val="1579184454"/>
+      </p:ext>
+    </p:extLst>
+  </p:cSld>
+  <p:clrMapOvr>
+    <a:masterClrMapping/>
+  </p:clrMapOvr>
+</p:sld>
+</file>
+
+<file path=ppt/slides/slide27.xml><?xml version="1.0" encoding="utf-8"?>
+<p:sld xmlns:a="http://schemas.openxmlformats.org/drawingml/2006/main" xmlns:r="http://schemas.openxmlformats.org/officeDocument/2006/relationships" xmlns:p="http://schemas.openxmlformats.org/presentationml/2006/main">
+  <p:cSld>
+    <p:bg>
+      <p:bgPr>
+        <a:gradFill flip="none" rotWithShape="1">
+          <a:gsLst>
+            <a:gs pos="0">
+              <a:schemeClr val="accent3">
+                <a:lumMod val="89000"/>
+              </a:schemeClr>
+            </a:gs>
+            <a:gs pos="23000">
+              <a:schemeClr val="accent3">
+                <a:lumMod val="89000"/>
+              </a:schemeClr>
+            </a:gs>
+            <a:gs pos="69000">
+              <a:schemeClr val="accent3">
+                <a:lumMod val="75000"/>
+              </a:schemeClr>
+            </a:gs>
+            <a:gs pos="97000">
+              <a:schemeClr val="accent3">
+                <a:lumMod val="70000"/>
+              </a:schemeClr>
+            </a:gs>
+          </a:gsLst>
+          <a:path path="circle">
+            <a:fillToRect l="50000" t="50000" r="50000" b="50000"/>
+          </a:path>
+          <a:tileRect/>
+        </a:gradFill>
+        <a:effectLst/>
+      </p:bgPr>
+    </p:bg>
+    <p:spTree>
+      <p:nvGrpSpPr>
+        <p:cNvPr id="1" name=""/>
+        <p:cNvGrpSpPr/>
+        <p:nvPr/>
+      </p:nvGrpSpPr>
+      <p:grpSpPr>
+        <a:xfrm>
+          <a:off x="0" y="0"/>
+          <a:ext cx="0" cy="0"/>
+          <a:chOff x="0" y="0"/>
+          <a:chExt cx="0" cy="0"/>
+        </a:xfrm>
+      </p:grpSpPr>
+      <p:sp>
+        <p:nvSpPr>
+          <p:cNvPr id="2" name="Título 1">
+            <a:extLst>
+              <a:ext uri="{FF2B5EF4-FFF2-40B4-BE49-F238E27FC236}">
+                <a16:creationId xmlns:a16="http://schemas.microsoft.com/office/drawing/2014/main" id="{C65A0631-47E2-4854-94DA-DD27A379FEF1}"/>
+              </a:ext>
+            </a:extLst>
+          </p:cNvPr>
+          <p:cNvSpPr>
+            <a:spLocks noGrp="1"/>
+          </p:cNvSpPr>
+          <p:nvPr>
+            <p:ph type="title"/>
+          </p:nvPr>
+        </p:nvSpPr>
+        <p:spPr>
+          <a:xfrm>
+            <a:off x="228600" y="309281"/>
+            <a:ext cx="8686800" cy="1519519"/>
+          </a:xfrm>
+        </p:spPr>
+        <p:txBody>
+          <a:bodyPr anchor="ctr">
+            <a:normAutofit fontScale="90000"/>
+          </a:bodyPr>
+          <a:lstStyle/>
+          <a:p>
+            <a:r>
+              <a:rPr lang="es-VE" sz="6000" b="1" dirty="0"/>
+              <a:t>3. LOS ATRIBUTOS DE DIOS</a:t>
+            </a:r>
+            <a:br>
+              <a:rPr lang="es-VE" sz="6600" b="1" dirty="0"/>
+            </a:br>
+            <a:r>
+              <a:rPr lang="es-VE" sz="3200" b="1" dirty="0"/>
+              <a:t>3.2 Atributos activos</a:t>
+            </a:r>
+            <a:br>
+              <a:rPr lang="es-VE" sz="3200" b="1" dirty="0"/>
+            </a:br>
+            <a:r>
+              <a:rPr lang="es-VE" sz="2700" b="1" dirty="0">
+                <a:solidFill>
+                  <a:srgbClr val="FFFF00"/>
+                </a:solidFill>
+              </a:rPr>
+              <a:t>3.2.4. Sabiduría</a:t>
+            </a:r>
+            <a:endParaRPr lang="es-VE" sz="6600" b="1" dirty="0">
+              <a:solidFill>
+                <a:srgbClr val="FFFF00"/>
+              </a:solidFill>
+            </a:endParaRPr>
+          </a:p>
+        </p:txBody>
+      </p:sp>
+      <p:sp>
+        <p:nvSpPr>
+          <p:cNvPr id="3" name="Marcador de contenido 2">
+            <a:extLst>
+              <a:ext uri="{FF2B5EF4-FFF2-40B4-BE49-F238E27FC236}">
+                <a16:creationId xmlns:a16="http://schemas.microsoft.com/office/drawing/2014/main" id="{AA130F57-7D31-4139-81B2-4D70486C00F2}"/>
+              </a:ext>
+            </a:extLst>
+          </p:cNvPr>
+          <p:cNvSpPr>
+            <a:spLocks noGrp="1"/>
+          </p:cNvSpPr>
+          <p:nvPr>
+            <p:ph idx="1"/>
+          </p:nvPr>
+        </p:nvSpPr>
+        <p:spPr>
+          <a:xfrm>
+            <a:off x="228600" y="1945178"/>
+            <a:ext cx="8686800" cy="3460540"/>
+          </a:xfrm>
+        </p:spPr>
+        <p:txBody>
+          <a:bodyPr anchor="ctr">
+            <a:normAutofit/>
+          </a:bodyPr>
+          <a:lstStyle/>
+          <a:p>
+            <a:pPr marL="0" indent="0">
+              <a:buNone/>
+            </a:pPr>
+            <a:r>
+              <a:rPr lang="es-VE" sz="2400" dirty="0"/>
+              <a:t>La </a:t>
+            </a:r>
+            <a:r>
+              <a:rPr lang="es-VE" sz="2400" b="1" dirty="0"/>
+              <a:t>sabiduría</a:t>
+            </a:r>
+            <a:r>
+              <a:rPr lang="es-VE" sz="2400" dirty="0"/>
+              <a:t> de Dios es una combinación de su </a:t>
+            </a:r>
+            <a:r>
+              <a:rPr lang="es-VE" sz="2400" b="1" dirty="0"/>
+              <a:t>omnisciencia</a:t>
+            </a:r>
+            <a:r>
+              <a:rPr lang="es-VE" sz="2400" dirty="0"/>
+              <a:t> y </a:t>
+            </a:r>
+            <a:r>
+              <a:rPr lang="es-VE" sz="2400" b="1" dirty="0"/>
+              <a:t>omnipotencia</a:t>
+            </a:r>
+            <a:r>
+              <a:rPr lang="es-VE" sz="2400" dirty="0"/>
+              <a:t>. Dios tiene poder para aplicar sus conocimientos de manera que los mejores propósitos sean realizados o cumplidos por los mejores medios posibles. </a:t>
+            </a:r>
+            <a:r>
+              <a:rPr lang="es-VE" sz="2800" b="1" dirty="0">
+                <a:solidFill>
+                  <a:srgbClr val="FFFF00"/>
+                </a:solidFill>
+              </a:rPr>
+              <a:t>[</a:t>
+            </a:r>
+            <a:r>
+              <a:rPr lang="en-US" sz="2400" b="1" dirty="0">
+                <a:solidFill>
+                  <a:srgbClr val="FFFF00"/>
+                </a:solidFill>
+              </a:rPr>
+              <a:t>Rm 16:27</a:t>
+            </a:r>
+            <a:r>
+              <a:rPr lang="es-VE" sz="2800" b="1" dirty="0">
+                <a:solidFill>
+                  <a:srgbClr val="FFFF00"/>
+                </a:solidFill>
+              </a:rPr>
+              <a:t>]</a:t>
+            </a:r>
+            <a:endParaRPr lang="es-VE" sz="2400" dirty="0"/>
+          </a:p>
+          <a:p>
+            <a:pPr marL="0" indent="0">
+              <a:buNone/>
+            </a:pPr>
+            <a:endParaRPr lang="es-VE" sz="2400" dirty="0"/>
+          </a:p>
+          <a:p>
+            <a:pPr marL="0" indent="0">
+              <a:buNone/>
+            </a:pPr>
+            <a:r>
+              <a:rPr lang="es-VE" sz="2400" dirty="0"/>
+              <a:t>Dios hace siempre lo que corresponde, de la manera correcta, en el momento oportuno. </a:t>
+            </a:r>
+            <a:r>
+              <a:rPr lang="es-VE" sz="2400" b="1" dirty="0">
+                <a:solidFill>
+                  <a:srgbClr val="FFFF00"/>
+                </a:solidFill>
+              </a:rPr>
+              <a:t>[</a:t>
+            </a:r>
+            <a:r>
+              <a:rPr lang="es-VE" sz="2400" b="1" dirty="0" err="1">
+                <a:solidFill>
+                  <a:srgbClr val="FFFF00"/>
+                </a:solidFill>
+              </a:rPr>
+              <a:t>Jr</a:t>
+            </a:r>
+            <a:r>
+              <a:rPr lang="es-VE" sz="2400" b="1" dirty="0">
+                <a:solidFill>
+                  <a:srgbClr val="FFFF00"/>
+                </a:solidFill>
+              </a:rPr>
+              <a:t> 29:11]</a:t>
+            </a:r>
+          </a:p>
+        </p:txBody>
+      </p:sp>
+    </p:spTree>
+    <p:extLst>
+      <p:ext uri="{BB962C8B-B14F-4D97-AF65-F5344CB8AC3E}">
+        <p14:creationId xmlns:p14="http://schemas.microsoft.com/office/powerpoint/2010/main" val="1300055027"/>
+      </p:ext>
+    </p:extLst>
+  </p:cSld>
+  <p:clrMapOvr>
+    <a:masterClrMapping/>
+  </p:clrMapOvr>
+</p:sld>
+</file>
+
+<file path=ppt/slides/slide28.xml><?xml version="1.0" encoding="utf-8"?>
+<p:sld xmlns:a="http://schemas.openxmlformats.org/drawingml/2006/main" xmlns:r="http://schemas.openxmlformats.org/officeDocument/2006/relationships" xmlns:p="http://schemas.openxmlformats.org/presentationml/2006/main">
+  <p:cSld>
+    <p:bg>
+      <p:bgPr>
+        <a:gradFill flip="none" rotWithShape="1">
+          <a:gsLst>
+            <a:gs pos="0">
+              <a:schemeClr val="accent3">
+                <a:lumMod val="89000"/>
+              </a:schemeClr>
+            </a:gs>
+            <a:gs pos="23000">
+              <a:schemeClr val="accent3">
+                <a:lumMod val="89000"/>
+              </a:schemeClr>
+            </a:gs>
+            <a:gs pos="69000">
+              <a:schemeClr val="accent3">
+                <a:lumMod val="75000"/>
+              </a:schemeClr>
+            </a:gs>
+            <a:gs pos="97000">
+              <a:schemeClr val="accent3">
+                <a:lumMod val="70000"/>
+              </a:schemeClr>
+            </a:gs>
+          </a:gsLst>
+          <a:path path="circle">
+            <a:fillToRect l="50000" t="50000" r="50000" b="50000"/>
+          </a:path>
+          <a:tileRect/>
+        </a:gradFill>
+        <a:effectLst/>
+      </p:bgPr>
+    </p:bg>
+    <p:spTree>
+      <p:nvGrpSpPr>
+        <p:cNvPr id="1" name=""/>
+        <p:cNvGrpSpPr/>
+        <p:nvPr/>
+      </p:nvGrpSpPr>
+      <p:grpSpPr>
+        <a:xfrm>
+          <a:off x="0" y="0"/>
+          <a:ext cx="0" cy="0"/>
+          <a:chOff x="0" y="0"/>
+          <a:chExt cx="0" cy="0"/>
+        </a:xfrm>
+      </p:grpSpPr>
+      <p:sp>
+        <p:nvSpPr>
+          <p:cNvPr id="2" name="Título 1">
+            <a:extLst>
+              <a:ext uri="{FF2B5EF4-FFF2-40B4-BE49-F238E27FC236}">
+                <a16:creationId xmlns:a16="http://schemas.microsoft.com/office/drawing/2014/main" id="{C65A0631-47E2-4854-94DA-DD27A379FEF1}"/>
+              </a:ext>
+            </a:extLst>
+          </p:cNvPr>
+          <p:cNvSpPr>
+            <a:spLocks noGrp="1"/>
+          </p:cNvSpPr>
+          <p:nvPr>
+            <p:ph type="title"/>
+          </p:nvPr>
+        </p:nvSpPr>
+        <p:spPr>
+          <a:xfrm>
+            <a:off x="228600" y="309281"/>
+            <a:ext cx="8686800" cy="1519519"/>
+          </a:xfrm>
+        </p:spPr>
+        <p:txBody>
+          <a:bodyPr anchor="ctr">
+            <a:normAutofit fontScale="90000"/>
+          </a:bodyPr>
+          <a:lstStyle/>
+          <a:p>
+            <a:r>
+              <a:rPr lang="es-VE" sz="6000" b="1" dirty="0"/>
+              <a:t>3. LOS ATRIBUTOS DE DIOS</a:t>
+            </a:r>
+            <a:br>
+              <a:rPr lang="es-VE" sz="6600" b="1" dirty="0"/>
+            </a:br>
+            <a:r>
+              <a:rPr lang="es-VE" sz="3200" b="1" dirty="0"/>
+              <a:t>3.2 Atributos activos</a:t>
+            </a:r>
+            <a:br>
+              <a:rPr lang="es-VE" sz="3200" b="1" dirty="0"/>
+            </a:br>
+            <a:r>
+              <a:rPr lang="es-VE" sz="2700" b="1" dirty="0">
+                <a:solidFill>
+                  <a:srgbClr val="FFFF00"/>
+                </a:solidFill>
+              </a:rPr>
+              <a:t>3.2.5. Soberanía</a:t>
+            </a:r>
+            <a:endParaRPr lang="es-VE" sz="6600" b="1" dirty="0">
+              <a:solidFill>
+                <a:srgbClr val="FFFF00"/>
+              </a:solidFill>
+            </a:endParaRPr>
+          </a:p>
+        </p:txBody>
+      </p:sp>
+      <p:sp>
+        <p:nvSpPr>
+          <p:cNvPr id="3" name="Marcador de contenido 2">
+            <a:extLst>
+              <a:ext uri="{FF2B5EF4-FFF2-40B4-BE49-F238E27FC236}">
+                <a16:creationId xmlns:a16="http://schemas.microsoft.com/office/drawing/2014/main" id="{AA130F57-7D31-4139-81B2-4D70486C00F2}"/>
+              </a:ext>
+            </a:extLst>
+          </p:cNvPr>
+          <p:cNvSpPr>
+            <a:spLocks noGrp="1"/>
+          </p:cNvSpPr>
+          <p:nvPr>
+            <p:ph idx="1"/>
+          </p:nvPr>
+        </p:nvSpPr>
+        <p:spPr>
+          <a:xfrm>
+            <a:off x="228600" y="1945178"/>
+            <a:ext cx="8686800" cy="3460540"/>
+          </a:xfrm>
+        </p:spPr>
+        <p:txBody>
+          <a:bodyPr anchor="ctr">
+            <a:normAutofit lnSpcReduction="10000"/>
+          </a:bodyPr>
+          <a:lstStyle/>
+          <a:p>
+            <a:pPr marL="0" indent="0">
+              <a:buNone/>
+            </a:pPr>
+            <a:r>
+              <a:rPr lang="es-VE" sz="2400" dirty="0"/>
+              <a:t>La </a:t>
+            </a:r>
+            <a:r>
+              <a:rPr lang="es-VE" sz="2400" b="1" dirty="0"/>
+              <a:t>soberanía</a:t>
+            </a:r>
+            <a:r>
+              <a:rPr lang="es-VE" sz="2400" dirty="0"/>
+              <a:t> representa una facultad de mando, poder y control que posee una persona o entidad sobre un sistema de gobierno, territorio o una población.</a:t>
+            </a:r>
+          </a:p>
+          <a:p>
+            <a:pPr marL="0" indent="0">
+              <a:buNone/>
+            </a:pPr>
+            <a:endParaRPr lang="es-VE" sz="2400" b="1" dirty="0">
+              <a:solidFill>
+                <a:srgbClr val="FFFF00"/>
+              </a:solidFill>
+            </a:endParaRPr>
+          </a:p>
+          <a:p>
+            <a:pPr marL="0" indent="0">
+              <a:buNone/>
+            </a:pPr>
+            <a:r>
+              <a:rPr lang="es-VE" sz="2400" dirty="0"/>
+              <a:t>Dios tiene absoluto derecho de </a:t>
+            </a:r>
+            <a:r>
+              <a:rPr lang="es-VE" sz="2400" b="1" dirty="0"/>
+              <a:t>gobernar</a:t>
+            </a:r>
+            <a:r>
+              <a:rPr lang="es-VE" sz="2400" dirty="0"/>
+              <a:t>, y </a:t>
+            </a:r>
+            <a:r>
+              <a:rPr lang="es-VE" sz="2400" b="1" dirty="0"/>
+              <a:t>disponer</a:t>
+            </a:r>
+            <a:r>
+              <a:rPr lang="es-VE" sz="2400" dirty="0"/>
+              <a:t> de todo según su voluntad </a:t>
+            </a:r>
+            <a:r>
+              <a:rPr lang="es-VE" sz="2400" b="1" dirty="0">
+                <a:solidFill>
+                  <a:srgbClr val="FFFF00"/>
+                </a:solidFill>
+              </a:rPr>
+              <a:t>[</a:t>
+            </a:r>
+            <a:r>
+              <a:rPr lang="es-VE" sz="2400" b="1" dirty="0" err="1">
+                <a:solidFill>
+                  <a:srgbClr val="FFFF00"/>
+                </a:solidFill>
+              </a:rPr>
+              <a:t>Dn</a:t>
+            </a:r>
+            <a:r>
+              <a:rPr lang="es-VE" sz="2400" b="1" dirty="0">
+                <a:solidFill>
+                  <a:srgbClr val="FFFF00"/>
+                </a:solidFill>
+              </a:rPr>
+              <a:t> 4:35; Mt 20:15; </a:t>
+            </a:r>
+            <a:r>
+              <a:rPr lang="es-VE" sz="2400" b="1" dirty="0" err="1">
+                <a:solidFill>
+                  <a:srgbClr val="FFFF00"/>
+                </a:solidFill>
+              </a:rPr>
+              <a:t>Rm</a:t>
+            </a:r>
+            <a:r>
+              <a:rPr lang="es-VE" sz="2400" b="1" dirty="0">
+                <a:solidFill>
+                  <a:srgbClr val="FFFF00"/>
+                </a:solidFill>
+              </a:rPr>
+              <a:t> 9:21]</a:t>
+            </a:r>
+            <a:r>
+              <a:rPr lang="es-VE" sz="2400" dirty="0"/>
+              <a:t>. Posee este derecho en virtud de su infinita superioridad, de su propiedad absoluta de todo, y de la absoluta dependencia que todas las cosas tienen de él para su continuación. Por lo tanto, no es sólo necio sino también malvado criticar la conducta de Dios.</a:t>
+            </a:r>
+          </a:p>
+        </p:txBody>
+      </p:sp>
+    </p:spTree>
+    <p:extLst>
+      <p:ext uri="{BB962C8B-B14F-4D97-AF65-F5344CB8AC3E}">
+        <p14:creationId xmlns:p14="http://schemas.microsoft.com/office/powerpoint/2010/main" val="3121920346"/>
       </p:ext>
     </p:extLst>
   </p:cSld>

</xml_diff>